<commit_message>
update temperature diff plots
</commit_message>
<xml_diff>
--- a/plots/Floodplain_Shade_Figure_Alterations_Updated_Meacham.pptx
+++ b/plots/Floodplain_Shade_Figure_Alterations_Updated_Meacham.pptx
@@ -245,7 +245,7 @@
           <a:p>
             <a:fld id="{BED1CDFE-13BD-45C0-9142-AC2FC464EE39}" type="datetimeFigureOut">
               <a:rPr lang="en-US" smtClean="0"/>
-              <a:t>12/13/2021</a:t>
+              <a:t>1/19/2022</a:t>
             </a:fld>
             <a:endParaRPr lang="en-US"/>
           </a:p>
@@ -413,7 +413,7 @@
           <a:p>
             <a:fld id="{BED1CDFE-13BD-45C0-9142-AC2FC464EE39}" type="datetimeFigureOut">
               <a:rPr lang="en-US" smtClean="0"/>
-              <a:t>12/13/2021</a:t>
+              <a:t>1/19/2022</a:t>
             </a:fld>
             <a:endParaRPr lang="en-US"/>
           </a:p>
@@ -591,7 +591,7 @@
           <a:p>
             <a:fld id="{BED1CDFE-13BD-45C0-9142-AC2FC464EE39}" type="datetimeFigureOut">
               <a:rPr lang="en-US" smtClean="0"/>
-              <a:t>12/13/2021</a:t>
+              <a:t>1/19/2022</a:t>
             </a:fld>
             <a:endParaRPr lang="en-US"/>
           </a:p>
@@ -759,7 +759,7 @@
           <a:p>
             <a:fld id="{BED1CDFE-13BD-45C0-9142-AC2FC464EE39}" type="datetimeFigureOut">
               <a:rPr lang="en-US" smtClean="0"/>
-              <a:t>12/13/2021</a:t>
+              <a:t>1/19/2022</a:t>
             </a:fld>
             <a:endParaRPr lang="en-US"/>
           </a:p>
@@ -1004,7 +1004,7 @@
           <a:p>
             <a:fld id="{BED1CDFE-13BD-45C0-9142-AC2FC464EE39}" type="datetimeFigureOut">
               <a:rPr lang="en-US" smtClean="0"/>
-              <a:t>12/13/2021</a:t>
+              <a:t>1/19/2022</a:t>
             </a:fld>
             <a:endParaRPr lang="en-US"/>
           </a:p>
@@ -1233,7 +1233,7 @@
           <a:p>
             <a:fld id="{BED1CDFE-13BD-45C0-9142-AC2FC464EE39}" type="datetimeFigureOut">
               <a:rPr lang="en-US" smtClean="0"/>
-              <a:t>12/13/2021</a:t>
+              <a:t>1/19/2022</a:t>
             </a:fld>
             <a:endParaRPr lang="en-US"/>
           </a:p>
@@ -1597,7 +1597,7 @@
           <a:p>
             <a:fld id="{BED1CDFE-13BD-45C0-9142-AC2FC464EE39}" type="datetimeFigureOut">
               <a:rPr lang="en-US" smtClean="0"/>
-              <a:t>12/13/2021</a:t>
+              <a:t>1/19/2022</a:t>
             </a:fld>
             <a:endParaRPr lang="en-US"/>
           </a:p>
@@ -1714,7 +1714,7 @@
           <a:p>
             <a:fld id="{BED1CDFE-13BD-45C0-9142-AC2FC464EE39}" type="datetimeFigureOut">
               <a:rPr lang="en-US" smtClean="0"/>
-              <a:t>12/13/2021</a:t>
+              <a:t>1/19/2022</a:t>
             </a:fld>
             <a:endParaRPr lang="en-US"/>
           </a:p>
@@ -1809,7 +1809,7 @@
           <a:p>
             <a:fld id="{BED1CDFE-13BD-45C0-9142-AC2FC464EE39}" type="datetimeFigureOut">
               <a:rPr lang="en-US" smtClean="0"/>
-              <a:t>12/13/2021</a:t>
+              <a:t>1/19/2022</a:t>
             </a:fld>
             <a:endParaRPr lang="en-US"/>
           </a:p>
@@ -2084,7 +2084,7 @@
           <a:p>
             <a:fld id="{BED1CDFE-13BD-45C0-9142-AC2FC464EE39}" type="datetimeFigureOut">
               <a:rPr lang="en-US" smtClean="0"/>
-              <a:t>12/13/2021</a:t>
+              <a:t>1/19/2022</a:t>
             </a:fld>
             <a:endParaRPr lang="en-US"/>
           </a:p>
@@ -2336,7 +2336,7 @@
           <a:p>
             <a:fld id="{BED1CDFE-13BD-45C0-9142-AC2FC464EE39}" type="datetimeFigureOut">
               <a:rPr lang="en-US" smtClean="0"/>
-              <a:t>12/13/2021</a:t>
+              <a:t>1/19/2022</a:t>
             </a:fld>
             <a:endParaRPr lang="en-US"/>
           </a:p>
@@ -2547,7 +2547,7 @@
           <a:p>
             <a:fld id="{BED1CDFE-13BD-45C0-9142-AC2FC464EE39}" type="datetimeFigureOut">
               <a:rPr lang="en-US" smtClean="0"/>
-              <a:t>12/13/2021</a:t>
+              <a:t>1/19/2022</a:t>
             </a:fld>
             <a:endParaRPr lang="en-US"/>
           </a:p>
@@ -3471,10 +3471,10 @@
       </p:grpSpPr>
       <p:grpSp>
         <p:nvGrpSpPr>
-          <p:cNvPr id="9" name="Group 8">
+          <p:cNvPr id="20" name="Group 19">
             <a:extLst>
               <a:ext uri="{FF2B5EF4-FFF2-40B4-BE49-F238E27FC236}">
-                <a16:creationId xmlns:a16="http://schemas.microsoft.com/office/drawing/2014/main" id="{AC4805ED-ACDB-45E7-81B9-92D26452B73C}"/>
+                <a16:creationId xmlns:a16="http://schemas.microsoft.com/office/drawing/2014/main" id="{7E1050CB-4570-4EA5-A420-C12E4ABA15DC}"/>
               </a:ext>
             </a:extLst>
           </p:cNvPr>
@@ -3483,10 +3483,10 @@
         </p:nvGrpSpPr>
         <p:grpSpPr>
           <a:xfrm>
-            <a:off x="491954" y="1023457"/>
-            <a:ext cx="11208092" cy="4699472"/>
-            <a:chOff x="491954" y="1023457"/>
-            <a:chExt cx="11208092" cy="4699472"/>
+            <a:off x="491954" y="750350"/>
+            <a:ext cx="11208092" cy="5621875"/>
+            <a:chOff x="491954" y="750350"/>
+            <a:chExt cx="11208092" cy="5621875"/>
           </a:xfrm>
         </p:grpSpPr>
         <p:sp>
@@ -3503,8 +3503,8 @@
           </p:nvSpPr>
           <p:spPr>
             <a:xfrm>
-              <a:off x="491954" y="1023457"/>
-              <a:ext cx="11208092" cy="4699472"/>
+              <a:off x="491954" y="818046"/>
+              <a:ext cx="11208092" cy="5554179"/>
             </a:xfrm>
             <a:prstGeom prst="rect">
               <a:avLst/>
@@ -3557,7 +3557,7 @@
             </p:cNvPicPr>
             <p:nvPr/>
           </p:nvPicPr>
-          <p:blipFill>
+          <p:blipFill rotWithShape="1">
             <a:blip r:embed="rId2" cstate="print">
               <a:extLst>
                 <a:ext uri="{28A0092B-C50C-407E-A947-70E740481C1C}">
@@ -3565,49 +3565,13 @@
                 </a:ext>
               </a:extLst>
             </a:blip>
-            <a:stretch>
-              <a:fillRect/>
-            </a:stretch>
-          </p:blipFill>
-          <p:spPr>
-            <a:xfrm>
-              <a:off x="830509" y="1245625"/>
-              <a:ext cx="10002473" cy="4000989"/>
-            </a:xfrm>
-            <a:prstGeom prst="rect">
-              <a:avLst/>
-            </a:prstGeom>
-          </p:spPr>
-        </p:pic>
-        <p:pic>
-          <p:nvPicPr>
-            <p:cNvPr id="4" name="Picture 3">
-              <a:extLst>
-                <a:ext uri="{FF2B5EF4-FFF2-40B4-BE49-F238E27FC236}">
-                  <a16:creationId xmlns:a16="http://schemas.microsoft.com/office/drawing/2014/main" id="{56733806-0EDD-4A3A-BF14-DD4F858574BB}"/>
-                </a:ext>
-              </a:extLst>
-            </p:cNvPr>
-            <p:cNvPicPr>
-              <a:picLocks noChangeAspect="1"/>
-            </p:cNvPicPr>
-            <p:nvPr/>
-          </p:nvPicPr>
-          <p:blipFill rotWithShape="1">
-            <a:blip r:embed="rId3" cstate="print">
-              <a:extLst>
-                <a:ext uri="{28A0092B-C50C-407E-A947-70E740481C1C}">
-                  <a14:useLocalDpi xmlns:a14="http://schemas.microsoft.com/office/drawing/2010/main" val="0"/>
-                </a:ext>
-              </a:extLst>
-            </a:blip>
-            <a:srcRect l="44495" t="18910" r="40611" b="29930"/>
+            <a:srcRect t="3884" b="49599"/>
             <a:stretch/>
           </p:blipFill>
           <p:spPr>
             <a:xfrm>
-              <a:off x="10832982" y="2438399"/>
-              <a:ext cx="817880" cy="1615440"/>
+              <a:off x="830509" y="1400962"/>
+              <a:ext cx="10002473" cy="1861184"/>
             </a:xfrm>
             <a:prstGeom prst="rect">
               <a:avLst/>
@@ -3628,7 +3592,7 @@
           </p:nvSpPr>
           <p:spPr>
             <a:xfrm>
-              <a:off x="5085826" y="5384375"/>
+              <a:off x="5085826" y="5851100"/>
               <a:ext cx="2020348" cy="338554"/>
             </a:xfrm>
             <a:prstGeom prst="rect">
@@ -3663,8 +3627,8 @@
           </p:nvSpPr>
           <p:spPr>
             <a:xfrm rot="16200000">
-              <a:off x="-616341" y="3076842"/>
-              <a:ext cx="2555146" cy="338554"/>
+              <a:off x="-582545" y="1941731"/>
+              <a:ext cx="2555146" cy="307777"/>
             </a:xfrm>
             <a:prstGeom prst="rect">
               <a:avLst/>
@@ -3678,8 +3642,493 @@
             <a:lstStyle/>
             <a:p>
               <a:r>
-                <a:rPr lang="en-US" sz="1600" dirty="0"/>
+                <a:rPr lang="en-US" sz="1400" dirty="0"/>
                 <a:t>Temperature Difference (°C)</a:t>
+              </a:r>
+            </a:p>
+          </p:txBody>
+        </p:sp>
+        <p:pic>
+          <p:nvPicPr>
+            <p:cNvPr id="4" name="Picture 3">
+              <a:extLst>
+                <a:ext uri="{FF2B5EF4-FFF2-40B4-BE49-F238E27FC236}">
+                  <a16:creationId xmlns:a16="http://schemas.microsoft.com/office/drawing/2014/main" id="{56733806-0EDD-4A3A-BF14-DD4F858574BB}"/>
+                </a:ext>
+              </a:extLst>
+            </p:cNvPr>
+            <p:cNvPicPr>
+              <a:picLocks noChangeAspect="1"/>
+            </p:cNvPicPr>
+            <p:nvPr/>
+          </p:nvPicPr>
+          <p:blipFill rotWithShape="1">
+            <a:blip r:embed="rId3" cstate="print">
+              <a:extLst>
+                <a:ext uri="{28A0092B-C50C-407E-A947-70E740481C1C}">
+                  <a14:useLocalDpi xmlns:a14="http://schemas.microsoft.com/office/drawing/2010/main" val="0"/>
+                </a:ext>
+              </a:extLst>
+            </a:blip>
+            <a:srcRect l="44495" t="18910" r="40611" b="29930"/>
+            <a:stretch/>
+          </p:blipFill>
+          <p:spPr>
+            <a:xfrm>
+              <a:off x="10832981" y="2727533"/>
+              <a:ext cx="817880" cy="1615440"/>
+            </a:xfrm>
+            <a:prstGeom prst="rect">
+              <a:avLst/>
+            </a:prstGeom>
+          </p:spPr>
+        </p:pic>
+        <p:pic>
+          <p:nvPicPr>
+            <p:cNvPr id="10" name="Picture 9" descr="Diagram, schematic&#10;&#10;Description automatically generated">
+              <a:extLst>
+                <a:ext uri="{FF2B5EF4-FFF2-40B4-BE49-F238E27FC236}">
+                  <a16:creationId xmlns:a16="http://schemas.microsoft.com/office/drawing/2014/main" id="{C4B0DAE2-08B9-483F-9DF7-2B5D55EE8D61}"/>
+                </a:ext>
+              </a:extLst>
+            </p:cNvPr>
+            <p:cNvPicPr>
+              <a:picLocks noChangeAspect="1"/>
+            </p:cNvPicPr>
+            <p:nvPr/>
+          </p:nvPicPr>
+          <p:blipFill rotWithShape="1">
+            <a:blip r:embed="rId2" cstate="print">
+              <a:extLst>
+                <a:ext uri="{28A0092B-C50C-407E-A947-70E740481C1C}">
+                  <a14:useLocalDpi xmlns:a14="http://schemas.microsoft.com/office/drawing/2010/main" val="0"/>
+                </a:ext>
+              </a:extLst>
+            </a:blip>
+            <a:srcRect t="53843"/>
+            <a:stretch/>
+          </p:blipFill>
+          <p:spPr>
+            <a:xfrm>
+              <a:off x="830508" y="3952356"/>
+              <a:ext cx="10002473" cy="1846708"/>
+            </a:xfrm>
+            <a:prstGeom prst="rect">
+              <a:avLst/>
+            </a:prstGeom>
+          </p:spPr>
+        </p:pic>
+        <p:sp>
+          <p:nvSpPr>
+            <p:cNvPr id="2" name="TextBox 1">
+              <a:extLst>
+                <a:ext uri="{FF2B5EF4-FFF2-40B4-BE49-F238E27FC236}">
+                  <a16:creationId xmlns:a16="http://schemas.microsoft.com/office/drawing/2014/main" id="{F446CB03-4A13-4706-A4C2-9BEB6FE4F032}"/>
+                </a:ext>
+              </a:extLst>
+            </p:cNvPr>
+            <p:cNvSpPr txBox="1"/>
+            <p:nvPr/>
+          </p:nvSpPr>
+          <p:spPr>
+            <a:xfrm>
+              <a:off x="898102" y="750350"/>
+              <a:ext cx="447675" cy="769441"/>
+            </a:xfrm>
+            <a:prstGeom prst="rect">
+              <a:avLst/>
+            </a:prstGeom>
+            <a:noFill/>
+          </p:spPr>
+          <p:txBody>
+            <a:bodyPr wrap="square" rtlCol="0">
+              <a:spAutoFit/>
+            </a:bodyPr>
+            <a:lstStyle/>
+            <a:p>
+              <a:r>
+                <a:rPr lang="en-US" sz="4400" dirty="0">
+                  <a:latin typeface="Arial" panose="020B0604020202020204" pitchFamily="34" charset="0"/>
+                  <a:cs typeface="Arial" panose="020B0604020202020204" pitchFamily="34" charset="0"/>
+                </a:rPr>
+                <a:t>A</a:t>
+              </a:r>
+            </a:p>
+          </p:txBody>
+        </p:sp>
+        <p:sp>
+          <p:nvSpPr>
+            <p:cNvPr id="11" name="TextBox 10">
+              <a:extLst>
+                <a:ext uri="{FF2B5EF4-FFF2-40B4-BE49-F238E27FC236}">
+                  <a16:creationId xmlns:a16="http://schemas.microsoft.com/office/drawing/2014/main" id="{19474209-A00A-4D71-A9EC-600F67EF478C}"/>
+                </a:ext>
+              </a:extLst>
+            </p:cNvPr>
+            <p:cNvSpPr txBox="1"/>
+            <p:nvPr/>
+          </p:nvSpPr>
+          <p:spPr>
+            <a:xfrm>
+              <a:off x="848917" y="3333578"/>
+              <a:ext cx="447675" cy="769441"/>
+            </a:xfrm>
+            <a:prstGeom prst="rect">
+              <a:avLst/>
+            </a:prstGeom>
+            <a:noFill/>
+          </p:spPr>
+          <p:txBody>
+            <a:bodyPr wrap="square" rtlCol="0">
+              <a:spAutoFit/>
+            </a:bodyPr>
+            <a:lstStyle/>
+            <a:p>
+              <a:r>
+                <a:rPr lang="en-US" sz="4400" dirty="0">
+                  <a:latin typeface="Arial" panose="020B0604020202020204" pitchFamily="34" charset="0"/>
+                  <a:cs typeface="Arial" panose="020B0604020202020204" pitchFamily="34" charset="0"/>
+                </a:rPr>
+                <a:t>B</a:t>
+              </a:r>
+            </a:p>
+          </p:txBody>
+        </p:sp>
+        <p:sp>
+          <p:nvSpPr>
+            <p:cNvPr id="12" name="TextBox 11">
+              <a:extLst>
+                <a:ext uri="{FF2B5EF4-FFF2-40B4-BE49-F238E27FC236}">
+                  <a16:creationId xmlns:a16="http://schemas.microsoft.com/office/drawing/2014/main" id="{AFCAC26C-364E-43A3-8C9A-3A0CBF4E2165}"/>
+                </a:ext>
+              </a:extLst>
+            </p:cNvPr>
+            <p:cNvSpPr txBox="1"/>
+            <p:nvPr/>
+          </p:nvSpPr>
+          <p:spPr>
+            <a:xfrm rot="16200000">
+              <a:off x="-582546" y="4485891"/>
+              <a:ext cx="2555146" cy="307777"/>
+            </a:xfrm>
+            <a:prstGeom prst="rect">
+              <a:avLst/>
+            </a:prstGeom>
+            <a:noFill/>
+          </p:spPr>
+          <p:txBody>
+            <a:bodyPr wrap="square" rtlCol="0">
+              <a:spAutoFit/>
+            </a:bodyPr>
+            <a:lstStyle/>
+            <a:p>
+              <a:r>
+                <a:rPr lang="en-US" sz="1400" dirty="0"/>
+                <a:t>Temperature Difference (°C)</a:t>
+              </a:r>
+            </a:p>
+          </p:txBody>
+        </p:sp>
+        <p:sp>
+          <p:nvSpPr>
+            <p:cNvPr id="5" name="TextBox 4">
+              <a:extLst>
+                <a:ext uri="{FF2B5EF4-FFF2-40B4-BE49-F238E27FC236}">
+                  <a16:creationId xmlns:a16="http://schemas.microsoft.com/office/drawing/2014/main" id="{6A8431C2-0E08-41EA-9CA1-B296F574A86A}"/>
+                </a:ext>
+              </a:extLst>
+            </p:cNvPr>
+            <p:cNvSpPr txBox="1"/>
+            <p:nvPr/>
+          </p:nvSpPr>
+          <p:spPr>
+            <a:xfrm>
+              <a:off x="1562099" y="1098007"/>
+              <a:ext cx="1266825" cy="369332"/>
+            </a:xfrm>
+            <a:prstGeom prst="rect">
+              <a:avLst/>
+            </a:prstGeom>
+            <a:noFill/>
+          </p:spPr>
+          <p:txBody>
+            <a:bodyPr wrap="square" rtlCol="0">
+              <a:spAutoFit/>
+            </a:bodyPr>
+            <a:lstStyle/>
+            <a:p>
+              <a:r>
+                <a:rPr lang="en-US" dirty="0">
+                  <a:latin typeface="Arial" panose="020B0604020202020204" pitchFamily="34" charset="0"/>
+                  <a:cs typeface="Arial" panose="020B0604020202020204" pitchFamily="34" charset="0"/>
+                </a:rPr>
+                <a:t>Soil 0.5m</a:t>
+              </a:r>
+            </a:p>
+          </p:txBody>
+        </p:sp>
+        <p:sp>
+          <p:nvSpPr>
+            <p:cNvPr id="13" name="TextBox 12">
+              <a:extLst>
+                <a:ext uri="{FF2B5EF4-FFF2-40B4-BE49-F238E27FC236}">
+                  <a16:creationId xmlns:a16="http://schemas.microsoft.com/office/drawing/2014/main" id="{0EA3679E-8833-48C6-B4BC-5CD8D2DA74D9}"/>
+                </a:ext>
+              </a:extLst>
+            </p:cNvPr>
+            <p:cNvSpPr txBox="1"/>
+            <p:nvPr/>
+          </p:nvSpPr>
+          <p:spPr>
+            <a:xfrm>
+              <a:off x="1528956" y="3649401"/>
+              <a:ext cx="1266825" cy="369332"/>
+            </a:xfrm>
+            <a:prstGeom prst="rect">
+              <a:avLst/>
+            </a:prstGeom>
+            <a:noFill/>
+          </p:spPr>
+          <p:txBody>
+            <a:bodyPr wrap="square" rtlCol="0">
+              <a:spAutoFit/>
+            </a:bodyPr>
+            <a:lstStyle/>
+            <a:p>
+              <a:r>
+                <a:rPr lang="en-US" dirty="0">
+                  <a:latin typeface="Arial" panose="020B0604020202020204" pitchFamily="34" charset="0"/>
+                  <a:cs typeface="Arial" panose="020B0604020202020204" pitchFamily="34" charset="0"/>
+                </a:rPr>
+                <a:t>Soil 0.5m</a:t>
+              </a:r>
+            </a:p>
+          </p:txBody>
+        </p:sp>
+        <p:sp>
+          <p:nvSpPr>
+            <p:cNvPr id="14" name="TextBox 13">
+              <a:extLst>
+                <a:ext uri="{FF2B5EF4-FFF2-40B4-BE49-F238E27FC236}">
+                  <a16:creationId xmlns:a16="http://schemas.microsoft.com/office/drawing/2014/main" id="{0649E1E6-2163-4481-8216-12419D04C0C5}"/>
+                </a:ext>
+              </a:extLst>
+            </p:cNvPr>
+            <p:cNvSpPr txBox="1"/>
+            <p:nvPr/>
+          </p:nvSpPr>
+          <p:spPr>
+            <a:xfrm>
+              <a:off x="4017652" y="1105249"/>
+              <a:ext cx="1266825" cy="369332"/>
+            </a:xfrm>
+            <a:prstGeom prst="rect">
+              <a:avLst/>
+            </a:prstGeom>
+            <a:noFill/>
+          </p:spPr>
+          <p:txBody>
+            <a:bodyPr wrap="square" rtlCol="0">
+              <a:spAutoFit/>
+            </a:bodyPr>
+            <a:lstStyle/>
+            <a:p>
+              <a:r>
+                <a:rPr lang="en-US" dirty="0">
+                  <a:latin typeface="Arial" panose="020B0604020202020204" pitchFamily="34" charset="0"/>
+                  <a:cs typeface="Arial" panose="020B0604020202020204" pitchFamily="34" charset="0"/>
+                </a:rPr>
+                <a:t>Soil 1.0m</a:t>
+              </a:r>
+            </a:p>
+          </p:txBody>
+        </p:sp>
+        <p:sp>
+          <p:nvSpPr>
+            <p:cNvPr id="15" name="TextBox 14">
+              <a:extLst>
+                <a:ext uri="{FF2B5EF4-FFF2-40B4-BE49-F238E27FC236}">
+                  <a16:creationId xmlns:a16="http://schemas.microsoft.com/office/drawing/2014/main" id="{AD971E63-4810-4426-AAC6-CEAE6A2DAC86}"/>
+                </a:ext>
+              </a:extLst>
+            </p:cNvPr>
+            <p:cNvSpPr txBox="1"/>
+            <p:nvPr/>
+          </p:nvSpPr>
+          <p:spPr>
+            <a:xfrm>
+              <a:off x="4005488" y="3649401"/>
+              <a:ext cx="1266825" cy="369332"/>
+            </a:xfrm>
+            <a:prstGeom prst="rect">
+              <a:avLst/>
+            </a:prstGeom>
+            <a:noFill/>
+          </p:spPr>
+          <p:txBody>
+            <a:bodyPr wrap="square" rtlCol="0">
+              <a:spAutoFit/>
+            </a:bodyPr>
+            <a:lstStyle/>
+            <a:p>
+              <a:r>
+                <a:rPr lang="en-US" dirty="0">
+                  <a:latin typeface="Arial" panose="020B0604020202020204" pitchFamily="34" charset="0"/>
+                  <a:cs typeface="Arial" panose="020B0604020202020204" pitchFamily="34" charset="0"/>
+                </a:rPr>
+                <a:t>Soil 1.0m</a:t>
+              </a:r>
+            </a:p>
+          </p:txBody>
+        </p:sp>
+        <p:sp>
+          <p:nvSpPr>
+            <p:cNvPr id="16" name="TextBox 15">
+              <a:extLst>
+                <a:ext uri="{FF2B5EF4-FFF2-40B4-BE49-F238E27FC236}">
+                  <a16:creationId xmlns:a16="http://schemas.microsoft.com/office/drawing/2014/main" id="{DB2054B9-CDAF-42B0-A56F-62F533C1997D}"/>
+                </a:ext>
+              </a:extLst>
+            </p:cNvPr>
+            <p:cNvSpPr txBox="1"/>
+            <p:nvPr/>
+          </p:nvSpPr>
+          <p:spPr>
+            <a:xfrm>
+              <a:off x="6561551" y="1105249"/>
+              <a:ext cx="1266825" cy="369332"/>
+            </a:xfrm>
+            <a:prstGeom prst="rect">
+              <a:avLst/>
+            </a:prstGeom>
+            <a:noFill/>
+          </p:spPr>
+          <p:txBody>
+            <a:bodyPr wrap="square" rtlCol="0">
+              <a:spAutoFit/>
+            </a:bodyPr>
+            <a:lstStyle/>
+            <a:p>
+              <a:r>
+                <a:rPr lang="en-US" dirty="0">
+                  <a:latin typeface="Arial" panose="020B0604020202020204" pitchFamily="34" charset="0"/>
+                  <a:cs typeface="Arial" panose="020B0604020202020204" pitchFamily="34" charset="0"/>
+                </a:rPr>
+                <a:t>Soil 2.0m</a:t>
+              </a:r>
+            </a:p>
+          </p:txBody>
+        </p:sp>
+        <p:sp>
+          <p:nvSpPr>
+            <p:cNvPr id="17" name="TextBox 16">
+              <a:extLst>
+                <a:ext uri="{FF2B5EF4-FFF2-40B4-BE49-F238E27FC236}">
+                  <a16:creationId xmlns:a16="http://schemas.microsoft.com/office/drawing/2014/main" id="{36B0CFEA-C364-465F-A7FD-30255FC9B528}"/>
+                </a:ext>
+              </a:extLst>
+            </p:cNvPr>
+            <p:cNvSpPr txBox="1"/>
+            <p:nvPr/>
+          </p:nvSpPr>
+          <p:spPr>
+            <a:xfrm>
+              <a:off x="6568437" y="3649401"/>
+              <a:ext cx="1266825" cy="369332"/>
+            </a:xfrm>
+            <a:prstGeom prst="rect">
+              <a:avLst/>
+            </a:prstGeom>
+            <a:noFill/>
+          </p:spPr>
+          <p:txBody>
+            <a:bodyPr wrap="square" rtlCol="0">
+              <a:spAutoFit/>
+            </a:bodyPr>
+            <a:lstStyle/>
+            <a:p>
+              <a:r>
+                <a:rPr lang="en-US" dirty="0">
+                  <a:latin typeface="Arial" panose="020B0604020202020204" pitchFamily="34" charset="0"/>
+                  <a:cs typeface="Arial" panose="020B0604020202020204" pitchFamily="34" charset="0"/>
+                </a:rPr>
+                <a:t>Soil 2.0m</a:t>
+              </a:r>
+            </a:p>
+          </p:txBody>
+        </p:sp>
+        <p:sp>
+          <p:nvSpPr>
+            <p:cNvPr id="18" name="TextBox 17">
+              <a:extLst>
+                <a:ext uri="{FF2B5EF4-FFF2-40B4-BE49-F238E27FC236}">
+                  <a16:creationId xmlns:a16="http://schemas.microsoft.com/office/drawing/2014/main" id="{537F80A3-B562-4C26-A00A-D946FB7B439F}"/>
+                </a:ext>
+              </a:extLst>
+            </p:cNvPr>
+            <p:cNvSpPr txBox="1"/>
+            <p:nvPr/>
+          </p:nvSpPr>
+          <p:spPr>
+            <a:xfrm>
+              <a:off x="9074977" y="1094727"/>
+              <a:ext cx="1266825" cy="369332"/>
+            </a:xfrm>
+            <a:prstGeom prst="rect">
+              <a:avLst/>
+            </a:prstGeom>
+            <a:noFill/>
+          </p:spPr>
+          <p:txBody>
+            <a:bodyPr wrap="square" rtlCol="0">
+              <a:spAutoFit/>
+            </a:bodyPr>
+            <a:lstStyle/>
+            <a:p>
+              <a:r>
+                <a:rPr lang="en-US" dirty="0">
+                  <a:latin typeface="Arial" panose="020B0604020202020204" pitchFamily="34" charset="0"/>
+                  <a:cs typeface="Arial" panose="020B0604020202020204" pitchFamily="34" charset="0"/>
+                </a:rPr>
+                <a:t>Soil 3.0m</a:t>
+              </a:r>
+            </a:p>
+          </p:txBody>
+        </p:sp>
+        <p:sp>
+          <p:nvSpPr>
+            <p:cNvPr id="19" name="TextBox 18">
+              <a:extLst>
+                <a:ext uri="{FF2B5EF4-FFF2-40B4-BE49-F238E27FC236}">
+                  <a16:creationId xmlns:a16="http://schemas.microsoft.com/office/drawing/2014/main" id="{3C9DD813-2A95-4597-AC2C-218899871E25}"/>
+                </a:ext>
+              </a:extLst>
+            </p:cNvPr>
+            <p:cNvSpPr txBox="1"/>
+            <p:nvPr/>
+          </p:nvSpPr>
+          <p:spPr>
+            <a:xfrm>
+              <a:off x="9080267" y="3649401"/>
+              <a:ext cx="1266825" cy="369332"/>
+            </a:xfrm>
+            <a:prstGeom prst="rect">
+              <a:avLst/>
+            </a:prstGeom>
+            <a:noFill/>
+          </p:spPr>
+          <p:txBody>
+            <a:bodyPr wrap="square" rtlCol="0">
+              <a:spAutoFit/>
+            </a:bodyPr>
+            <a:lstStyle/>
+            <a:p>
+              <a:r>
+                <a:rPr lang="en-US" dirty="0">
+                  <a:latin typeface="Arial" panose="020B0604020202020204" pitchFamily="34" charset="0"/>
+                  <a:cs typeface="Arial" panose="020B0604020202020204" pitchFamily="34" charset="0"/>
+                </a:rPr>
+                <a:t>Soil 3.0m</a:t>
               </a:r>
             </a:p>
           </p:txBody>

</xml_diff>

<commit_message>
manuscript quality amp damp plots
</commit_message>
<xml_diff>
--- a/plots/Floodplain_Shade_Figure_Alterations_Updated_Meacham.pptx
+++ b/plots/Floodplain_Shade_Figure_Alterations_Updated_Meacham.pptx
@@ -9,7 +9,8 @@
     <p:sldId id="264" r:id="rId3"/>
     <p:sldId id="265" r:id="rId4"/>
     <p:sldId id="262" r:id="rId5"/>
-    <p:sldId id="260" r:id="rId6"/>
+    <p:sldId id="266" r:id="rId6"/>
+    <p:sldId id="260" r:id="rId7"/>
   </p:sldIdLst>
   <p:sldSz cx="12192000" cy="6858000"/>
   <p:notesSz cx="6858000" cy="9144000"/>
@@ -245,7 +246,7 @@
           <a:p>
             <a:fld id="{BED1CDFE-13BD-45C0-9142-AC2FC464EE39}" type="datetimeFigureOut">
               <a:rPr lang="en-US" smtClean="0"/>
-              <a:t>1/19/2022</a:t>
+              <a:t>2/22/2022</a:t>
             </a:fld>
             <a:endParaRPr lang="en-US"/>
           </a:p>
@@ -413,7 +414,7 @@
           <a:p>
             <a:fld id="{BED1CDFE-13BD-45C0-9142-AC2FC464EE39}" type="datetimeFigureOut">
               <a:rPr lang="en-US" smtClean="0"/>
-              <a:t>1/19/2022</a:t>
+              <a:t>2/22/2022</a:t>
             </a:fld>
             <a:endParaRPr lang="en-US"/>
           </a:p>
@@ -591,7 +592,7 @@
           <a:p>
             <a:fld id="{BED1CDFE-13BD-45C0-9142-AC2FC464EE39}" type="datetimeFigureOut">
               <a:rPr lang="en-US" smtClean="0"/>
-              <a:t>1/19/2022</a:t>
+              <a:t>2/22/2022</a:t>
             </a:fld>
             <a:endParaRPr lang="en-US"/>
           </a:p>
@@ -759,7 +760,7 @@
           <a:p>
             <a:fld id="{BED1CDFE-13BD-45C0-9142-AC2FC464EE39}" type="datetimeFigureOut">
               <a:rPr lang="en-US" smtClean="0"/>
-              <a:t>1/19/2022</a:t>
+              <a:t>2/22/2022</a:t>
             </a:fld>
             <a:endParaRPr lang="en-US"/>
           </a:p>
@@ -1004,7 +1005,7 @@
           <a:p>
             <a:fld id="{BED1CDFE-13BD-45C0-9142-AC2FC464EE39}" type="datetimeFigureOut">
               <a:rPr lang="en-US" smtClean="0"/>
-              <a:t>1/19/2022</a:t>
+              <a:t>2/22/2022</a:t>
             </a:fld>
             <a:endParaRPr lang="en-US"/>
           </a:p>
@@ -1233,7 +1234,7 @@
           <a:p>
             <a:fld id="{BED1CDFE-13BD-45C0-9142-AC2FC464EE39}" type="datetimeFigureOut">
               <a:rPr lang="en-US" smtClean="0"/>
-              <a:t>1/19/2022</a:t>
+              <a:t>2/22/2022</a:t>
             </a:fld>
             <a:endParaRPr lang="en-US"/>
           </a:p>
@@ -1597,7 +1598,7 @@
           <a:p>
             <a:fld id="{BED1CDFE-13BD-45C0-9142-AC2FC464EE39}" type="datetimeFigureOut">
               <a:rPr lang="en-US" smtClean="0"/>
-              <a:t>1/19/2022</a:t>
+              <a:t>2/22/2022</a:t>
             </a:fld>
             <a:endParaRPr lang="en-US"/>
           </a:p>
@@ -1714,7 +1715,7 @@
           <a:p>
             <a:fld id="{BED1CDFE-13BD-45C0-9142-AC2FC464EE39}" type="datetimeFigureOut">
               <a:rPr lang="en-US" smtClean="0"/>
-              <a:t>1/19/2022</a:t>
+              <a:t>2/22/2022</a:t>
             </a:fld>
             <a:endParaRPr lang="en-US"/>
           </a:p>
@@ -1809,7 +1810,7 @@
           <a:p>
             <a:fld id="{BED1CDFE-13BD-45C0-9142-AC2FC464EE39}" type="datetimeFigureOut">
               <a:rPr lang="en-US" smtClean="0"/>
-              <a:t>1/19/2022</a:t>
+              <a:t>2/22/2022</a:t>
             </a:fld>
             <a:endParaRPr lang="en-US"/>
           </a:p>
@@ -2084,7 +2085,7 @@
           <a:p>
             <a:fld id="{BED1CDFE-13BD-45C0-9142-AC2FC464EE39}" type="datetimeFigureOut">
               <a:rPr lang="en-US" smtClean="0"/>
-              <a:t>1/19/2022</a:t>
+              <a:t>2/22/2022</a:t>
             </a:fld>
             <a:endParaRPr lang="en-US"/>
           </a:p>
@@ -2336,7 +2337,7 @@
           <a:p>
             <a:fld id="{BED1CDFE-13BD-45C0-9142-AC2FC464EE39}" type="datetimeFigureOut">
               <a:rPr lang="en-US" smtClean="0"/>
-              <a:t>1/19/2022</a:t>
+              <a:t>2/22/2022</a:t>
             </a:fld>
             <a:endParaRPr lang="en-US"/>
           </a:p>
@@ -2547,7 +2548,7 @@
           <a:p>
             <a:fld id="{BED1CDFE-13BD-45C0-9142-AC2FC464EE39}" type="datetimeFigureOut">
               <a:rPr lang="en-US" smtClean="0"/>
-              <a:t>1/19/2022</a:t>
+              <a:t>2/22/2022</a:t>
             </a:fld>
             <a:endParaRPr lang="en-US"/>
           </a:p>
@@ -4164,6 +4165,177 @@
           <a:chExt cx="0" cy="0"/>
         </a:xfrm>
       </p:grpSpPr>
+      <p:grpSp>
+        <p:nvGrpSpPr>
+          <p:cNvPr id="7" name="Group 6">
+            <a:extLst>
+              <a:ext uri="{FF2B5EF4-FFF2-40B4-BE49-F238E27FC236}">
+                <a16:creationId xmlns:a16="http://schemas.microsoft.com/office/drawing/2014/main" id="{36F0CDBE-92C4-4F07-9C05-7E2DFE18CD27}"/>
+              </a:ext>
+            </a:extLst>
+          </p:cNvPr>
+          <p:cNvGrpSpPr/>
+          <p:nvPr/>
+        </p:nvGrpSpPr>
+        <p:grpSpPr>
+          <a:xfrm>
+            <a:off x="3810000" y="0"/>
+            <a:ext cx="4572000" cy="6858000"/>
+            <a:chOff x="3810000" y="0"/>
+            <a:chExt cx="4572000" cy="6858000"/>
+          </a:xfrm>
+        </p:grpSpPr>
+        <p:pic>
+          <p:nvPicPr>
+            <p:cNvPr id="3" name="Picture 2" descr="Graphical user interface, diagram&#10;&#10;Description automatically generated with medium confidence">
+              <a:extLst>
+                <a:ext uri="{FF2B5EF4-FFF2-40B4-BE49-F238E27FC236}">
+                  <a16:creationId xmlns:a16="http://schemas.microsoft.com/office/drawing/2014/main" id="{F47AFCC6-D94A-4447-A35D-0F1C87D1E538}"/>
+                </a:ext>
+              </a:extLst>
+            </p:cNvPr>
+            <p:cNvPicPr>
+              <a:picLocks noChangeAspect="1"/>
+            </p:cNvPicPr>
+            <p:nvPr/>
+          </p:nvPicPr>
+          <p:blipFill>
+            <a:blip r:embed="rId2" cstate="print">
+              <a:extLst>
+                <a:ext uri="{28A0092B-C50C-407E-A947-70E740481C1C}">
+                  <a14:useLocalDpi xmlns:a14="http://schemas.microsoft.com/office/drawing/2010/main" val="0"/>
+                </a:ext>
+              </a:extLst>
+            </a:blip>
+            <a:stretch>
+              <a:fillRect/>
+            </a:stretch>
+          </p:blipFill>
+          <p:spPr>
+            <a:xfrm>
+              <a:off x="3810000" y="0"/>
+              <a:ext cx="4572000" cy="6858000"/>
+            </a:xfrm>
+            <a:prstGeom prst="rect">
+              <a:avLst/>
+            </a:prstGeom>
+          </p:spPr>
+        </p:pic>
+        <p:sp>
+          <p:nvSpPr>
+            <p:cNvPr id="4" name="TextBox 3">
+              <a:extLst>
+                <a:ext uri="{FF2B5EF4-FFF2-40B4-BE49-F238E27FC236}">
+                  <a16:creationId xmlns:a16="http://schemas.microsoft.com/office/drawing/2014/main" id="{EC38CDEB-62BD-4408-B010-3D0FED8A57E9}"/>
+                </a:ext>
+              </a:extLst>
+            </p:cNvPr>
+            <p:cNvSpPr txBox="1"/>
+            <p:nvPr/>
+          </p:nvSpPr>
+          <p:spPr>
+            <a:xfrm>
+              <a:off x="4195894" y="33556"/>
+              <a:ext cx="687898" cy="461665"/>
+            </a:xfrm>
+            <a:prstGeom prst="rect">
+              <a:avLst/>
+            </a:prstGeom>
+            <a:noFill/>
+          </p:spPr>
+          <p:txBody>
+            <a:bodyPr wrap="square" rtlCol="0">
+              <a:spAutoFit/>
+            </a:bodyPr>
+            <a:lstStyle/>
+            <a:p>
+              <a:r>
+                <a:rPr lang="en-US" sz="2400" dirty="0">
+                  <a:latin typeface="Arial" panose="020B0604020202020204" pitchFamily="34" charset="0"/>
+                  <a:cs typeface="Arial" panose="020B0604020202020204" pitchFamily="34" charset="0"/>
+                </a:rPr>
+                <a:t>A</a:t>
+              </a:r>
+            </a:p>
+          </p:txBody>
+        </p:sp>
+        <p:sp>
+          <p:nvSpPr>
+            <p:cNvPr id="5" name="TextBox 4">
+              <a:extLst>
+                <a:ext uri="{FF2B5EF4-FFF2-40B4-BE49-F238E27FC236}">
+                  <a16:creationId xmlns:a16="http://schemas.microsoft.com/office/drawing/2014/main" id="{8E1851B5-4D3B-474D-85A1-22CDE7C837F6}"/>
+                </a:ext>
+              </a:extLst>
+            </p:cNvPr>
+            <p:cNvSpPr txBox="1"/>
+            <p:nvPr/>
+          </p:nvSpPr>
+          <p:spPr>
+            <a:xfrm>
+              <a:off x="4195894" y="2241259"/>
+              <a:ext cx="687898" cy="461665"/>
+            </a:xfrm>
+            <a:prstGeom prst="rect">
+              <a:avLst/>
+            </a:prstGeom>
+            <a:noFill/>
+          </p:spPr>
+          <p:txBody>
+            <a:bodyPr wrap="square" rtlCol="0">
+              <a:spAutoFit/>
+            </a:bodyPr>
+            <a:lstStyle/>
+            <a:p>
+              <a:r>
+                <a:rPr lang="en-US" sz="2400" dirty="0">
+                  <a:latin typeface="Arial" panose="020B0604020202020204" pitchFamily="34" charset="0"/>
+                  <a:cs typeface="Arial" panose="020B0604020202020204" pitchFamily="34" charset="0"/>
+                </a:rPr>
+                <a:t>B</a:t>
+              </a:r>
+            </a:p>
+          </p:txBody>
+        </p:sp>
+        <p:sp>
+          <p:nvSpPr>
+            <p:cNvPr id="6" name="TextBox 5">
+              <a:extLst>
+                <a:ext uri="{FF2B5EF4-FFF2-40B4-BE49-F238E27FC236}">
+                  <a16:creationId xmlns:a16="http://schemas.microsoft.com/office/drawing/2014/main" id="{29DA323C-53B5-4E41-9047-869B5D52BE60}"/>
+                </a:ext>
+              </a:extLst>
+            </p:cNvPr>
+            <p:cNvSpPr txBox="1"/>
+            <p:nvPr/>
+          </p:nvSpPr>
+          <p:spPr>
+            <a:xfrm>
+              <a:off x="4195894" y="6033083"/>
+              <a:ext cx="687898" cy="461665"/>
+            </a:xfrm>
+            <a:prstGeom prst="rect">
+              <a:avLst/>
+            </a:prstGeom>
+            <a:noFill/>
+          </p:spPr>
+          <p:txBody>
+            <a:bodyPr wrap="square" rtlCol="0">
+              <a:spAutoFit/>
+            </a:bodyPr>
+            <a:lstStyle/>
+            <a:p>
+              <a:r>
+                <a:rPr lang="en-US" sz="2400" dirty="0">
+                  <a:latin typeface="Arial" panose="020B0604020202020204" pitchFamily="34" charset="0"/>
+                  <a:cs typeface="Arial" panose="020B0604020202020204" pitchFamily="34" charset="0"/>
+                </a:rPr>
+                <a:t>C</a:t>
+              </a:r>
+            </a:p>
+          </p:txBody>
+        </p:sp>
+      </p:grpSp>
     </p:spTree>
     <p:extLst>
       <p:ext uri="{BB962C8B-B14F-4D97-AF65-F5344CB8AC3E}">
@@ -4178,6 +4350,206 @@
 </file>
 
 <file path=ppt/slides/slide5.xml><?xml version="1.0" encoding="utf-8"?>
+<p:sld xmlns:a="http://schemas.openxmlformats.org/drawingml/2006/main" xmlns:r="http://schemas.openxmlformats.org/officeDocument/2006/relationships" xmlns:p="http://schemas.openxmlformats.org/presentationml/2006/main">
+  <p:cSld>
+    <p:spTree>
+      <p:nvGrpSpPr>
+        <p:cNvPr id="1" name=""/>
+        <p:cNvGrpSpPr/>
+        <p:nvPr/>
+      </p:nvGrpSpPr>
+      <p:grpSpPr>
+        <a:xfrm>
+          <a:off x="0" y="0"/>
+          <a:ext cx="0" cy="0"/>
+          <a:chOff x="0" y="0"/>
+          <a:chExt cx="0" cy="0"/>
+        </a:xfrm>
+      </p:grpSpPr>
+      <p:grpSp>
+        <p:nvGrpSpPr>
+          <p:cNvPr id="7" name="Group 6">
+            <a:extLst>
+              <a:ext uri="{FF2B5EF4-FFF2-40B4-BE49-F238E27FC236}">
+                <a16:creationId xmlns:a16="http://schemas.microsoft.com/office/drawing/2014/main" id="{36F0CDBE-92C4-4F07-9C05-7E2DFE18CD27}"/>
+              </a:ext>
+            </a:extLst>
+          </p:cNvPr>
+          <p:cNvGrpSpPr/>
+          <p:nvPr/>
+        </p:nvGrpSpPr>
+        <p:grpSpPr>
+          <a:xfrm>
+            <a:off x="3810000" y="0"/>
+            <a:ext cx="4572000" cy="6857999"/>
+            <a:chOff x="3810000" y="0"/>
+            <a:chExt cx="4572000" cy="6857999"/>
+          </a:xfrm>
+        </p:grpSpPr>
+        <p:pic>
+          <p:nvPicPr>
+            <p:cNvPr id="3" name="Picture 2">
+              <a:extLst>
+                <a:ext uri="{FF2B5EF4-FFF2-40B4-BE49-F238E27FC236}">
+                  <a16:creationId xmlns:a16="http://schemas.microsoft.com/office/drawing/2014/main" id="{F47AFCC6-D94A-4447-A35D-0F1C87D1E538}"/>
+                </a:ext>
+              </a:extLst>
+            </p:cNvPr>
+            <p:cNvPicPr>
+              <a:picLocks noChangeAspect="1"/>
+            </p:cNvPicPr>
+            <p:nvPr/>
+          </p:nvPicPr>
+          <p:blipFill>
+            <a:blip r:embed="rId2" cstate="print">
+              <a:extLst>
+                <a:ext uri="{28A0092B-C50C-407E-A947-70E740481C1C}">
+                  <a14:useLocalDpi xmlns:a14="http://schemas.microsoft.com/office/drawing/2010/main" val="0"/>
+                </a:ext>
+              </a:extLst>
+            </a:blip>
+            <a:srcRect/>
+            <a:stretch/>
+          </p:blipFill>
+          <p:spPr>
+            <a:xfrm>
+              <a:off x="3810000" y="0"/>
+              <a:ext cx="4572000" cy="6857999"/>
+            </a:xfrm>
+            <a:prstGeom prst="rect">
+              <a:avLst/>
+            </a:prstGeom>
+          </p:spPr>
+        </p:pic>
+        <p:sp>
+          <p:nvSpPr>
+            <p:cNvPr id="4" name="TextBox 3">
+              <a:extLst>
+                <a:ext uri="{FF2B5EF4-FFF2-40B4-BE49-F238E27FC236}">
+                  <a16:creationId xmlns:a16="http://schemas.microsoft.com/office/drawing/2014/main" id="{EC38CDEB-62BD-4408-B010-3D0FED8A57E9}"/>
+                </a:ext>
+              </a:extLst>
+            </p:cNvPr>
+            <p:cNvSpPr txBox="1"/>
+            <p:nvPr/>
+          </p:nvSpPr>
+          <p:spPr>
+            <a:xfrm>
+              <a:off x="4195894" y="33556"/>
+              <a:ext cx="687898" cy="461665"/>
+            </a:xfrm>
+            <a:prstGeom prst="rect">
+              <a:avLst/>
+            </a:prstGeom>
+            <a:noFill/>
+          </p:spPr>
+          <p:txBody>
+            <a:bodyPr wrap="square" rtlCol="0">
+              <a:spAutoFit/>
+            </a:bodyPr>
+            <a:lstStyle/>
+            <a:p>
+              <a:r>
+                <a:rPr lang="en-US" sz="2400" dirty="0">
+                  <a:latin typeface="Arial" panose="020B0604020202020204" pitchFamily="34" charset="0"/>
+                  <a:cs typeface="Arial" panose="020B0604020202020204" pitchFamily="34" charset="0"/>
+                </a:rPr>
+                <a:t>A</a:t>
+              </a:r>
+            </a:p>
+          </p:txBody>
+        </p:sp>
+        <p:sp>
+          <p:nvSpPr>
+            <p:cNvPr id="5" name="TextBox 4">
+              <a:extLst>
+                <a:ext uri="{FF2B5EF4-FFF2-40B4-BE49-F238E27FC236}">
+                  <a16:creationId xmlns:a16="http://schemas.microsoft.com/office/drawing/2014/main" id="{8E1851B5-4D3B-474D-85A1-22CDE7C837F6}"/>
+                </a:ext>
+              </a:extLst>
+            </p:cNvPr>
+            <p:cNvSpPr txBox="1"/>
+            <p:nvPr/>
+          </p:nvSpPr>
+          <p:spPr>
+            <a:xfrm>
+              <a:off x="4195894" y="2241259"/>
+              <a:ext cx="687898" cy="461665"/>
+            </a:xfrm>
+            <a:prstGeom prst="rect">
+              <a:avLst/>
+            </a:prstGeom>
+            <a:noFill/>
+          </p:spPr>
+          <p:txBody>
+            <a:bodyPr wrap="square" rtlCol="0">
+              <a:spAutoFit/>
+            </a:bodyPr>
+            <a:lstStyle/>
+            <a:p>
+              <a:r>
+                <a:rPr lang="en-US" sz="2400" dirty="0">
+                  <a:latin typeface="Arial" panose="020B0604020202020204" pitchFamily="34" charset="0"/>
+                  <a:cs typeface="Arial" panose="020B0604020202020204" pitchFamily="34" charset="0"/>
+                </a:rPr>
+                <a:t>B</a:t>
+              </a:r>
+            </a:p>
+          </p:txBody>
+        </p:sp>
+        <p:sp>
+          <p:nvSpPr>
+            <p:cNvPr id="6" name="TextBox 5">
+              <a:extLst>
+                <a:ext uri="{FF2B5EF4-FFF2-40B4-BE49-F238E27FC236}">
+                  <a16:creationId xmlns:a16="http://schemas.microsoft.com/office/drawing/2014/main" id="{29DA323C-53B5-4E41-9047-869B5D52BE60}"/>
+                </a:ext>
+              </a:extLst>
+            </p:cNvPr>
+            <p:cNvSpPr txBox="1"/>
+            <p:nvPr/>
+          </p:nvSpPr>
+          <p:spPr>
+            <a:xfrm>
+              <a:off x="4195894" y="6033083"/>
+              <a:ext cx="687898" cy="461665"/>
+            </a:xfrm>
+            <a:prstGeom prst="rect">
+              <a:avLst/>
+            </a:prstGeom>
+            <a:noFill/>
+          </p:spPr>
+          <p:txBody>
+            <a:bodyPr wrap="square" rtlCol="0">
+              <a:spAutoFit/>
+            </a:bodyPr>
+            <a:lstStyle/>
+            <a:p>
+              <a:r>
+                <a:rPr lang="en-US" sz="2400" dirty="0">
+                  <a:latin typeface="Arial" panose="020B0604020202020204" pitchFamily="34" charset="0"/>
+                  <a:cs typeface="Arial" panose="020B0604020202020204" pitchFamily="34" charset="0"/>
+                </a:rPr>
+                <a:t>C</a:t>
+              </a:r>
+            </a:p>
+          </p:txBody>
+        </p:sp>
+      </p:grpSp>
+    </p:spTree>
+    <p:extLst>
+      <p:ext uri="{BB962C8B-B14F-4D97-AF65-F5344CB8AC3E}">
+        <p14:creationId xmlns:p14="http://schemas.microsoft.com/office/powerpoint/2010/main" val="2608008904"/>
+      </p:ext>
+    </p:extLst>
+  </p:cSld>
+  <p:clrMapOvr>
+    <a:masterClrMapping/>
+  </p:clrMapOvr>
+</p:sld>
+</file>
+
+<file path=ppt/slides/slide6.xml><?xml version="1.0" encoding="utf-8"?>
 <p:sld xmlns:a="http://schemas.openxmlformats.org/drawingml/2006/main" xmlns:r="http://schemas.openxmlformats.org/officeDocument/2006/relationships" xmlns:p="http://schemas.openxmlformats.org/presentationml/2006/main">
   <p:cSld>
     <p:spTree>

</xml_diff>

<commit_message>
phase lag, amp damp, vertical amplitude damping, heatmap plots
</commit_message>
<xml_diff>
--- a/plots/Floodplain_Shade_Figure_Alterations_Updated_Meacham.pptx
+++ b/plots/Floodplain_Shade_Figure_Alterations_Updated_Meacham.pptx
@@ -6,11 +6,19 @@
   </p:sldMasterIdLst>
   <p:sldIdLst>
     <p:sldId id="259" r:id="rId2"/>
-    <p:sldId id="264" r:id="rId3"/>
-    <p:sldId id="265" r:id="rId4"/>
-    <p:sldId id="262" r:id="rId5"/>
-    <p:sldId id="266" r:id="rId6"/>
-    <p:sldId id="260" r:id="rId7"/>
+    <p:sldId id="267" r:id="rId3"/>
+    <p:sldId id="270" r:id="rId4"/>
+    <p:sldId id="264" r:id="rId5"/>
+    <p:sldId id="268" r:id="rId6"/>
+    <p:sldId id="271" r:id="rId7"/>
+    <p:sldId id="265" r:id="rId8"/>
+    <p:sldId id="269" r:id="rId9"/>
+    <p:sldId id="262" r:id="rId10"/>
+    <p:sldId id="266" r:id="rId11"/>
+    <p:sldId id="260" r:id="rId12"/>
+    <p:sldId id="272" r:id="rId13"/>
+    <p:sldId id="273" r:id="rId14"/>
+    <p:sldId id="274" r:id="rId15"/>
   </p:sldIdLst>
   <p:sldSz cx="12192000" cy="6858000"/>
   <p:notesSz cx="6858000" cy="9144000"/>
@@ -246,7 +254,7 @@
           <a:p>
             <a:fld id="{BED1CDFE-13BD-45C0-9142-AC2FC464EE39}" type="datetimeFigureOut">
               <a:rPr lang="en-US" smtClean="0"/>
-              <a:t>2/22/2022</a:t>
+              <a:t>9/20/2022</a:t>
             </a:fld>
             <a:endParaRPr lang="en-US"/>
           </a:p>
@@ -414,7 +422,7 @@
           <a:p>
             <a:fld id="{BED1CDFE-13BD-45C0-9142-AC2FC464EE39}" type="datetimeFigureOut">
               <a:rPr lang="en-US" smtClean="0"/>
-              <a:t>2/22/2022</a:t>
+              <a:t>9/20/2022</a:t>
             </a:fld>
             <a:endParaRPr lang="en-US"/>
           </a:p>
@@ -592,7 +600,7 @@
           <a:p>
             <a:fld id="{BED1CDFE-13BD-45C0-9142-AC2FC464EE39}" type="datetimeFigureOut">
               <a:rPr lang="en-US" smtClean="0"/>
-              <a:t>2/22/2022</a:t>
+              <a:t>9/20/2022</a:t>
             </a:fld>
             <a:endParaRPr lang="en-US"/>
           </a:p>
@@ -760,7 +768,7 @@
           <a:p>
             <a:fld id="{BED1CDFE-13BD-45C0-9142-AC2FC464EE39}" type="datetimeFigureOut">
               <a:rPr lang="en-US" smtClean="0"/>
-              <a:t>2/22/2022</a:t>
+              <a:t>9/20/2022</a:t>
             </a:fld>
             <a:endParaRPr lang="en-US"/>
           </a:p>
@@ -1005,7 +1013,7 @@
           <a:p>
             <a:fld id="{BED1CDFE-13BD-45C0-9142-AC2FC464EE39}" type="datetimeFigureOut">
               <a:rPr lang="en-US" smtClean="0"/>
-              <a:t>2/22/2022</a:t>
+              <a:t>9/20/2022</a:t>
             </a:fld>
             <a:endParaRPr lang="en-US"/>
           </a:p>
@@ -1234,7 +1242,7 @@
           <a:p>
             <a:fld id="{BED1CDFE-13BD-45C0-9142-AC2FC464EE39}" type="datetimeFigureOut">
               <a:rPr lang="en-US" smtClean="0"/>
-              <a:t>2/22/2022</a:t>
+              <a:t>9/20/2022</a:t>
             </a:fld>
             <a:endParaRPr lang="en-US"/>
           </a:p>
@@ -1598,7 +1606,7 @@
           <a:p>
             <a:fld id="{BED1CDFE-13BD-45C0-9142-AC2FC464EE39}" type="datetimeFigureOut">
               <a:rPr lang="en-US" smtClean="0"/>
-              <a:t>2/22/2022</a:t>
+              <a:t>9/20/2022</a:t>
             </a:fld>
             <a:endParaRPr lang="en-US"/>
           </a:p>
@@ -1715,7 +1723,7 @@
           <a:p>
             <a:fld id="{BED1CDFE-13BD-45C0-9142-AC2FC464EE39}" type="datetimeFigureOut">
               <a:rPr lang="en-US" smtClean="0"/>
-              <a:t>2/22/2022</a:t>
+              <a:t>9/20/2022</a:t>
             </a:fld>
             <a:endParaRPr lang="en-US"/>
           </a:p>
@@ -1810,7 +1818,7 @@
           <a:p>
             <a:fld id="{BED1CDFE-13BD-45C0-9142-AC2FC464EE39}" type="datetimeFigureOut">
               <a:rPr lang="en-US" smtClean="0"/>
-              <a:t>2/22/2022</a:t>
+              <a:t>9/20/2022</a:t>
             </a:fld>
             <a:endParaRPr lang="en-US"/>
           </a:p>
@@ -2085,7 +2093,7 @@
           <a:p>
             <a:fld id="{BED1CDFE-13BD-45C0-9142-AC2FC464EE39}" type="datetimeFigureOut">
               <a:rPr lang="en-US" smtClean="0"/>
-              <a:t>2/22/2022</a:t>
+              <a:t>9/20/2022</a:t>
             </a:fld>
             <a:endParaRPr lang="en-US"/>
           </a:p>
@@ -2337,7 +2345,7 @@
           <a:p>
             <a:fld id="{BED1CDFE-13BD-45C0-9142-AC2FC464EE39}" type="datetimeFigureOut">
               <a:rPr lang="en-US" smtClean="0"/>
-              <a:t>2/22/2022</a:t>
+              <a:t>9/20/2022</a:t>
             </a:fld>
             <a:endParaRPr lang="en-US"/>
           </a:p>
@@ -2548,7 +2556,7 @@
           <a:p>
             <a:fld id="{BED1CDFE-13BD-45C0-9142-AC2FC464EE39}" type="datetimeFigureOut">
               <a:rPr lang="en-US" smtClean="0"/>
-              <a:t>2/22/2022</a:t>
+              <a:t>9/20/2022</a:t>
             </a:fld>
             <a:endParaRPr lang="en-US"/>
           </a:p>
@@ -3177,7 +3185,2816 @@
 </p:sld>
 </file>
 
+<file path=ppt/slides/slide10.xml><?xml version="1.0" encoding="utf-8"?>
+<p:sld xmlns:a="http://schemas.openxmlformats.org/drawingml/2006/main" xmlns:r="http://schemas.openxmlformats.org/officeDocument/2006/relationships" xmlns:p="http://schemas.openxmlformats.org/presentationml/2006/main">
+  <p:cSld>
+    <p:spTree>
+      <p:nvGrpSpPr>
+        <p:cNvPr id="1" name=""/>
+        <p:cNvGrpSpPr/>
+        <p:nvPr/>
+      </p:nvGrpSpPr>
+      <p:grpSpPr>
+        <a:xfrm>
+          <a:off x="0" y="0"/>
+          <a:ext cx="0" cy="0"/>
+          <a:chOff x="0" y="0"/>
+          <a:chExt cx="0" cy="0"/>
+        </a:xfrm>
+      </p:grpSpPr>
+      <p:grpSp>
+        <p:nvGrpSpPr>
+          <p:cNvPr id="2" name="Group 1">
+            <a:extLst>
+              <a:ext uri="{FF2B5EF4-FFF2-40B4-BE49-F238E27FC236}">
+                <a16:creationId xmlns:a16="http://schemas.microsoft.com/office/drawing/2014/main" id="{5FF3879D-6838-4C25-9357-41F6547543B9}"/>
+              </a:ext>
+            </a:extLst>
+          </p:cNvPr>
+          <p:cNvGrpSpPr/>
+          <p:nvPr/>
+        </p:nvGrpSpPr>
+        <p:grpSpPr>
+          <a:xfrm>
+            <a:off x="3810000" y="0"/>
+            <a:ext cx="4571999" cy="6857999"/>
+            <a:chOff x="3810000" y="0"/>
+            <a:chExt cx="4571999" cy="6857999"/>
+          </a:xfrm>
+        </p:grpSpPr>
+        <p:pic>
+          <p:nvPicPr>
+            <p:cNvPr id="3" name="Picture 2">
+              <a:extLst>
+                <a:ext uri="{FF2B5EF4-FFF2-40B4-BE49-F238E27FC236}">
+                  <a16:creationId xmlns:a16="http://schemas.microsoft.com/office/drawing/2014/main" id="{F47AFCC6-D94A-4447-A35D-0F1C87D1E538}"/>
+                </a:ext>
+              </a:extLst>
+            </p:cNvPr>
+            <p:cNvPicPr>
+              <a:picLocks noChangeAspect="1"/>
+            </p:cNvPicPr>
+            <p:nvPr/>
+          </p:nvPicPr>
+          <p:blipFill>
+            <a:blip r:embed="rId2" cstate="print">
+              <a:extLst>
+                <a:ext uri="{28A0092B-C50C-407E-A947-70E740481C1C}">
+                  <a14:useLocalDpi xmlns:a14="http://schemas.microsoft.com/office/drawing/2010/main" val="0"/>
+                </a:ext>
+              </a:extLst>
+            </a:blip>
+            <a:srcRect/>
+            <a:stretch/>
+          </p:blipFill>
+          <p:spPr>
+            <a:xfrm>
+              <a:off x="3810000" y="0"/>
+              <a:ext cx="4571999" cy="6857999"/>
+            </a:xfrm>
+            <a:prstGeom prst="rect">
+              <a:avLst/>
+            </a:prstGeom>
+          </p:spPr>
+        </p:pic>
+        <p:sp>
+          <p:nvSpPr>
+            <p:cNvPr id="4" name="TextBox 3">
+              <a:extLst>
+                <a:ext uri="{FF2B5EF4-FFF2-40B4-BE49-F238E27FC236}">
+                  <a16:creationId xmlns:a16="http://schemas.microsoft.com/office/drawing/2014/main" id="{EC38CDEB-62BD-4408-B010-3D0FED8A57E9}"/>
+                </a:ext>
+              </a:extLst>
+            </p:cNvPr>
+            <p:cNvSpPr txBox="1"/>
+            <p:nvPr/>
+          </p:nvSpPr>
+          <p:spPr>
+            <a:xfrm>
+              <a:off x="4195894" y="33556"/>
+              <a:ext cx="687898" cy="461665"/>
+            </a:xfrm>
+            <a:prstGeom prst="rect">
+              <a:avLst/>
+            </a:prstGeom>
+            <a:noFill/>
+          </p:spPr>
+          <p:txBody>
+            <a:bodyPr wrap="square" rtlCol="0">
+              <a:spAutoFit/>
+            </a:bodyPr>
+            <a:lstStyle/>
+            <a:p>
+              <a:r>
+                <a:rPr lang="en-US" sz="2400" dirty="0">
+                  <a:latin typeface="Arial" panose="020B0604020202020204" pitchFamily="34" charset="0"/>
+                  <a:cs typeface="Arial" panose="020B0604020202020204" pitchFamily="34" charset="0"/>
+                </a:rPr>
+                <a:t>A</a:t>
+              </a:r>
+            </a:p>
+          </p:txBody>
+        </p:sp>
+        <p:sp>
+          <p:nvSpPr>
+            <p:cNvPr id="5" name="TextBox 4">
+              <a:extLst>
+                <a:ext uri="{FF2B5EF4-FFF2-40B4-BE49-F238E27FC236}">
+                  <a16:creationId xmlns:a16="http://schemas.microsoft.com/office/drawing/2014/main" id="{8E1851B5-4D3B-474D-85A1-22CDE7C837F6}"/>
+                </a:ext>
+              </a:extLst>
+            </p:cNvPr>
+            <p:cNvSpPr txBox="1"/>
+            <p:nvPr/>
+          </p:nvSpPr>
+          <p:spPr>
+            <a:xfrm>
+              <a:off x="4195894" y="2241259"/>
+              <a:ext cx="687898" cy="461665"/>
+            </a:xfrm>
+            <a:prstGeom prst="rect">
+              <a:avLst/>
+            </a:prstGeom>
+            <a:noFill/>
+          </p:spPr>
+          <p:txBody>
+            <a:bodyPr wrap="square" rtlCol="0">
+              <a:spAutoFit/>
+            </a:bodyPr>
+            <a:lstStyle/>
+            <a:p>
+              <a:r>
+                <a:rPr lang="en-US" sz="2400" dirty="0">
+                  <a:latin typeface="Arial" panose="020B0604020202020204" pitchFamily="34" charset="0"/>
+                  <a:cs typeface="Arial" panose="020B0604020202020204" pitchFamily="34" charset="0"/>
+                </a:rPr>
+                <a:t>B</a:t>
+              </a:r>
+            </a:p>
+          </p:txBody>
+        </p:sp>
+        <p:sp>
+          <p:nvSpPr>
+            <p:cNvPr id="6" name="TextBox 5">
+              <a:extLst>
+                <a:ext uri="{FF2B5EF4-FFF2-40B4-BE49-F238E27FC236}">
+                  <a16:creationId xmlns:a16="http://schemas.microsoft.com/office/drawing/2014/main" id="{29DA323C-53B5-4E41-9047-869B5D52BE60}"/>
+                </a:ext>
+              </a:extLst>
+            </p:cNvPr>
+            <p:cNvSpPr txBox="1"/>
+            <p:nvPr/>
+          </p:nvSpPr>
+          <p:spPr>
+            <a:xfrm>
+              <a:off x="4195894" y="6033083"/>
+              <a:ext cx="687898" cy="461665"/>
+            </a:xfrm>
+            <a:prstGeom prst="rect">
+              <a:avLst/>
+            </a:prstGeom>
+            <a:noFill/>
+          </p:spPr>
+          <p:txBody>
+            <a:bodyPr wrap="square" rtlCol="0">
+              <a:spAutoFit/>
+            </a:bodyPr>
+            <a:lstStyle/>
+            <a:p>
+              <a:r>
+                <a:rPr lang="en-US" sz="2400" dirty="0">
+                  <a:latin typeface="Arial" panose="020B0604020202020204" pitchFamily="34" charset="0"/>
+                  <a:cs typeface="Arial" panose="020B0604020202020204" pitchFamily="34" charset="0"/>
+                </a:rPr>
+                <a:t>C</a:t>
+              </a:r>
+            </a:p>
+          </p:txBody>
+        </p:sp>
+      </p:grpSp>
+    </p:spTree>
+    <p:extLst>
+      <p:ext uri="{BB962C8B-B14F-4D97-AF65-F5344CB8AC3E}">
+        <p14:creationId xmlns:p14="http://schemas.microsoft.com/office/powerpoint/2010/main" val="2608008904"/>
+      </p:ext>
+    </p:extLst>
+  </p:cSld>
+  <p:clrMapOvr>
+    <a:masterClrMapping/>
+  </p:clrMapOvr>
+</p:sld>
+</file>
+
+<file path=ppt/slides/slide11.xml><?xml version="1.0" encoding="utf-8"?>
+<p:sld xmlns:a="http://schemas.openxmlformats.org/drawingml/2006/main" xmlns:r="http://schemas.openxmlformats.org/officeDocument/2006/relationships" xmlns:p="http://schemas.openxmlformats.org/presentationml/2006/main">
+  <p:cSld>
+    <p:spTree>
+      <p:nvGrpSpPr>
+        <p:cNvPr id="1" name=""/>
+        <p:cNvGrpSpPr/>
+        <p:nvPr/>
+      </p:nvGrpSpPr>
+      <p:grpSpPr>
+        <a:xfrm>
+          <a:off x="0" y="0"/>
+          <a:ext cx="0" cy="0"/>
+          <a:chOff x="0" y="0"/>
+          <a:chExt cx="0" cy="0"/>
+        </a:xfrm>
+      </p:grpSpPr>
+      <p:grpSp>
+        <p:nvGrpSpPr>
+          <p:cNvPr id="18" name="Group 17">
+            <a:extLst>
+              <a:ext uri="{FF2B5EF4-FFF2-40B4-BE49-F238E27FC236}">
+                <a16:creationId xmlns:a16="http://schemas.microsoft.com/office/drawing/2014/main" id="{C1ED2B89-92F9-44BA-A8AC-1A7094D49755}"/>
+              </a:ext>
+            </a:extLst>
+          </p:cNvPr>
+          <p:cNvGrpSpPr/>
+          <p:nvPr/>
+        </p:nvGrpSpPr>
+        <p:grpSpPr>
+          <a:xfrm>
+            <a:off x="1320799" y="-469901"/>
+            <a:ext cx="9023351" cy="8014477"/>
+            <a:chOff x="1320799" y="-469901"/>
+            <a:chExt cx="9023351" cy="8014477"/>
+          </a:xfrm>
+        </p:grpSpPr>
+        <p:sp>
+          <p:nvSpPr>
+            <p:cNvPr id="9" name="Rectangle 8">
+              <a:extLst>
+                <a:ext uri="{FF2B5EF4-FFF2-40B4-BE49-F238E27FC236}">
+                  <a16:creationId xmlns:a16="http://schemas.microsoft.com/office/drawing/2014/main" id="{1626C3AA-9AF7-485C-8988-ACB8A122A28E}"/>
+                </a:ext>
+              </a:extLst>
+            </p:cNvPr>
+            <p:cNvSpPr/>
+            <p:nvPr/>
+          </p:nvSpPr>
+          <p:spPr>
+            <a:xfrm>
+              <a:off x="1320799" y="-469901"/>
+              <a:ext cx="8983107" cy="8014477"/>
+            </a:xfrm>
+            <a:prstGeom prst="rect">
+              <a:avLst/>
+            </a:prstGeom>
+            <a:solidFill>
+              <a:schemeClr val="bg1"/>
+            </a:solidFill>
+            <a:ln>
+              <a:solidFill>
+                <a:schemeClr val="bg1"/>
+              </a:solidFill>
+            </a:ln>
+          </p:spPr>
+          <p:style>
+            <a:lnRef idx="2">
+              <a:schemeClr val="accent1">
+                <a:shade val="50000"/>
+              </a:schemeClr>
+            </a:lnRef>
+            <a:fillRef idx="1">
+              <a:schemeClr val="accent1"/>
+            </a:fillRef>
+            <a:effectRef idx="0">
+              <a:schemeClr val="accent1"/>
+            </a:effectRef>
+            <a:fontRef idx="minor">
+              <a:schemeClr val="lt1"/>
+            </a:fontRef>
+          </p:style>
+          <p:txBody>
+            <a:bodyPr rtlCol="0" anchor="ctr"/>
+            <a:lstStyle/>
+            <a:p>
+              <a:pPr algn="ctr"/>
+              <a:endParaRPr lang="en-US"/>
+            </a:p>
+          </p:txBody>
+        </p:sp>
+        <p:pic>
+          <p:nvPicPr>
+            <p:cNvPr id="3" name="Picture 2" descr="Diagram&#10;&#10;Description automatically generated">
+              <a:extLst>
+                <a:ext uri="{FF2B5EF4-FFF2-40B4-BE49-F238E27FC236}">
+                  <a16:creationId xmlns:a16="http://schemas.microsoft.com/office/drawing/2014/main" id="{3F53A78D-9BA4-47CD-82D8-A401A6A1868D}"/>
+                </a:ext>
+              </a:extLst>
+            </p:cNvPr>
+            <p:cNvPicPr>
+              <a:picLocks noChangeAspect="1"/>
+            </p:cNvPicPr>
+            <p:nvPr/>
+          </p:nvPicPr>
+          <p:blipFill>
+            <a:blip r:embed="rId2" cstate="print">
+              <a:extLst>
+                <a:ext uri="{28A0092B-C50C-407E-A947-70E740481C1C}">
+                  <a14:useLocalDpi xmlns:a14="http://schemas.microsoft.com/office/drawing/2010/main" val="0"/>
+                </a:ext>
+              </a:extLst>
+            </a:blip>
+            <a:stretch>
+              <a:fillRect/>
+            </a:stretch>
+          </p:blipFill>
+          <p:spPr>
+            <a:xfrm>
+              <a:off x="2257425" y="0"/>
+              <a:ext cx="4114800" cy="6858000"/>
+            </a:xfrm>
+            <a:prstGeom prst="rect">
+              <a:avLst/>
+            </a:prstGeom>
+          </p:spPr>
+        </p:pic>
+        <p:pic>
+          <p:nvPicPr>
+            <p:cNvPr id="7" name="Picture 6" descr="Diagram&#10;&#10;Description automatically generated">
+              <a:extLst>
+                <a:ext uri="{FF2B5EF4-FFF2-40B4-BE49-F238E27FC236}">
+                  <a16:creationId xmlns:a16="http://schemas.microsoft.com/office/drawing/2014/main" id="{C0BB7B0F-C905-4014-8989-923163F8F858}"/>
+                </a:ext>
+              </a:extLst>
+            </p:cNvPr>
+            <p:cNvPicPr>
+              <a:picLocks noChangeAspect="1"/>
+            </p:cNvPicPr>
+            <p:nvPr/>
+          </p:nvPicPr>
+          <p:blipFill rotWithShape="1">
+            <a:blip r:embed="rId3" cstate="print">
+              <a:extLst>
+                <a:ext uri="{28A0092B-C50C-407E-A947-70E740481C1C}">
+                  <a14:useLocalDpi xmlns:a14="http://schemas.microsoft.com/office/drawing/2010/main" val="0"/>
+                </a:ext>
+              </a:extLst>
+            </a:blip>
+            <a:srcRect r="13656"/>
+            <a:stretch/>
+          </p:blipFill>
+          <p:spPr>
+            <a:xfrm>
+              <a:off x="5819775" y="0"/>
+              <a:ext cx="3552825" cy="6858000"/>
+            </a:xfrm>
+            <a:prstGeom prst="rect">
+              <a:avLst/>
+            </a:prstGeom>
+          </p:spPr>
+        </p:pic>
+        <p:pic>
+          <p:nvPicPr>
+            <p:cNvPr id="8" name="Picture 7" descr="Diagram&#10;&#10;Description automatically generated">
+              <a:extLst>
+                <a:ext uri="{FF2B5EF4-FFF2-40B4-BE49-F238E27FC236}">
+                  <a16:creationId xmlns:a16="http://schemas.microsoft.com/office/drawing/2014/main" id="{507CB07C-636A-4DEF-BE34-19E7DB510B62}"/>
+                </a:ext>
+              </a:extLst>
+            </p:cNvPr>
+            <p:cNvPicPr>
+              <a:picLocks noChangeAspect="1"/>
+            </p:cNvPicPr>
+            <p:nvPr/>
+          </p:nvPicPr>
+          <p:blipFill rotWithShape="1">
+            <a:blip r:embed="rId3" cstate="print">
+              <a:extLst>
+                <a:ext uri="{28A0092B-C50C-407E-A947-70E740481C1C}">
+                  <a14:useLocalDpi xmlns:a14="http://schemas.microsoft.com/office/drawing/2010/main" val="0"/>
+                </a:ext>
+              </a:extLst>
+            </a:blip>
+            <a:srcRect l="88349" t="55357" r="1829" b="32047"/>
+            <a:stretch/>
+          </p:blipFill>
+          <p:spPr>
+            <a:xfrm>
+              <a:off x="9372600" y="2390775"/>
+              <a:ext cx="971550" cy="2076450"/>
+            </a:xfrm>
+            <a:prstGeom prst="rect">
+              <a:avLst/>
+            </a:prstGeom>
+          </p:spPr>
+        </p:pic>
+        <p:sp>
+          <p:nvSpPr>
+            <p:cNvPr id="10" name="TextBox 9">
+              <a:extLst>
+                <a:ext uri="{FF2B5EF4-FFF2-40B4-BE49-F238E27FC236}">
+                  <a16:creationId xmlns:a16="http://schemas.microsoft.com/office/drawing/2014/main" id="{3487A1EE-F285-49B3-8B4E-B2FD798FFC36}"/>
+                </a:ext>
+              </a:extLst>
+            </p:cNvPr>
+            <p:cNvSpPr txBox="1"/>
+            <p:nvPr/>
+          </p:nvSpPr>
+          <p:spPr>
+            <a:xfrm>
+              <a:off x="3382963" y="-369332"/>
+              <a:ext cx="1397000" cy="369332"/>
+            </a:xfrm>
+            <a:prstGeom prst="rect">
+              <a:avLst/>
+            </a:prstGeom>
+            <a:noFill/>
+          </p:spPr>
+          <p:txBody>
+            <a:bodyPr wrap="square" rtlCol="0">
+              <a:spAutoFit/>
+            </a:bodyPr>
+            <a:lstStyle/>
+            <a:p>
+              <a:pPr algn="ctr"/>
+              <a:r>
+                <a:rPr lang="en-US" b="1" dirty="0">
+                  <a:latin typeface="Arial" panose="020B0604020202020204" pitchFamily="34" charset="0"/>
+                  <a:cs typeface="Arial" panose="020B0604020202020204" pitchFamily="34" charset="0"/>
+                </a:rPr>
+                <a:t>Shady</a:t>
+              </a:r>
+            </a:p>
+          </p:txBody>
+        </p:sp>
+        <p:sp>
+          <p:nvSpPr>
+            <p:cNvPr id="11" name="TextBox 10">
+              <a:extLst>
+                <a:ext uri="{FF2B5EF4-FFF2-40B4-BE49-F238E27FC236}">
+                  <a16:creationId xmlns:a16="http://schemas.microsoft.com/office/drawing/2014/main" id="{DE92B544-8409-4FB0-A8AE-CE76102E2AD6}"/>
+                </a:ext>
+              </a:extLst>
+            </p:cNvPr>
+            <p:cNvSpPr txBox="1"/>
+            <p:nvPr/>
+          </p:nvSpPr>
+          <p:spPr>
+            <a:xfrm>
+              <a:off x="7054850" y="-369332"/>
+              <a:ext cx="1397000" cy="369332"/>
+            </a:xfrm>
+            <a:prstGeom prst="rect">
+              <a:avLst/>
+            </a:prstGeom>
+            <a:noFill/>
+          </p:spPr>
+          <p:txBody>
+            <a:bodyPr wrap="square" rtlCol="0">
+              <a:spAutoFit/>
+            </a:bodyPr>
+            <a:lstStyle/>
+            <a:p>
+              <a:pPr algn="ctr"/>
+              <a:r>
+                <a:rPr lang="en-US" b="1" dirty="0">
+                  <a:latin typeface="Arial" panose="020B0604020202020204" pitchFamily="34" charset="0"/>
+                  <a:cs typeface="Arial" panose="020B0604020202020204" pitchFamily="34" charset="0"/>
+                </a:rPr>
+                <a:t>Sunny</a:t>
+              </a:r>
+            </a:p>
+          </p:txBody>
+        </p:sp>
+        <p:sp>
+          <p:nvSpPr>
+            <p:cNvPr id="12" name="TextBox 11">
+              <a:extLst>
+                <a:ext uri="{FF2B5EF4-FFF2-40B4-BE49-F238E27FC236}">
+                  <a16:creationId xmlns:a16="http://schemas.microsoft.com/office/drawing/2014/main" id="{755851BA-5920-4225-93C6-CC2F15709755}"/>
+                </a:ext>
+              </a:extLst>
+            </p:cNvPr>
+            <p:cNvSpPr txBox="1"/>
+            <p:nvPr/>
+          </p:nvSpPr>
+          <p:spPr>
+            <a:xfrm rot="16200000">
+              <a:off x="948274" y="3244333"/>
+              <a:ext cx="2248971" cy="369332"/>
+            </a:xfrm>
+            <a:prstGeom prst="rect">
+              <a:avLst/>
+            </a:prstGeom>
+            <a:noFill/>
+          </p:spPr>
+          <p:txBody>
+            <a:bodyPr wrap="square" rtlCol="0">
+              <a:spAutoFit/>
+            </a:bodyPr>
+            <a:lstStyle/>
+            <a:p>
+              <a:pPr algn="ctr"/>
+              <a:r>
+                <a:rPr lang="en-US" dirty="0">
+                  <a:latin typeface="Arial" panose="020B0604020202020204" pitchFamily="34" charset="0"/>
+                  <a:cs typeface="Arial" panose="020B0604020202020204" pitchFamily="34" charset="0"/>
+                </a:rPr>
+                <a:t>Month</a:t>
+              </a:r>
+            </a:p>
+          </p:txBody>
+        </p:sp>
+        <p:sp>
+          <p:nvSpPr>
+            <p:cNvPr id="13" name="TextBox 12">
+              <a:extLst>
+                <a:ext uri="{FF2B5EF4-FFF2-40B4-BE49-F238E27FC236}">
+                  <a16:creationId xmlns:a16="http://schemas.microsoft.com/office/drawing/2014/main" id="{27808283-F1E9-4EFE-936A-37CABF787841}"/>
+                </a:ext>
+              </a:extLst>
+            </p:cNvPr>
+            <p:cNvSpPr txBox="1"/>
+            <p:nvPr/>
+          </p:nvSpPr>
+          <p:spPr>
+            <a:xfrm>
+              <a:off x="4194174" y="7010400"/>
+              <a:ext cx="3552825" cy="369332"/>
+            </a:xfrm>
+            <a:prstGeom prst="rect">
+              <a:avLst/>
+            </a:prstGeom>
+            <a:noFill/>
+          </p:spPr>
+          <p:txBody>
+            <a:bodyPr wrap="square" rtlCol="0">
+              <a:spAutoFit/>
+            </a:bodyPr>
+            <a:lstStyle/>
+            <a:p>
+              <a:pPr algn="ctr"/>
+              <a:r>
+                <a:rPr lang="en-US" dirty="0">
+                  <a:latin typeface="Arial" panose="020B0604020202020204" pitchFamily="34" charset="0"/>
+                  <a:cs typeface="Arial" panose="020B0604020202020204" pitchFamily="34" charset="0"/>
+                </a:rPr>
+                <a:t>Flow Path Length (m)</a:t>
+              </a:r>
+            </a:p>
+          </p:txBody>
+        </p:sp>
+        <p:sp>
+          <p:nvSpPr>
+            <p:cNvPr id="14" name="TextBox 13">
+              <a:extLst>
+                <a:ext uri="{FF2B5EF4-FFF2-40B4-BE49-F238E27FC236}">
+                  <a16:creationId xmlns:a16="http://schemas.microsoft.com/office/drawing/2014/main" id="{94AA4BCC-7890-400D-82B4-01B18A7B2663}"/>
+                </a:ext>
+              </a:extLst>
+            </p:cNvPr>
+            <p:cNvSpPr txBox="1"/>
+            <p:nvPr/>
+          </p:nvSpPr>
+          <p:spPr>
+            <a:xfrm rot="16200000">
+              <a:off x="971570" y="561191"/>
+              <a:ext cx="1397000" cy="369332"/>
+            </a:xfrm>
+            <a:prstGeom prst="rect">
+              <a:avLst/>
+            </a:prstGeom>
+            <a:noFill/>
+          </p:spPr>
+          <p:txBody>
+            <a:bodyPr wrap="square" rtlCol="0">
+              <a:spAutoFit/>
+            </a:bodyPr>
+            <a:lstStyle/>
+            <a:p>
+              <a:pPr algn="ctr"/>
+              <a:r>
+                <a:rPr lang="en-US" b="1" dirty="0">
+                  <a:latin typeface="Arial" panose="020B0604020202020204" pitchFamily="34" charset="0"/>
+                  <a:cs typeface="Arial" panose="020B0604020202020204" pitchFamily="34" charset="0"/>
+                </a:rPr>
+                <a:t>0.5m</a:t>
+              </a:r>
+            </a:p>
+          </p:txBody>
+        </p:sp>
+        <p:sp>
+          <p:nvSpPr>
+            <p:cNvPr id="15" name="TextBox 14">
+              <a:extLst>
+                <a:ext uri="{FF2B5EF4-FFF2-40B4-BE49-F238E27FC236}">
+                  <a16:creationId xmlns:a16="http://schemas.microsoft.com/office/drawing/2014/main" id="{0164D2DE-3B95-43B4-BF48-38987ACA3CD9}"/>
+                </a:ext>
+              </a:extLst>
+            </p:cNvPr>
+            <p:cNvSpPr txBox="1"/>
+            <p:nvPr/>
+          </p:nvSpPr>
+          <p:spPr>
+            <a:xfrm rot="16200000">
+              <a:off x="971569" y="2271451"/>
+              <a:ext cx="1397000" cy="369332"/>
+            </a:xfrm>
+            <a:prstGeom prst="rect">
+              <a:avLst/>
+            </a:prstGeom>
+            <a:noFill/>
+          </p:spPr>
+          <p:txBody>
+            <a:bodyPr wrap="square" rtlCol="0">
+              <a:spAutoFit/>
+            </a:bodyPr>
+            <a:lstStyle/>
+            <a:p>
+              <a:pPr algn="ctr"/>
+              <a:r>
+                <a:rPr lang="en-US" b="1" dirty="0">
+                  <a:latin typeface="Arial" panose="020B0604020202020204" pitchFamily="34" charset="0"/>
+                  <a:cs typeface="Arial" panose="020B0604020202020204" pitchFamily="34" charset="0"/>
+                </a:rPr>
+                <a:t>1.0m</a:t>
+              </a:r>
+            </a:p>
+          </p:txBody>
+        </p:sp>
+        <p:sp>
+          <p:nvSpPr>
+            <p:cNvPr id="16" name="TextBox 15">
+              <a:extLst>
+                <a:ext uri="{FF2B5EF4-FFF2-40B4-BE49-F238E27FC236}">
+                  <a16:creationId xmlns:a16="http://schemas.microsoft.com/office/drawing/2014/main" id="{F61CAEAD-AA8E-4570-8D33-6E21ADFA907E}"/>
+                </a:ext>
+              </a:extLst>
+            </p:cNvPr>
+            <p:cNvSpPr txBox="1"/>
+            <p:nvPr/>
+          </p:nvSpPr>
+          <p:spPr>
+            <a:xfrm rot="16200000">
+              <a:off x="971569" y="3981711"/>
+              <a:ext cx="1397000" cy="369332"/>
+            </a:xfrm>
+            <a:prstGeom prst="rect">
+              <a:avLst/>
+            </a:prstGeom>
+            <a:noFill/>
+          </p:spPr>
+          <p:txBody>
+            <a:bodyPr wrap="square" rtlCol="0">
+              <a:spAutoFit/>
+            </a:bodyPr>
+            <a:lstStyle/>
+            <a:p>
+              <a:pPr algn="ctr"/>
+              <a:r>
+                <a:rPr lang="en-US" b="1" dirty="0">
+                  <a:latin typeface="Arial" panose="020B0604020202020204" pitchFamily="34" charset="0"/>
+                  <a:cs typeface="Arial" panose="020B0604020202020204" pitchFamily="34" charset="0"/>
+                </a:rPr>
+                <a:t>2.0m</a:t>
+              </a:r>
+            </a:p>
+          </p:txBody>
+        </p:sp>
+        <p:sp>
+          <p:nvSpPr>
+            <p:cNvPr id="17" name="TextBox 16">
+              <a:extLst>
+                <a:ext uri="{FF2B5EF4-FFF2-40B4-BE49-F238E27FC236}">
+                  <a16:creationId xmlns:a16="http://schemas.microsoft.com/office/drawing/2014/main" id="{16F1DA68-963E-4AAB-A78D-1E4DEFFFF351}"/>
+                </a:ext>
+              </a:extLst>
+            </p:cNvPr>
+            <p:cNvSpPr txBox="1"/>
+            <p:nvPr/>
+          </p:nvSpPr>
+          <p:spPr>
+            <a:xfrm rot="16200000">
+              <a:off x="971569" y="5691970"/>
+              <a:ext cx="1397000" cy="369332"/>
+            </a:xfrm>
+            <a:prstGeom prst="rect">
+              <a:avLst/>
+            </a:prstGeom>
+            <a:noFill/>
+          </p:spPr>
+          <p:txBody>
+            <a:bodyPr wrap="square" rtlCol="0">
+              <a:spAutoFit/>
+            </a:bodyPr>
+            <a:lstStyle/>
+            <a:p>
+              <a:pPr algn="ctr"/>
+              <a:r>
+                <a:rPr lang="en-US" b="1" dirty="0">
+                  <a:latin typeface="Arial" panose="020B0604020202020204" pitchFamily="34" charset="0"/>
+                  <a:cs typeface="Arial" panose="020B0604020202020204" pitchFamily="34" charset="0"/>
+                </a:rPr>
+                <a:t>3.0m</a:t>
+              </a:r>
+            </a:p>
+          </p:txBody>
+        </p:sp>
+      </p:grpSp>
+    </p:spTree>
+    <p:extLst>
+      <p:ext uri="{BB962C8B-B14F-4D97-AF65-F5344CB8AC3E}">
+        <p14:creationId xmlns:p14="http://schemas.microsoft.com/office/powerpoint/2010/main" val="1253127586"/>
+      </p:ext>
+    </p:extLst>
+  </p:cSld>
+  <p:clrMapOvr>
+    <a:masterClrMapping/>
+  </p:clrMapOvr>
+</p:sld>
+</file>
+
+<file path=ppt/slides/slide12.xml><?xml version="1.0" encoding="utf-8"?>
+<p:sld xmlns:a="http://schemas.openxmlformats.org/drawingml/2006/main" xmlns:r="http://schemas.openxmlformats.org/officeDocument/2006/relationships" xmlns:p="http://schemas.openxmlformats.org/presentationml/2006/main">
+  <p:cSld>
+    <p:spTree>
+      <p:nvGrpSpPr>
+        <p:cNvPr id="1" name=""/>
+        <p:cNvGrpSpPr/>
+        <p:nvPr/>
+      </p:nvGrpSpPr>
+      <p:grpSpPr>
+        <a:xfrm>
+          <a:off x="0" y="0"/>
+          <a:ext cx="0" cy="0"/>
+          <a:chOff x="0" y="0"/>
+          <a:chExt cx="0" cy="0"/>
+        </a:xfrm>
+      </p:grpSpPr>
+      <p:grpSp>
+        <p:nvGrpSpPr>
+          <p:cNvPr id="18" name="Group 17">
+            <a:extLst>
+              <a:ext uri="{FF2B5EF4-FFF2-40B4-BE49-F238E27FC236}">
+                <a16:creationId xmlns:a16="http://schemas.microsoft.com/office/drawing/2014/main" id="{C1ED2B89-92F9-44BA-A8AC-1A7094D49755}"/>
+              </a:ext>
+            </a:extLst>
+          </p:cNvPr>
+          <p:cNvGrpSpPr/>
+          <p:nvPr/>
+        </p:nvGrpSpPr>
+        <p:grpSpPr>
+          <a:xfrm>
+            <a:off x="1320799" y="-469901"/>
+            <a:ext cx="9023351" cy="8014477"/>
+            <a:chOff x="1320799" y="-469901"/>
+            <a:chExt cx="9023351" cy="8014477"/>
+          </a:xfrm>
+        </p:grpSpPr>
+        <p:sp>
+          <p:nvSpPr>
+            <p:cNvPr id="9" name="Rectangle 8">
+              <a:extLst>
+                <a:ext uri="{FF2B5EF4-FFF2-40B4-BE49-F238E27FC236}">
+                  <a16:creationId xmlns:a16="http://schemas.microsoft.com/office/drawing/2014/main" id="{1626C3AA-9AF7-485C-8988-ACB8A122A28E}"/>
+                </a:ext>
+              </a:extLst>
+            </p:cNvPr>
+            <p:cNvSpPr/>
+            <p:nvPr/>
+          </p:nvSpPr>
+          <p:spPr>
+            <a:xfrm>
+              <a:off x="1320799" y="-469901"/>
+              <a:ext cx="8983107" cy="8014477"/>
+            </a:xfrm>
+            <a:prstGeom prst="rect">
+              <a:avLst/>
+            </a:prstGeom>
+            <a:solidFill>
+              <a:schemeClr val="bg1"/>
+            </a:solidFill>
+            <a:ln>
+              <a:solidFill>
+                <a:schemeClr val="bg1"/>
+              </a:solidFill>
+            </a:ln>
+          </p:spPr>
+          <p:style>
+            <a:lnRef idx="2">
+              <a:schemeClr val="accent1">
+                <a:shade val="50000"/>
+              </a:schemeClr>
+            </a:lnRef>
+            <a:fillRef idx="1">
+              <a:schemeClr val="accent1"/>
+            </a:fillRef>
+            <a:effectRef idx="0">
+              <a:schemeClr val="accent1"/>
+            </a:effectRef>
+            <a:fontRef idx="minor">
+              <a:schemeClr val="lt1"/>
+            </a:fontRef>
+          </p:style>
+          <p:txBody>
+            <a:bodyPr rtlCol="0" anchor="ctr"/>
+            <a:lstStyle/>
+            <a:p>
+              <a:pPr algn="ctr"/>
+              <a:endParaRPr lang="en-US"/>
+            </a:p>
+          </p:txBody>
+        </p:sp>
+        <p:pic>
+          <p:nvPicPr>
+            <p:cNvPr id="3" name="Picture 2">
+              <a:extLst>
+                <a:ext uri="{FF2B5EF4-FFF2-40B4-BE49-F238E27FC236}">
+                  <a16:creationId xmlns:a16="http://schemas.microsoft.com/office/drawing/2014/main" id="{3F53A78D-9BA4-47CD-82D8-A401A6A1868D}"/>
+                </a:ext>
+              </a:extLst>
+            </p:cNvPr>
+            <p:cNvPicPr>
+              <a:picLocks noChangeAspect="1"/>
+            </p:cNvPicPr>
+            <p:nvPr/>
+          </p:nvPicPr>
+          <p:blipFill>
+            <a:blip r:embed="rId2" cstate="print">
+              <a:extLst>
+                <a:ext uri="{28A0092B-C50C-407E-A947-70E740481C1C}">
+                  <a14:useLocalDpi xmlns:a14="http://schemas.microsoft.com/office/drawing/2010/main" val="0"/>
+                </a:ext>
+              </a:extLst>
+            </a:blip>
+            <a:srcRect/>
+            <a:stretch/>
+          </p:blipFill>
+          <p:spPr>
+            <a:xfrm>
+              <a:off x="2257425" y="0"/>
+              <a:ext cx="4114800" cy="6858000"/>
+            </a:xfrm>
+            <a:prstGeom prst="rect">
+              <a:avLst/>
+            </a:prstGeom>
+          </p:spPr>
+        </p:pic>
+        <p:pic>
+          <p:nvPicPr>
+            <p:cNvPr id="7" name="Picture 6">
+              <a:extLst>
+                <a:ext uri="{FF2B5EF4-FFF2-40B4-BE49-F238E27FC236}">
+                  <a16:creationId xmlns:a16="http://schemas.microsoft.com/office/drawing/2014/main" id="{C0BB7B0F-C905-4014-8989-923163F8F858}"/>
+                </a:ext>
+              </a:extLst>
+            </p:cNvPr>
+            <p:cNvPicPr>
+              <a:picLocks noChangeAspect="1"/>
+            </p:cNvPicPr>
+            <p:nvPr/>
+          </p:nvPicPr>
+          <p:blipFill rotWithShape="1">
+            <a:blip r:embed="rId3" cstate="print">
+              <a:extLst>
+                <a:ext uri="{28A0092B-C50C-407E-A947-70E740481C1C}">
+                  <a14:useLocalDpi xmlns:a14="http://schemas.microsoft.com/office/drawing/2010/main" val="0"/>
+                </a:ext>
+              </a:extLst>
+            </a:blip>
+            <a:srcRect r="13658"/>
+            <a:stretch/>
+          </p:blipFill>
+          <p:spPr>
+            <a:xfrm>
+              <a:off x="5819775" y="0"/>
+              <a:ext cx="3552825" cy="6858000"/>
+            </a:xfrm>
+            <a:prstGeom prst="rect">
+              <a:avLst/>
+            </a:prstGeom>
+          </p:spPr>
+        </p:pic>
+        <p:pic>
+          <p:nvPicPr>
+            <p:cNvPr id="8" name="Picture 7" descr="Diagram&#10;&#10;Description automatically generated">
+              <a:extLst>
+                <a:ext uri="{FF2B5EF4-FFF2-40B4-BE49-F238E27FC236}">
+                  <a16:creationId xmlns:a16="http://schemas.microsoft.com/office/drawing/2014/main" id="{507CB07C-636A-4DEF-BE34-19E7DB510B62}"/>
+                </a:ext>
+              </a:extLst>
+            </p:cNvPr>
+            <p:cNvPicPr>
+              <a:picLocks noChangeAspect="1"/>
+            </p:cNvPicPr>
+            <p:nvPr/>
+          </p:nvPicPr>
+          <p:blipFill rotWithShape="1">
+            <a:blip r:embed="rId4" cstate="print">
+              <a:extLst>
+                <a:ext uri="{28A0092B-C50C-407E-A947-70E740481C1C}">
+                  <a14:useLocalDpi xmlns:a14="http://schemas.microsoft.com/office/drawing/2010/main" val="0"/>
+                </a:ext>
+              </a:extLst>
+            </a:blip>
+            <a:srcRect l="88349" t="55357" r="1829" b="32047"/>
+            <a:stretch/>
+          </p:blipFill>
+          <p:spPr>
+            <a:xfrm>
+              <a:off x="9372600" y="2390775"/>
+              <a:ext cx="971550" cy="2076450"/>
+            </a:xfrm>
+            <a:prstGeom prst="rect">
+              <a:avLst/>
+            </a:prstGeom>
+          </p:spPr>
+        </p:pic>
+        <p:sp>
+          <p:nvSpPr>
+            <p:cNvPr id="10" name="TextBox 9">
+              <a:extLst>
+                <a:ext uri="{FF2B5EF4-FFF2-40B4-BE49-F238E27FC236}">
+                  <a16:creationId xmlns:a16="http://schemas.microsoft.com/office/drawing/2014/main" id="{3487A1EE-F285-49B3-8B4E-B2FD798FFC36}"/>
+                </a:ext>
+              </a:extLst>
+            </p:cNvPr>
+            <p:cNvSpPr txBox="1"/>
+            <p:nvPr/>
+          </p:nvSpPr>
+          <p:spPr>
+            <a:xfrm>
+              <a:off x="3382963" y="-369332"/>
+              <a:ext cx="1397000" cy="369332"/>
+            </a:xfrm>
+            <a:prstGeom prst="rect">
+              <a:avLst/>
+            </a:prstGeom>
+            <a:noFill/>
+          </p:spPr>
+          <p:txBody>
+            <a:bodyPr wrap="square" rtlCol="0">
+              <a:spAutoFit/>
+            </a:bodyPr>
+            <a:lstStyle/>
+            <a:p>
+              <a:pPr algn="ctr"/>
+              <a:r>
+                <a:rPr lang="en-US" b="1" dirty="0">
+                  <a:latin typeface="Arial" panose="020B0604020202020204" pitchFamily="34" charset="0"/>
+                  <a:cs typeface="Arial" panose="020B0604020202020204" pitchFamily="34" charset="0"/>
+                </a:rPr>
+                <a:t>Shady</a:t>
+              </a:r>
+            </a:p>
+          </p:txBody>
+        </p:sp>
+        <p:sp>
+          <p:nvSpPr>
+            <p:cNvPr id="11" name="TextBox 10">
+              <a:extLst>
+                <a:ext uri="{FF2B5EF4-FFF2-40B4-BE49-F238E27FC236}">
+                  <a16:creationId xmlns:a16="http://schemas.microsoft.com/office/drawing/2014/main" id="{DE92B544-8409-4FB0-A8AE-CE76102E2AD6}"/>
+                </a:ext>
+              </a:extLst>
+            </p:cNvPr>
+            <p:cNvSpPr txBox="1"/>
+            <p:nvPr/>
+          </p:nvSpPr>
+          <p:spPr>
+            <a:xfrm>
+              <a:off x="7054850" y="-369332"/>
+              <a:ext cx="1397000" cy="369332"/>
+            </a:xfrm>
+            <a:prstGeom prst="rect">
+              <a:avLst/>
+            </a:prstGeom>
+            <a:noFill/>
+          </p:spPr>
+          <p:txBody>
+            <a:bodyPr wrap="square" rtlCol="0">
+              <a:spAutoFit/>
+            </a:bodyPr>
+            <a:lstStyle/>
+            <a:p>
+              <a:pPr algn="ctr"/>
+              <a:r>
+                <a:rPr lang="en-US" b="1" dirty="0">
+                  <a:latin typeface="Arial" panose="020B0604020202020204" pitchFamily="34" charset="0"/>
+                  <a:cs typeface="Arial" panose="020B0604020202020204" pitchFamily="34" charset="0"/>
+                </a:rPr>
+                <a:t>Sunny</a:t>
+              </a:r>
+            </a:p>
+          </p:txBody>
+        </p:sp>
+        <p:sp>
+          <p:nvSpPr>
+            <p:cNvPr id="12" name="TextBox 11">
+              <a:extLst>
+                <a:ext uri="{FF2B5EF4-FFF2-40B4-BE49-F238E27FC236}">
+                  <a16:creationId xmlns:a16="http://schemas.microsoft.com/office/drawing/2014/main" id="{755851BA-5920-4225-93C6-CC2F15709755}"/>
+                </a:ext>
+              </a:extLst>
+            </p:cNvPr>
+            <p:cNvSpPr txBox="1"/>
+            <p:nvPr/>
+          </p:nvSpPr>
+          <p:spPr>
+            <a:xfrm rot="16200000">
+              <a:off x="948274" y="3244333"/>
+              <a:ext cx="2248971" cy="369332"/>
+            </a:xfrm>
+            <a:prstGeom prst="rect">
+              <a:avLst/>
+            </a:prstGeom>
+            <a:noFill/>
+          </p:spPr>
+          <p:txBody>
+            <a:bodyPr wrap="square" rtlCol="0">
+              <a:spAutoFit/>
+            </a:bodyPr>
+            <a:lstStyle/>
+            <a:p>
+              <a:pPr algn="ctr"/>
+              <a:r>
+                <a:rPr lang="en-US" dirty="0">
+                  <a:latin typeface="Arial" panose="020B0604020202020204" pitchFamily="34" charset="0"/>
+                  <a:cs typeface="Arial" panose="020B0604020202020204" pitchFamily="34" charset="0"/>
+                </a:rPr>
+                <a:t>Month</a:t>
+              </a:r>
+            </a:p>
+          </p:txBody>
+        </p:sp>
+        <p:sp>
+          <p:nvSpPr>
+            <p:cNvPr id="13" name="TextBox 12">
+              <a:extLst>
+                <a:ext uri="{FF2B5EF4-FFF2-40B4-BE49-F238E27FC236}">
+                  <a16:creationId xmlns:a16="http://schemas.microsoft.com/office/drawing/2014/main" id="{27808283-F1E9-4EFE-936A-37CABF787841}"/>
+                </a:ext>
+              </a:extLst>
+            </p:cNvPr>
+            <p:cNvSpPr txBox="1"/>
+            <p:nvPr/>
+          </p:nvSpPr>
+          <p:spPr>
+            <a:xfrm>
+              <a:off x="4194174" y="7010400"/>
+              <a:ext cx="3552825" cy="369332"/>
+            </a:xfrm>
+            <a:prstGeom prst="rect">
+              <a:avLst/>
+            </a:prstGeom>
+            <a:noFill/>
+          </p:spPr>
+          <p:txBody>
+            <a:bodyPr wrap="square" rtlCol="0">
+              <a:spAutoFit/>
+            </a:bodyPr>
+            <a:lstStyle/>
+            <a:p>
+              <a:pPr algn="ctr"/>
+              <a:r>
+                <a:rPr lang="en-US" dirty="0">
+                  <a:latin typeface="Arial" panose="020B0604020202020204" pitchFamily="34" charset="0"/>
+                  <a:cs typeface="Arial" panose="020B0604020202020204" pitchFamily="34" charset="0"/>
+                </a:rPr>
+                <a:t>Flow Path Length (m)</a:t>
+              </a:r>
+            </a:p>
+          </p:txBody>
+        </p:sp>
+        <p:sp>
+          <p:nvSpPr>
+            <p:cNvPr id="14" name="TextBox 13">
+              <a:extLst>
+                <a:ext uri="{FF2B5EF4-FFF2-40B4-BE49-F238E27FC236}">
+                  <a16:creationId xmlns:a16="http://schemas.microsoft.com/office/drawing/2014/main" id="{94AA4BCC-7890-400D-82B4-01B18A7B2663}"/>
+                </a:ext>
+              </a:extLst>
+            </p:cNvPr>
+            <p:cNvSpPr txBox="1"/>
+            <p:nvPr/>
+          </p:nvSpPr>
+          <p:spPr>
+            <a:xfrm rot="16200000">
+              <a:off x="971570" y="561191"/>
+              <a:ext cx="1397000" cy="369332"/>
+            </a:xfrm>
+            <a:prstGeom prst="rect">
+              <a:avLst/>
+            </a:prstGeom>
+            <a:noFill/>
+          </p:spPr>
+          <p:txBody>
+            <a:bodyPr wrap="square" rtlCol="0">
+              <a:spAutoFit/>
+            </a:bodyPr>
+            <a:lstStyle/>
+            <a:p>
+              <a:pPr algn="ctr"/>
+              <a:r>
+                <a:rPr lang="en-US" b="1" dirty="0">
+                  <a:latin typeface="Arial" panose="020B0604020202020204" pitchFamily="34" charset="0"/>
+                  <a:cs typeface="Arial" panose="020B0604020202020204" pitchFamily="34" charset="0"/>
+                </a:rPr>
+                <a:t>0.5m</a:t>
+              </a:r>
+            </a:p>
+          </p:txBody>
+        </p:sp>
+        <p:sp>
+          <p:nvSpPr>
+            <p:cNvPr id="15" name="TextBox 14">
+              <a:extLst>
+                <a:ext uri="{FF2B5EF4-FFF2-40B4-BE49-F238E27FC236}">
+                  <a16:creationId xmlns:a16="http://schemas.microsoft.com/office/drawing/2014/main" id="{0164D2DE-3B95-43B4-BF48-38987ACA3CD9}"/>
+                </a:ext>
+              </a:extLst>
+            </p:cNvPr>
+            <p:cNvSpPr txBox="1"/>
+            <p:nvPr/>
+          </p:nvSpPr>
+          <p:spPr>
+            <a:xfrm rot="16200000">
+              <a:off x="971569" y="2271451"/>
+              <a:ext cx="1397000" cy="369332"/>
+            </a:xfrm>
+            <a:prstGeom prst="rect">
+              <a:avLst/>
+            </a:prstGeom>
+            <a:noFill/>
+          </p:spPr>
+          <p:txBody>
+            <a:bodyPr wrap="square" rtlCol="0">
+              <a:spAutoFit/>
+            </a:bodyPr>
+            <a:lstStyle/>
+            <a:p>
+              <a:pPr algn="ctr"/>
+              <a:r>
+                <a:rPr lang="en-US" b="1" dirty="0">
+                  <a:latin typeface="Arial" panose="020B0604020202020204" pitchFamily="34" charset="0"/>
+                  <a:cs typeface="Arial" panose="020B0604020202020204" pitchFamily="34" charset="0"/>
+                </a:rPr>
+                <a:t>1.0m</a:t>
+              </a:r>
+            </a:p>
+          </p:txBody>
+        </p:sp>
+        <p:sp>
+          <p:nvSpPr>
+            <p:cNvPr id="16" name="TextBox 15">
+              <a:extLst>
+                <a:ext uri="{FF2B5EF4-FFF2-40B4-BE49-F238E27FC236}">
+                  <a16:creationId xmlns:a16="http://schemas.microsoft.com/office/drawing/2014/main" id="{F61CAEAD-AA8E-4570-8D33-6E21ADFA907E}"/>
+                </a:ext>
+              </a:extLst>
+            </p:cNvPr>
+            <p:cNvSpPr txBox="1"/>
+            <p:nvPr/>
+          </p:nvSpPr>
+          <p:spPr>
+            <a:xfrm rot="16200000">
+              <a:off x="971569" y="3981711"/>
+              <a:ext cx="1397000" cy="369332"/>
+            </a:xfrm>
+            <a:prstGeom prst="rect">
+              <a:avLst/>
+            </a:prstGeom>
+            <a:noFill/>
+          </p:spPr>
+          <p:txBody>
+            <a:bodyPr wrap="square" rtlCol="0">
+              <a:spAutoFit/>
+            </a:bodyPr>
+            <a:lstStyle/>
+            <a:p>
+              <a:pPr algn="ctr"/>
+              <a:r>
+                <a:rPr lang="en-US" b="1" dirty="0">
+                  <a:latin typeface="Arial" panose="020B0604020202020204" pitchFamily="34" charset="0"/>
+                  <a:cs typeface="Arial" panose="020B0604020202020204" pitchFamily="34" charset="0"/>
+                </a:rPr>
+                <a:t>2.0m</a:t>
+              </a:r>
+            </a:p>
+          </p:txBody>
+        </p:sp>
+        <p:sp>
+          <p:nvSpPr>
+            <p:cNvPr id="17" name="TextBox 16">
+              <a:extLst>
+                <a:ext uri="{FF2B5EF4-FFF2-40B4-BE49-F238E27FC236}">
+                  <a16:creationId xmlns:a16="http://schemas.microsoft.com/office/drawing/2014/main" id="{16F1DA68-963E-4AAB-A78D-1E4DEFFFF351}"/>
+                </a:ext>
+              </a:extLst>
+            </p:cNvPr>
+            <p:cNvSpPr txBox="1"/>
+            <p:nvPr/>
+          </p:nvSpPr>
+          <p:spPr>
+            <a:xfrm rot="16200000">
+              <a:off x="971569" y="5691970"/>
+              <a:ext cx="1397000" cy="369332"/>
+            </a:xfrm>
+            <a:prstGeom prst="rect">
+              <a:avLst/>
+            </a:prstGeom>
+            <a:noFill/>
+          </p:spPr>
+          <p:txBody>
+            <a:bodyPr wrap="square" rtlCol="0">
+              <a:spAutoFit/>
+            </a:bodyPr>
+            <a:lstStyle/>
+            <a:p>
+              <a:pPr algn="ctr"/>
+              <a:r>
+                <a:rPr lang="en-US" b="1" dirty="0">
+                  <a:latin typeface="Arial" panose="020B0604020202020204" pitchFamily="34" charset="0"/>
+                  <a:cs typeface="Arial" panose="020B0604020202020204" pitchFamily="34" charset="0"/>
+                </a:rPr>
+                <a:t>3.0m</a:t>
+              </a:r>
+            </a:p>
+          </p:txBody>
+        </p:sp>
+      </p:grpSp>
+    </p:spTree>
+    <p:extLst>
+      <p:ext uri="{BB962C8B-B14F-4D97-AF65-F5344CB8AC3E}">
+        <p14:creationId xmlns:p14="http://schemas.microsoft.com/office/powerpoint/2010/main" val="352925631"/>
+      </p:ext>
+    </p:extLst>
+  </p:cSld>
+  <p:clrMapOvr>
+    <a:masterClrMapping/>
+  </p:clrMapOvr>
+</p:sld>
+</file>
+
+<file path=ppt/slides/slide13.xml><?xml version="1.0" encoding="utf-8"?>
+<p:sld xmlns:a="http://schemas.openxmlformats.org/drawingml/2006/main" xmlns:r="http://schemas.openxmlformats.org/officeDocument/2006/relationships" xmlns:p="http://schemas.openxmlformats.org/presentationml/2006/main">
+  <p:cSld>
+    <p:spTree>
+      <p:nvGrpSpPr>
+        <p:cNvPr id="1" name=""/>
+        <p:cNvGrpSpPr/>
+        <p:nvPr/>
+      </p:nvGrpSpPr>
+      <p:grpSpPr>
+        <a:xfrm>
+          <a:off x="0" y="0"/>
+          <a:ext cx="0" cy="0"/>
+          <a:chOff x="0" y="0"/>
+          <a:chExt cx="0" cy="0"/>
+        </a:xfrm>
+      </p:grpSpPr>
+      <p:grpSp>
+        <p:nvGrpSpPr>
+          <p:cNvPr id="16" name="Group 15">
+            <a:extLst>
+              <a:ext uri="{FF2B5EF4-FFF2-40B4-BE49-F238E27FC236}">
+                <a16:creationId xmlns:a16="http://schemas.microsoft.com/office/drawing/2014/main" id="{9B7C1708-AE4A-46F1-9AE3-3CD855BDD530}"/>
+              </a:ext>
+            </a:extLst>
+          </p:cNvPr>
+          <p:cNvGrpSpPr/>
+          <p:nvPr/>
+        </p:nvGrpSpPr>
+        <p:grpSpPr>
+          <a:xfrm>
+            <a:off x="566882" y="-409074"/>
+            <a:ext cx="11111772" cy="7772400"/>
+            <a:chOff x="566882" y="-409074"/>
+            <a:chExt cx="11111772" cy="7772400"/>
+          </a:xfrm>
+        </p:grpSpPr>
+        <p:sp>
+          <p:nvSpPr>
+            <p:cNvPr id="7" name="Rectangle 6">
+              <a:extLst>
+                <a:ext uri="{FF2B5EF4-FFF2-40B4-BE49-F238E27FC236}">
+                  <a16:creationId xmlns:a16="http://schemas.microsoft.com/office/drawing/2014/main" id="{A9EB8F0A-1E38-4394-B159-8751F290AF8B}"/>
+                </a:ext>
+              </a:extLst>
+            </p:cNvPr>
+            <p:cNvSpPr/>
+            <p:nvPr/>
+          </p:nvSpPr>
+          <p:spPr>
+            <a:xfrm>
+              <a:off x="566882" y="-409074"/>
+              <a:ext cx="11111772" cy="7772400"/>
+            </a:xfrm>
+            <a:prstGeom prst="rect">
+              <a:avLst/>
+            </a:prstGeom>
+            <a:solidFill>
+              <a:schemeClr val="bg1"/>
+            </a:solidFill>
+            <a:ln>
+              <a:solidFill>
+                <a:schemeClr val="bg1"/>
+              </a:solidFill>
+            </a:ln>
+          </p:spPr>
+          <p:style>
+            <a:lnRef idx="2">
+              <a:schemeClr val="accent1">
+                <a:shade val="50000"/>
+              </a:schemeClr>
+            </a:lnRef>
+            <a:fillRef idx="1">
+              <a:schemeClr val="accent1"/>
+            </a:fillRef>
+            <a:effectRef idx="0">
+              <a:schemeClr val="accent1"/>
+            </a:effectRef>
+            <a:fontRef idx="minor">
+              <a:schemeClr val="lt1"/>
+            </a:fontRef>
+          </p:style>
+          <p:txBody>
+            <a:bodyPr rtlCol="0" anchor="ctr"/>
+            <a:lstStyle/>
+            <a:p>
+              <a:pPr algn="ctr"/>
+              <a:endParaRPr lang="en-US"/>
+            </a:p>
+          </p:txBody>
+        </p:sp>
+        <p:pic>
+          <p:nvPicPr>
+            <p:cNvPr id="3" name="Picture 2" descr="A picture containing graphical user interface&#10;&#10;Description automatically generated">
+              <a:extLst>
+                <a:ext uri="{FF2B5EF4-FFF2-40B4-BE49-F238E27FC236}">
+                  <a16:creationId xmlns:a16="http://schemas.microsoft.com/office/drawing/2014/main" id="{8AE5C12E-0DA7-4D79-A432-90C3D09CEE5E}"/>
+                </a:ext>
+              </a:extLst>
+            </p:cNvPr>
+            <p:cNvPicPr>
+              <a:picLocks noChangeAspect="1"/>
+            </p:cNvPicPr>
+            <p:nvPr/>
+          </p:nvPicPr>
+          <p:blipFill>
+            <a:blip r:embed="rId2" cstate="print">
+              <a:extLst>
+                <a:ext uri="{28A0092B-C50C-407E-A947-70E740481C1C}">
+                  <a14:useLocalDpi xmlns:a14="http://schemas.microsoft.com/office/drawing/2010/main" val="0"/>
+                </a:ext>
+              </a:extLst>
+            </a:blip>
+            <a:stretch>
+              <a:fillRect/>
+            </a:stretch>
+          </p:blipFill>
+          <p:spPr>
+            <a:xfrm>
+              <a:off x="1240651" y="0"/>
+              <a:ext cx="5486400" cy="6858000"/>
+            </a:xfrm>
+            <a:prstGeom prst="rect">
+              <a:avLst/>
+            </a:prstGeom>
+          </p:spPr>
+        </p:pic>
+        <p:pic>
+          <p:nvPicPr>
+            <p:cNvPr id="5" name="Picture 4" descr="A picture containing graphical user interface&#10;&#10;Description automatically generated">
+              <a:extLst>
+                <a:ext uri="{FF2B5EF4-FFF2-40B4-BE49-F238E27FC236}">
+                  <a16:creationId xmlns:a16="http://schemas.microsoft.com/office/drawing/2014/main" id="{DEAEC438-DAA6-42BA-BEB1-5DE677AE194F}"/>
+                </a:ext>
+              </a:extLst>
+            </p:cNvPr>
+            <p:cNvPicPr>
+              <a:picLocks noChangeAspect="1"/>
+            </p:cNvPicPr>
+            <p:nvPr/>
+          </p:nvPicPr>
+          <p:blipFill rotWithShape="1">
+            <a:blip r:embed="rId3" cstate="print">
+              <a:extLst>
+                <a:ext uri="{28A0092B-C50C-407E-A947-70E740481C1C}">
+                  <a14:useLocalDpi xmlns:a14="http://schemas.microsoft.com/office/drawing/2010/main" val="0"/>
+                </a:ext>
+              </a:extLst>
+            </a:blip>
+            <a:srcRect r="9137"/>
+            <a:stretch/>
+          </p:blipFill>
+          <p:spPr>
+            <a:xfrm>
+              <a:off x="6192253" y="-11387"/>
+              <a:ext cx="4985084" cy="6858000"/>
+            </a:xfrm>
+            <a:prstGeom prst="rect">
+              <a:avLst/>
+            </a:prstGeom>
+          </p:spPr>
+        </p:pic>
+        <p:pic>
+          <p:nvPicPr>
+            <p:cNvPr id="6" name="Picture 5" descr="A picture containing graphical user interface&#10;&#10;Description automatically generated">
+              <a:extLst>
+                <a:ext uri="{FF2B5EF4-FFF2-40B4-BE49-F238E27FC236}">
+                  <a16:creationId xmlns:a16="http://schemas.microsoft.com/office/drawing/2014/main" id="{BC108552-578A-4224-A8AD-CD0569BA569E}"/>
+                </a:ext>
+              </a:extLst>
+            </p:cNvPr>
+            <p:cNvPicPr>
+              <a:picLocks noChangeAspect="1"/>
+            </p:cNvPicPr>
+            <p:nvPr/>
+          </p:nvPicPr>
+          <p:blipFill rotWithShape="1">
+            <a:blip r:embed="rId3" cstate="print">
+              <a:extLst>
+                <a:ext uri="{28A0092B-C50C-407E-A947-70E740481C1C}">
+                  <a14:useLocalDpi xmlns:a14="http://schemas.microsoft.com/office/drawing/2010/main" val="0"/>
+                </a:ext>
+              </a:extLst>
+            </a:blip>
+            <a:srcRect l="91895" t="29883" r="3761" b="56433"/>
+            <a:stretch/>
+          </p:blipFill>
+          <p:spPr>
+            <a:xfrm>
+              <a:off x="11129210" y="2304513"/>
+              <a:ext cx="549443" cy="2163406"/>
+            </a:xfrm>
+            <a:prstGeom prst="rect">
+              <a:avLst/>
+            </a:prstGeom>
+          </p:spPr>
+        </p:pic>
+        <p:sp>
+          <p:nvSpPr>
+            <p:cNvPr id="8" name="TextBox 7">
+              <a:extLst>
+                <a:ext uri="{FF2B5EF4-FFF2-40B4-BE49-F238E27FC236}">
+                  <a16:creationId xmlns:a16="http://schemas.microsoft.com/office/drawing/2014/main" id="{0A123521-C075-4ABF-BC0D-CA4038280087}"/>
+                </a:ext>
+              </a:extLst>
+            </p:cNvPr>
+            <p:cNvSpPr txBox="1"/>
+            <p:nvPr/>
+          </p:nvSpPr>
+          <p:spPr>
+            <a:xfrm>
+              <a:off x="2924980" y="-324489"/>
+              <a:ext cx="1973179" cy="369332"/>
+            </a:xfrm>
+            <a:prstGeom prst="rect">
+              <a:avLst/>
+            </a:prstGeom>
+            <a:noFill/>
+          </p:spPr>
+          <p:txBody>
+            <a:bodyPr wrap="square" rtlCol="0">
+              <a:spAutoFit/>
+            </a:bodyPr>
+            <a:lstStyle/>
+            <a:p>
+              <a:r>
+                <a:rPr lang="en-US" b="1" dirty="0">
+                  <a:latin typeface="Arial" panose="020B0604020202020204" pitchFamily="34" charset="0"/>
+                  <a:cs typeface="Arial" panose="020B0604020202020204" pitchFamily="34" charset="0"/>
+                </a:rPr>
+                <a:t>K = 100 m day</a:t>
+              </a:r>
+              <a:r>
+                <a:rPr lang="en-US" b="1" baseline="30000" dirty="0">
+                  <a:latin typeface="Arial" panose="020B0604020202020204" pitchFamily="34" charset="0"/>
+                  <a:cs typeface="Arial" panose="020B0604020202020204" pitchFamily="34" charset="0"/>
+                </a:rPr>
+                <a:t>-1</a:t>
+              </a:r>
+              <a:endParaRPr lang="en-US" b="1" dirty="0">
+                <a:latin typeface="Arial" panose="020B0604020202020204" pitchFamily="34" charset="0"/>
+                <a:cs typeface="Arial" panose="020B0604020202020204" pitchFamily="34" charset="0"/>
+              </a:endParaRPr>
+            </a:p>
+          </p:txBody>
+        </p:sp>
+        <p:sp>
+          <p:nvSpPr>
+            <p:cNvPr id="9" name="TextBox 8">
+              <a:extLst>
+                <a:ext uri="{FF2B5EF4-FFF2-40B4-BE49-F238E27FC236}">
+                  <a16:creationId xmlns:a16="http://schemas.microsoft.com/office/drawing/2014/main" id="{C7E8C010-6B89-4E16-8494-5BBAE91CFABF}"/>
+                </a:ext>
+              </a:extLst>
+            </p:cNvPr>
+            <p:cNvSpPr txBox="1"/>
+            <p:nvPr/>
+          </p:nvSpPr>
+          <p:spPr>
+            <a:xfrm>
+              <a:off x="7894160" y="-324489"/>
+              <a:ext cx="1973179" cy="369332"/>
+            </a:xfrm>
+            <a:prstGeom prst="rect">
+              <a:avLst/>
+            </a:prstGeom>
+            <a:noFill/>
+          </p:spPr>
+          <p:txBody>
+            <a:bodyPr wrap="square" rtlCol="0">
+              <a:spAutoFit/>
+            </a:bodyPr>
+            <a:lstStyle/>
+            <a:p>
+              <a:r>
+                <a:rPr lang="en-US" b="1" dirty="0">
+                  <a:latin typeface="Arial" panose="020B0604020202020204" pitchFamily="34" charset="0"/>
+                  <a:cs typeface="Arial" panose="020B0604020202020204" pitchFamily="34" charset="0"/>
+                </a:rPr>
+                <a:t>K = 400 m day</a:t>
+              </a:r>
+              <a:r>
+                <a:rPr lang="en-US" b="1" baseline="30000" dirty="0">
+                  <a:latin typeface="Arial" panose="020B0604020202020204" pitchFamily="34" charset="0"/>
+                  <a:cs typeface="Arial" panose="020B0604020202020204" pitchFamily="34" charset="0"/>
+                </a:rPr>
+                <a:t>-1</a:t>
+              </a:r>
+              <a:endParaRPr lang="en-US" b="1" dirty="0">
+                <a:latin typeface="Arial" panose="020B0604020202020204" pitchFamily="34" charset="0"/>
+                <a:cs typeface="Arial" panose="020B0604020202020204" pitchFamily="34" charset="0"/>
+              </a:endParaRPr>
+            </a:p>
+          </p:txBody>
+        </p:sp>
+        <p:sp>
+          <p:nvSpPr>
+            <p:cNvPr id="10" name="TextBox 9">
+              <a:extLst>
+                <a:ext uri="{FF2B5EF4-FFF2-40B4-BE49-F238E27FC236}">
+                  <a16:creationId xmlns:a16="http://schemas.microsoft.com/office/drawing/2014/main" id="{230B92F5-4A88-43B4-B9CB-AB5FEAA4AC23}"/>
+                </a:ext>
+              </a:extLst>
+            </p:cNvPr>
+            <p:cNvSpPr txBox="1"/>
+            <p:nvPr/>
+          </p:nvSpPr>
+          <p:spPr>
+            <a:xfrm rot="16200000">
+              <a:off x="185793" y="621724"/>
+              <a:ext cx="1131511" cy="369332"/>
+            </a:xfrm>
+            <a:prstGeom prst="rect">
+              <a:avLst/>
+            </a:prstGeom>
+            <a:noFill/>
+          </p:spPr>
+          <p:txBody>
+            <a:bodyPr wrap="square" rtlCol="0">
+              <a:spAutoFit/>
+            </a:bodyPr>
+            <a:lstStyle/>
+            <a:p>
+              <a:pPr algn="ctr"/>
+              <a:r>
+                <a:rPr lang="en-US" b="1" dirty="0">
+                  <a:latin typeface="Arial" panose="020B0604020202020204" pitchFamily="34" charset="0"/>
+                  <a:cs typeface="Arial" panose="020B0604020202020204" pitchFamily="34" charset="0"/>
+                </a:rPr>
+                <a:t>0.5 m</a:t>
+              </a:r>
+            </a:p>
+          </p:txBody>
+        </p:sp>
+        <p:sp>
+          <p:nvSpPr>
+            <p:cNvPr id="11" name="TextBox 10">
+              <a:extLst>
+                <a:ext uri="{FF2B5EF4-FFF2-40B4-BE49-F238E27FC236}">
+                  <a16:creationId xmlns:a16="http://schemas.microsoft.com/office/drawing/2014/main" id="{7EB83E34-9BB4-4953-91CF-B359A628EFCE}"/>
+                </a:ext>
+              </a:extLst>
+            </p:cNvPr>
+            <p:cNvSpPr txBox="1"/>
+            <p:nvPr/>
+          </p:nvSpPr>
+          <p:spPr>
+            <a:xfrm rot="16200000">
+              <a:off x="203415" y="2402943"/>
+              <a:ext cx="1131511" cy="369332"/>
+            </a:xfrm>
+            <a:prstGeom prst="rect">
+              <a:avLst/>
+            </a:prstGeom>
+            <a:noFill/>
+          </p:spPr>
+          <p:txBody>
+            <a:bodyPr wrap="square" rtlCol="0">
+              <a:spAutoFit/>
+            </a:bodyPr>
+            <a:lstStyle/>
+            <a:p>
+              <a:pPr algn="ctr"/>
+              <a:r>
+                <a:rPr lang="en-US" b="1" dirty="0">
+                  <a:latin typeface="Arial" panose="020B0604020202020204" pitchFamily="34" charset="0"/>
+                  <a:cs typeface="Arial" panose="020B0604020202020204" pitchFamily="34" charset="0"/>
+                </a:rPr>
+                <a:t>1.0 m</a:t>
+              </a:r>
+            </a:p>
+          </p:txBody>
+        </p:sp>
+        <p:sp>
+          <p:nvSpPr>
+            <p:cNvPr id="12" name="TextBox 11">
+              <a:extLst>
+                <a:ext uri="{FF2B5EF4-FFF2-40B4-BE49-F238E27FC236}">
+                  <a16:creationId xmlns:a16="http://schemas.microsoft.com/office/drawing/2014/main" id="{5403162F-A2E1-4334-9F67-BED99CB56ADA}"/>
+                </a:ext>
+              </a:extLst>
+            </p:cNvPr>
+            <p:cNvSpPr txBox="1"/>
+            <p:nvPr/>
+          </p:nvSpPr>
+          <p:spPr>
+            <a:xfrm rot="16200000">
+              <a:off x="273144" y="4085726"/>
+              <a:ext cx="1131511" cy="369332"/>
+            </a:xfrm>
+            <a:prstGeom prst="rect">
+              <a:avLst/>
+            </a:prstGeom>
+            <a:noFill/>
+          </p:spPr>
+          <p:txBody>
+            <a:bodyPr wrap="square" rtlCol="0">
+              <a:spAutoFit/>
+            </a:bodyPr>
+            <a:lstStyle/>
+            <a:p>
+              <a:pPr algn="ctr"/>
+              <a:r>
+                <a:rPr lang="en-US" b="1" dirty="0">
+                  <a:latin typeface="Arial" panose="020B0604020202020204" pitchFamily="34" charset="0"/>
+                  <a:cs typeface="Arial" panose="020B0604020202020204" pitchFamily="34" charset="0"/>
+                </a:rPr>
+                <a:t>2.0 m</a:t>
+              </a:r>
+            </a:p>
+          </p:txBody>
+        </p:sp>
+        <p:sp>
+          <p:nvSpPr>
+            <p:cNvPr id="13" name="TextBox 12">
+              <a:extLst>
+                <a:ext uri="{FF2B5EF4-FFF2-40B4-BE49-F238E27FC236}">
+                  <a16:creationId xmlns:a16="http://schemas.microsoft.com/office/drawing/2014/main" id="{06EB3640-7A3A-4B79-BBD4-E2BF2097A979}"/>
+                </a:ext>
+              </a:extLst>
+            </p:cNvPr>
+            <p:cNvSpPr txBox="1"/>
+            <p:nvPr/>
+          </p:nvSpPr>
+          <p:spPr>
+            <a:xfrm rot="16200000">
+              <a:off x="338011" y="5767963"/>
+              <a:ext cx="1131511" cy="369332"/>
+            </a:xfrm>
+            <a:prstGeom prst="rect">
+              <a:avLst/>
+            </a:prstGeom>
+            <a:noFill/>
+          </p:spPr>
+          <p:txBody>
+            <a:bodyPr wrap="square" rtlCol="0">
+              <a:spAutoFit/>
+            </a:bodyPr>
+            <a:lstStyle/>
+            <a:p>
+              <a:pPr algn="ctr"/>
+              <a:r>
+                <a:rPr lang="en-US" b="1" dirty="0">
+                  <a:latin typeface="Arial" panose="020B0604020202020204" pitchFamily="34" charset="0"/>
+                  <a:cs typeface="Arial" panose="020B0604020202020204" pitchFamily="34" charset="0"/>
+                </a:rPr>
+                <a:t>3.0 m</a:t>
+              </a:r>
+            </a:p>
+          </p:txBody>
+        </p:sp>
+        <p:sp>
+          <p:nvSpPr>
+            <p:cNvPr id="14" name="TextBox 13">
+              <a:extLst>
+                <a:ext uri="{FF2B5EF4-FFF2-40B4-BE49-F238E27FC236}">
+                  <a16:creationId xmlns:a16="http://schemas.microsoft.com/office/drawing/2014/main" id="{1A5A1C9C-96B2-40E5-BD38-4DA9468186FB}"/>
+                </a:ext>
+              </a:extLst>
+            </p:cNvPr>
+            <p:cNvSpPr txBox="1"/>
+            <p:nvPr/>
+          </p:nvSpPr>
+          <p:spPr>
+            <a:xfrm rot="16200000">
+              <a:off x="-36052" y="3244333"/>
+              <a:ext cx="2248971" cy="369332"/>
+            </a:xfrm>
+            <a:prstGeom prst="rect">
+              <a:avLst/>
+            </a:prstGeom>
+            <a:noFill/>
+          </p:spPr>
+          <p:txBody>
+            <a:bodyPr wrap="square" rtlCol="0">
+              <a:spAutoFit/>
+            </a:bodyPr>
+            <a:lstStyle/>
+            <a:p>
+              <a:pPr algn="ctr"/>
+              <a:r>
+                <a:rPr lang="en-US" dirty="0">
+                  <a:latin typeface="Arial" panose="020B0604020202020204" pitchFamily="34" charset="0"/>
+                  <a:cs typeface="Arial" panose="020B0604020202020204" pitchFamily="34" charset="0"/>
+                </a:rPr>
+                <a:t>Month</a:t>
+              </a:r>
+            </a:p>
+          </p:txBody>
+        </p:sp>
+        <p:sp>
+          <p:nvSpPr>
+            <p:cNvPr id="15" name="TextBox 14">
+              <a:extLst>
+                <a:ext uri="{FF2B5EF4-FFF2-40B4-BE49-F238E27FC236}">
+                  <a16:creationId xmlns:a16="http://schemas.microsoft.com/office/drawing/2014/main" id="{08A8836E-6079-4045-94DC-E26E9C043384}"/>
+                </a:ext>
+              </a:extLst>
+            </p:cNvPr>
+            <p:cNvSpPr txBox="1"/>
+            <p:nvPr/>
+          </p:nvSpPr>
+          <p:spPr>
+            <a:xfrm>
+              <a:off x="4218237" y="6897742"/>
+              <a:ext cx="3552825" cy="369332"/>
+            </a:xfrm>
+            <a:prstGeom prst="rect">
+              <a:avLst/>
+            </a:prstGeom>
+            <a:noFill/>
+          </p:spPr>
+          <p:txBody>
+            <a:bodyPr wrap="square" rtlCol="0">
+              <a:spAutoFit/>
+            </a:bodyPr>
+            <a:lstStyle/>
+            <a:p>
+              <a:pPr algn="ctr"/>
+              <a:r>
+                <a:rPr lang="en-US" dirty="0">
+                  <a:latin typeface="Arial" panose="020B0604020202020204" pitchFamily="34" charset="0"/>
+                  <a:cs typeface="Arial" panose="020B0604020202020204" pitchFamily="34" charset="0"/>
+                </a:rPr>
+                <a:t>Flow Path Length (m)</a:t>
+              </a:r>
+            </a:p>
+          </p:txBody>
+        </p:sp>
+      </p:grpSp>
+    </p:spTree>
+    <p:extLst>
+      <p:ext uri="{BB962C8B-B14F-4D97-AF65-F5344CB8AC3E}">
+        <p14:creationId xmlns:p14="http://schemas.microsoft.com/office/powerpoint/2010/main" val="2621005540"/>
+      </p:ext>
+    </p:extLst>
+  </p:cSld>
+  <p:clrMapOvr>
+    <a:masterClrMapping/>
+  </p:clrMapOvr>
+</p:sld>
+</file>
+
+<file path=ppt/slides/slide14.xml><?xml version="1.0" encoding="utf-8"?>
+<p:sld xmlns:a="http://schemas.openxmlformats.org/drawingml/2006/main" xmlns:r="http://schemas.openxmlformats.org/officeDocument/2006/relationships" xmlns:p="http://schemas.openxmlformats.org/presentationml/2006/main">
+  <p:cSld>
+    <p:spTree>
+      <p:nvGrpSpPr>
+        <p:cNvPr id="1" name=""/>
+        <p:cNvGrpSpPr/>
+        <p:nvPr/>
+      </p:nvGrpSpPr>
+      <p:grpSpPr>
+        <a:xfrm>
+          <a:off x="0" y="0"/>
+          <a:ext cx="0" cy="0"/>
+          <a:chOff x="0" y="0"/>
+          <a:chExt cx="0" cy="0"/>
+        </a:xfrm>
+      </p:grpSpPr>
+      <p:grpSp>
+        <p:nvGrpSpPr>
+          <p:cNvPr id="12" name="Group 11">
+            <a:extLst>
+              <a:ext uri="{FF2B5EF4-FFF2-40B4-BE49-F238E27FC236}">
+                <a16:creationId xmlns:a16="http://schemas.microsoft.com/office/drawing/2014/main" id="{BE84B0A4-4493-48B9-B5D7-134C176CD151}"/>
+              </a:ext>
+            </a:extLst>
+          </p:cNvPr>
+          <p:cNvGrpSpPr/>
+          <p:nvPr/>
+        </p:nvGrpSpPr>
+        <p:grpSpPr>
+          <a:xfrm>
+            <a:off x="1642132" y="-385011"/>
+            <a:ext cx="9739741" cy="7339264"/>
+            <a:chOff x="1642132" y="-385011"/>
+            <a:chExt cx="9739741" cy="7339264"/>
+          </a:xfrm>
+        </p:grpSpPr>
+        <p:sp>
+          <p:nvSpPr>
+            <p:cNvPr id="6" name="Rectangle 5">
+              <a:extLst>
+                <a:ext uri="{FF2B5EF4-FFF2-40B4-BE49-F238E27FC236}">
+                  <a16:creationId xmlns:a16="http://schemas.microsoft.com/office/drawing/2014/main" id="{C952FF57-CE1F-4E6B-B179-ECC6D623F216}"/>
+                </a:ext>
+              </a:extLst>
+            </p:cNvPr>
+            <p:cNvSpPr/>
+            <p:nvPr/>
+          </p:nvSpPr>
+          <p:spPr>
+            <a:xfrm>
+              <a:off x="1642132" y="-385011"/>
+              <a:ext cx="9739741" cy="7339264"/>
+            </a:xfrm>
+            <a:prstGeom prst="rect">
+              <a:avLst/>
+            </a:prstGeom>
+            <a:solidFill>
+              <a:schemeClr val="bg1"/>
+            </a:solidFill>
+            <a:ln>
+              <a:solidFill>
+                <a:schemeClr val="bg1"/>
+              </a:solidFill>
+            </a:ln>
+          </p:spPr>
+          <p:style>
+            <a:lnRef idx="2">
+              <a:schemeClr val="accent1">
+                <a:shade val="50000"/>
+              </a:schemeClr>
+            </a:lnRef>
+            <a:fillRef idx="1">
+              <a:schemeClr val="accent1"/>
+            </a:fillRef>
+            <a:effectRef idx="0">
+              <a:schemeClr val="accent1"/>
+            </a:effectRef>
+            <a:fontRef idx="minor">
+              <a:schemeClr val="lt1"/>
+            </a:fontRef>
+          </p:style>
+          <p:txBody>
+            <a:bodyPr rtlCol="0" anchor="ctr"/>
+            <a:lstStyle/>
+            <a:p>
+              <a:pPr algn="ctr"/>
+              <a:endParaRPr lang="en-US"/>
+            </a:p>
+          </p:txBody>
+        </p:sp>
+        <p:pic>
+          <p:nvPicPr>
+            <p:cNvPr id="5" name="Picture 4" descr="Chart, diagram&#10;&#10;Description automatically generated">
+              <a:extLst>
+                <a:ext uri="{FF2B5EF4-FFF2-40B4-BE49-F238E27FC236}">
+                  <a16:creationId xmlns:a16="http://schemas.microsoft.com/office/drawing/2014/main" id="{54D33BA9-A3F0-4A40-83AC-ABD56C7A48A9}"/>
+                </a:ext>
+              </a:extLst>
+            </p:cNvPr>
+            <p:cNvPicPr>
+              <a:picLocks noChangeAspect="1"/>
+            </p:cNvPicPr>
+            <p:nvPr/>
+          </p:nvPicPr>
+          <p:blipFill>
+            <a:blip r:embed="rId2" cstate="print">
+              <a:extLst>
+                <a:ext uri="{28A0092B-C50C-407E-A947-70E740481C1C}">
+                  <a14:useLocalDpi xmlns:a14="http://schemas.microsoft.com/office/drawing/2010/main" val="0"/>
+                </a:ext>
+              </a:extLst>
+            </a:blip>
+            <a:stretch>
+              <a:fillRect/>
+            </a:stretch>
+          </p:blipFill>
+          <p:spPr>
+            <a:xfrm>
+              <a:off x="6408821" y="0"/>
+              <a:ext cx="4572000" cy="6858000"/>
+            </a:xfrm>
+            <a:prstGeom prst="rect">
+              <a:avLst/>
+            </a:prstGeom>
+          </p:spPr>
+        </p:pic>
+        <p:pic>
+          <p:nvPicPr>
+            <p:cNvPr id="3" name="Picture 2" descr="Graphical user interface&#10;&#10;Description automatically generated with low confidence">
+              <a:extLst>
+                <a:ext uri="{FF2B5EF4-FFF2-40B4-BE49-F238E27FC236}">
+                  <a16:creationId xmlns:a16="http://schemas.microsoft.com/office/drawing/2014/main" id="{2777B5CD-FF93-4C9E-B056-B29AF0ABFCB6}"/>
+                </a:ext>
+              </a:extLst>
+            </p:cNvPr>
+            <p:cNvPicPr>
+              <a:picLocks noChangeAspect="1"/>
+            </p:cNvPicPr>
+            <p:nvPr/>
+          </p:nvPicPr>
+          <p:blipFill>
+            <a:blip r:embed="rId3" cstate="print">
+              <a:extLst>
+                <a:ext uri="{28A0092B-C50C-407E-A947-70E740481C1C}">
+                  <a14:useLocalDpi xmlns:a14="http://schemas.microsoft.com/office/drawing/2010/main" val="0"/>
+                </a:ext>
+              </a:extLst>
+            </a:blip>
+            <a:stretch>
+              <a:fillRect/>
+            </a:stretch>
+          </p:blipFill>
+          <p:spPr>
+            <a:xfrm>
+              <a:off x="2005263" y="0"/>
+              <a:ext cx="4572000" cy="6858000"/>
+            </a:xfrm>
+            <a:prstGeom prst="rect">
+              <a:avLst/>
+            </a:prstGeom>
+          </p:spPr>
+        </p:pic>
+        <p:sp>
+          <p:nvSpPr>
+            <p:cNvPr id="7" name="TextBox 6">
+              <a:extLst>
+                <a:ext uri="{FF2B5EF4-FFF2-40B4-BE49-F238E27FC236}">
+                  <a16:creationId xmlns:a16="http://schemas.microsoft.com/office/drawing/2014/main" id="{F572DFF3-E15D-438B-8B7B-611FB993289C}"/>
+                </a:ext>
+              </a:extLst>
+            </p:cNvPr>
+            <p:cNvSpPr txBox="1"/>
+            <p:nvPr/>
+          </p:nvSpPr>
+          <p:spPr>
+            <a:xfrm>
+              <a:off x="3598752" y="-312094"/>
+              <a:ext cx="1973179" cy="369332"/>
+            </a:xfrm>
+            <a:prstGeom prst="rect">
+              <a:avLst/>
+            </a:prstGeom>
+            <a:noFill/>
+          </p:spPr>
+          <p:txBody>
+            <a:bodyPr wrap="square" rtlCol="0">
+              <a:spAutoFit/>
+            </a:bodyPr>
+            <a:lstStyle/>
+            <a:p>
+              <a:r>
+                <a:rPr lang="en-US" b="1" dirty="0">
+                  <a:latin typeface="Arial" panose="020B0604020202020204" pitchFamily="34" charset="0"/>
+                  <a:cs typeface="Arial" panose="020B0604020202020204" pitchFamily="34" charset="0"/>
+                </a:rPr>
+                <a:t>K = 100 m day</a:t>
+              </a:r>
+              <a:r>
+                <a:rPr lang="en-US" b="1" baseline="30000" dirty="0">
+                  <a:latin typeface="Arial" panose="020B0604020202020204" pitchFamily="34" charset="0"/>
+                  <a:cs typeface="Arial" panose="020B0604020202020204" pitchFamily="34" charset="0"/>
+                </a:rPr>
+                <a:t>-1</a:t>
+              </a:r>
+              <a:endParaRPr lang="en-US" b="1" dirty="0">
+                <a:latin typeface="Arial" panose="020B0604020202020204" pitchFamily="34" charset="0"/>
+                <a:cs typeface="Arial" panose="020B0604020202020204" pitchFamily="34" charset="0"/>
+              </a:endParaRPr>
+            </a:p>
+          </p:txBody>
+        </p:sp>
+        <p:sp>
+          <p:nvSpPr>
+            <p:cNvPr id="8" name="TextBox 7">
+              <a:extLst>
+                <a:ext uri="{FF2B5EF4-FFF2-40B4-BE49-F238E27FC236}">
+                  <a16:creationId xmlns:a16="http://schemas.microsoft.com/office/drawing/2014/main" id="{3880B930-8BD6-47D3-8500-805BC99FE632}"/>
+                </a:ext>
+              </a:extLst>
+            </p:cNvPr>
+            <p:cNvSpPr txBox="1"/>
+            <p:nvPr/>
+          </p:nvSpPr>
+          <p:spPr>
+            <a:xfrm>
+              <a:off x="7906195" y="-312094"/>
+              <a:ext cx="1973179" cy="369332"/>
+            </a:xfrm>
+            <a:prstGeom prst="rect">
+              <a:avLst/>
+            </a:prstGeom>
+            <a:noFill/>
+          </p:spPr>
+          <p:txBody>
+            <a:bodyPr wrap="square" rtlCol="0">
+              <a:spAutoFit/>
+            </a:bodyPr>
+            <a:lstStyle/>
+            <a:p>
+              <a:r>
+                <a:rPr lang="en-US" b="1" dirty="0">
+                  <a:latin typeface="Arial" panose="020B0604020202020204" pitchFamily="34" charset="0"/>
+                  <a:cs typeface="Arial" panose="020B0604020202020204" pitchFamily="34" charset="0"/>
+                </a:rPr>
+                <a:t>K = 400 m day</a:t>
+              </a:r>
+              <a:r>
+                <a:rPr lang="en-US" b="1" baseline="30000" dirty="0">
+                  <a:latin typeface="Arial" panose="020B0604020202020204" pitchFamily="34" charset="0"/>
+                  <a:cs typeface="Arial" panose="020B0604020202020204" pitchFamily="34" charset="0"/>
+                </a:rPr>
+                <a:t>-1</a:t>
+              </a:r>
+              <a:endParaRPr lang="en-US" b="1" dirty="0">
+                <a:latin typeface="Arial" panose="020B0604020202020204" pitchFamily="34" charset="0"/>
+                <a:cs typeface="Arial" panose="020B0604020202020204" pitchFamily="34" charset="0"/>
+              </a:endParaRPr>
+            </a:p>
+          </p:txBody>
+        </p:sp>
+        <p:sp>
+          <p:nvSpPr>
+            <p:cNvPr id="9" name="TextBox 8">
+              <a:extLst>
+                <a:ext uri="{FF2B5EF4-FFF2-40B4-BE49-F238E27FC236}">
+                  <a16:creationId xmlns:a16="http://schemas.microsoft.com/office/drawing/2014/main" id="{546C666E-4930-43A8-8EAD-265D89465D6E}"/>
+                </a:ext>
+              </a:extLst>
+            </p:cNvPr>
+            <p:cNvSpPr txBox="1"/>
+            <p:nvPr/>
+          </p:nvSpPr>
+          <p:spPr>
+            <a:xfrm rot="16200000">
+              <a:off x="1128299" y="3099955"/>
+              <a:ext cx="1397000" cy="369332"/>
+            </a:xfrm>
+            <a:prstGeom prst="rect">
+              <a:avLst/>
+            </a:prstGeom>
+            <a:noFill/>
+          </p:spPr>
+          <p:txBody>
+            <a:bodyPr wrap="square" rtlCol="0">
+              <a:spAutoFit/>
+            </a:bodyPr>
+            <a:lstStyle/>
+            <a:p>
+              <a:pPr algn="ctr"/>
+              <a:r>
+                <a:rPr lang="en-US" b="1" dirty="0">
+                  <a:latin typeface="Arial" panose="020B0604020202020204" pitchFamily="34" charset="0"/>
+                  <a:cs typeface="Arial" panose="020B0604020202020204" pitchFamily="34" charset="0"/>
+                </a:rPr>
+                <a:t>Shady</a:t>
+              </a:r>
+            </a:p>
+          </p:txBody>
+        </p:sp>
+        <p:sp>
+          <p:nvSpPr>
+            <p:cNvPr id="10" name="TextBox 9">
+              <a:extLst>
+                <a:ext uri="{FF2B5EF4-FFF2-40B4-BE49-F238E27FC236}">
+                  <a16:creationId xmlns:a16="http://schemas.microsoft.com/office/drawing/2014/main" id="{12722D95-8EF8-46D0-A970-821A41456379}"/>
+                </a:ext>
+              </a:extLst>
+            </p:cNvPr>
+            <p:cNvSpPr txBox="1"/>
+            <p:nvPr/>
+          </p:nvSpPr>
+          <p:spPr>
+            <a:xfrm rot="16200000">
+              <a:off x="1174420" y="5284021"/>
+              <a:ext cx="1397000" cy="369332"/>
+            </a:xfrm>
+            <a:prstGeom prst="rect">
+              <a:avLst/>
+            </a:prstGeom>
+            <a:noFill/>
+          </p:spPr>
+          <p:txBody>
+            <a:bodyPr wrap="square" rtlCol="0">
+              <a:spAutoFit/>
+            </a:bodyPr>
+            <a:lstStyle/>
+            <a:p>
+              <a:pPr algn="ctr"/>
+              <a:r>
+                <a:rPr lang="en-US" b="1" dirty="0">
+                  <a:latin typeface="Arial" panose="020B0604020202020204" pitchFamily="34" charset="0"/>
+                  <a:cs typeface="Arial" panose="020B0604020202020204" pitchFamily="34" charset="0"/>
+                </a:rPr>
+                <a:t>Sunny</a:t>
+              </a:r>
+            </a:p>
+          </p:txBody>
+        </p:sp>
+        <p:sp>
+          <p:nvSpPr>
+            <p:cNvPr id="11" name="TextBox 10">
+              <a:extLst>
+                <a:ext uri="{FF2B5EF4-FFF2-40B4-BE49-F238E27FC236}">
+                  <a16:creationId xmlns:a16="http://schemas.microsoft.com/office/drawing/2014/main" id="{EA16FD8B-AC05-4EED-8E39-62D7F914D08F}"/>
+                </a:ext>
+              </a:extLst>
+            </p:cNvPr>
+            <p:cNvSpPr txBox="1"/>
+            <p:nvPr/>
+          </p:nvSpPr>
+          <p:spPr>
+            <a:xfrm rot="16200000">
+              <a:off x="1208419" y="915889"/>
+              <a:ext cx="1397000" cy="369332"/>
+            </a:xfrm>
+            <a:prstGeom prst="rect">
+              <a:avLst/>
+            </a:prstGeom>
+            <a:noFill/>
+          </p:spPr>
+          <p:txBody>
+            <a:bodyPr wrap="square" rtlCol="0">
+              <a:spAutoFit/>
+            </a:bodyPr>
+            <a:lstStyle/>
+            <a:p>
+              <a:pPr algn="ctr"/>
+              <a:r>
+                <a:rPr lang="en-US" b="1" dirty="0">
+                  <a:latin typeface="Arial" panose="020B0604020202020204" pitchFamily="34" charset="0"/>
+                  <a:cs typeface="Arial" panose="020B0604020202020204" pitchFamily="34" charset="0"/>
+                </a:rPr>
+                <a:t>River-only</a:t>
+              </a:r>
+            </a:p>
+          </p:txBody>
+        </p:sp>
+      </p:grpSp>
+    </p:spTree>
+    <p:extLst>
+      <p:ext uri="{BB962C8B-B14F-4D97-AF65-F5344CB8AC3E}">
+        <p14:creationId xmlns:p14="http://schemas.microsoft.com/office/powerpoint/2010/main" val="3666096084"/>
+      </p:ext>
+    </p:extLst>
+  </p:cSld>
+  <p:clrMapOvr>
+    <a:masterClrMapping/>
+  </p:clrMapOvr>
+</p:sld>
+</file>
+
 <file path=ppt/slides/slide2.xml><?xml version="1.0" encoding="utf-8"?>
+<p:sld xmlns:a="http://schemas.openxmlformats.org/drawingml/2006/main" xmlns:r="http://schemas.openxmlformats.org/officeDocument/2006/relationships" xmlns:p="http://schemas.openxmlformats.org/presentationml/2006/main">
+  <p:cSld>
+    <p:spTree>
+      <p:nvGrpSpPr>
+        <p:cNvPr id="1" name=""/>
+        <p:cNvGrpSpPr/>
+        <p:nvPr/>
+      </p:nvGrpSpPr>
+      <p:grpSpPr>
+        <a:xfrm>
+          <a:off x="0" y="0"/>
+          <a:ext cx="0" cy="0"/>
+          <a:chOff x="0" y="0"/>
+          <a:chExt cx="0" cy="0"/>
+        </a:xfrm>
+      </p:grpSpPr>
+      <p:grpSp>
+        <p:nvGrpSpPr>
+          <p:cNvPr id="11" name="Group 10">
+            <a:extLst>
+              <a:ext uri="{FF2B5EF4-FFF2-40B4-BE49-F238E27FC236}">
+                <a16:creationId xmlns:a16="http://schemas.microsoft.com/office/drawing/2014/main" id="{3ABA490A-925C-4C11-B3B5-ABD90C618042}"/>
+              </a:ext>
+            </a:extLst>
+          </p:cNvPr>
+          <p:cNvGrpSpPr/>
+          <p:nvPr/>
+        </p:nvGrpSpPr>
+        <p:grpSpPr>
+          <a:xfrm>
+            <a:off x="1282700" y="177204"/>
+            <a:ext cx="7195820" cy="7061796"/>
+            <a:chOff x="1282700" y="177204"/>
+            <a:chExt cx="7195820" cy="7061796"/>
+          </a:xfrm>
+        </p:grpSpPr>
+        <p:grpSp>
+          <p:nvGrpSpPr>
+            <p:cNvPr id="10" name="Group 9"/>
+            <p:cNvGrpSpPr/>
+            <p:nvPr/>
+          </p:nvGrpSpPr>
+          <p:grpSpPr>
+            <a:xfrm>
+              <a:off x="1282700" y="177204"/>
+              <a:ext cx="7195820" cy="7061796"/>
+              <a:chOff x="1282700" y="177204"/>
+              <a:chExt cx="7195820" cy="7061796"/>
+            </a:xfrm>
+          </p:grpSpPr>
+          <p:sp>
+            <p:nvSpPr>
+              <p:cNvPr id="8" name="Rectangle 7"/>
+              <p:cNvSpPr/>
+              <p:nvPr/>
+            </p:nvSpPr>
+            <p:spPr>
+              <a:xfrm>
+                <a:off x="1282700" y="223520"/>
+                <a:ext cx="7195820" cy="7015480"/>
+              </a:xfrm>
+              <a:prstGeom prst="rect">
+                <a:avLst/>
+              </a:prstGeom>
+              <a:solidFill>
+                <a:schemeClr val="bg1"/>
+              </a:solidFill>
+              <a:ln>
+                <a:solidFill>
+                  <a:schemeClr val="bg1"/>
+                </a:solidFill>
+              </a:ln>
+            </p:spPr>
+            <p:style>
+              <a:lnRef idx="2">
+                <a:schemeClr val="accent1">
+                  <a:shade val="50000"/>
+                </a:schemeClr>
+              </a:lnRef>
+              <a:fillRef idx="1">
+                <a:schemeClr val="accent1"/>
+              </a:fillRef>
+              <a:effectRef idx="0">
+                <a:schemeClr val="accent1"/>
+              </a:effectRef>
+              <a:fontRef idx="minor">
+                <a:schemeClr val="lt1"/>
+              </a:fontRef>
+            </p:style>
+            <p:txBody>
+              <a:bodyPr rtlCol="0" anchor="ctr"/>
+              <a:lstStyle/>
+              <a:p>
+                <a:pPr algn="ctr"/>
+                <a:endParaRPr lang="en-US"/>
+              </a:p>
+            </p:txBody>
+          </p:sp>
+          <p:pic>
+            <p:nvPicPr>
+              <p:cNvPr id="2" name="Picture 1"/>
+              <p:cNvPicPr>
+                <a:picLocks noChangeAspect="1"/>
+              </p:cNvPicPr>
+              <p:nvPr/>
+            </p:nvPicPr>
+            <p:blipFill>
+              <a:blip r:embed="rId2" cstate="print">
+                <a:extLst>
+                  <a:ext uri="{28A0092B-C50C-407E-A947-70E740481C1C}">
+                    <a14:useLocalDpi xmlns:a14="http://schemas.microsoft.com/office/drawing/2010/main" val="0"/>
+                  </a:ext>
+                </a:extLst>
+              </a:blip>
+              <a:srcRect/>
+              <a:stretch/>
+            </p:blipFill>
+            <p:spPr>
+              <a:xfrm>
+                <a:off x="1515617" y="265430"/>
+                <a:ext cx="6139051" cy="6821169"/>
+              </a:xfrm>
+              <a:prstGeom prst="rect">
+                <a:avLst/>
+              </a:prstGeom>
+            </p:spPr>
+          </p:pic>
+          <p:sp>
+            <p:nvSpPr>
+              <p:cNvPr id="3" name="TextBox 2"/>
+              <p:cNvSpPr txBox="1"/>
+              <p:nvPr/>
+            </p:nvSpPr>
+            <p:spPr>
+              <a:xfrm>
+                <a:off x="4386580" y="177204"/>
+                <a:ext cx="928370" cy="369332"/>
+              </a:xfrm>
+              <a:prstGeom prst="rect">
+                <a:avLst/>
+              </a:prstGeom>
+              <a:noFill/>
+            </p:spPr>
+            <p:txBody>
+              <a:bodyPr wrap="square" rtlCol="0">
+                <a:spAutoFit/>
+              </a:bodyPr>
+              <a:lstStyle/>
+              <a:p>
+                <a:r>
+                  <a:rPr lang="en-US" b="1" dirty="0"/>
+                  <a:t>Shady</a:t>
+                </a:r>
+                <a:endParaRPr lang="en-US" sz="1400" b="1" dirty="0"/>
+              </a:p>
+            </p:txBody>
+          </p:sp>
+          <p:pic>
+            <p:nvPicPr>
+              <p:cNvPr id="6" name="Picture 5"/>
+              <p:cNvPicPr>
+                <a:picLocks noChangeAspect="1"/>
+              </p:cNvPicPr>
+              <p:nvPr/>
+            </p:nvPicPr>
+            <p:blipFill rotWithShape="1">
+              <a:blip r:embed="rId3" cstate="print">
+                <a:extLst>
+                  <a:ext uri="{28A0092B-C50C-407E-A947-70E740481C1C}">
+                    <a14:useLocalDpi xmlns:a14="http://schemas.microsoft.com/office/drawing/2010/main" val="0"/>
+                  </a:ext>
+                </a:extLst>
+              </a:blip>
+              <a:srcRect l="44495" t="18910" r="40611" b="29930"/>
+              <a:stretch/>
+            </p:blipFill>
+            <p:spPr>
+              <a:xfrm>
+                <a:off x="7660640" y="2844800"/>
+                <a:ext cx="817880" cy="1615440"/>
+              </a:xfrm>
+              <a:prstGeom prst="rect">
+                <a:avLst/>
+              </a:prstGeom>
+            </p:spPr>
+          </p:pic>
+          <p:sp>
+            <p:nvSpPr>
+              <p:cNvPr id="7" name="TextBox 6"/>
+              <p:cNvSpPr txBox="1"/>
+              <p:nvPr/>
+            </p:nvSpPr>
+            <p:spPr>
+              <a:xfrm>
+                <a:off x="6344920" y="177204"/>
+                <a:ext cx="928370" cy="369332"/>
+              </a:xfrm>
+              <a:prstGeom prst="rect">
+                <a:avLst/>
+              </a:prstGeom>
+              <a:noFill/>
+            </p:spPr>
+            <p:txBody>
+              <a:bodyPr wrap="square" rtlCol="0">
+                <a:spAutoFit/>
+              </a:bodyPr>
+              <a:lstStyle/>
+              <a:p>
+                <a:r>
+                  <a:rPr lang="en-US" b="1" dirty="0"/>
+                  <a:t>Sunny</a:t>
+                </a:r>
+                <a:endParaRPr lang="en-US" sz="1400" b="1" dirty="0"/>
+              </a:p>
+            </p:txBody>
+          </p:sp>
+          <p:sp>
+            <p:nvSpPr>
+              <p:cNvPr id="9" name="TextBox 8"/>
+              <p:cNvSpPr txBox="1"/>
+              <p:nvPr/>
+            </p:nvSpPr>
+            <p:spPr>
+              <a:xfrm>
+                <a:off x="2247900" y="177204"/>
+                <a:ext cx="1581150" cy="369332"/>
+              </a:xfrm>
+              <a:prstGeom prst="rect">
+                <a:avLst/>
+              </a:prstGeom>
+              <a:noFill/>
+            </p:spPr>
+            <p:txBody>
+              <a:bodyPr wrap="square" rtlCol="0">
+                <a:spAutoFit/>
+              </a:bodyPr>
+              <a:lstStyle/>
+              <a:p>
+                <a:r>
+                  <a:rPr lang="en-US" b="1" dirty="0"/>
+                  <a:t>River Only</a:t>
+                </a:r>
+                <a:endParaRPr lang="en-US" sz="1400" b="1" dirty="0"/>
+              </a:p>
+            </p:txBody>
+          </p:sp>
+        </p:grpSp>
+        <p:pic>
+          <p:nvPicPr>
+            <p:cNvPr id="5" name="Picture 4" descr="Chart&#10;&#10;Description automatically generated">
+              <a:extLst>
+                <a:ext uri="{FF2B5EF4-FFF2-40B4-BE49-F238E27FC236}">
+                  <a16:creationId xmlns:a16="http://schemas.microsoft.com/office/drawing/2014/main" id="{805A9F84-76CF-4C9F-9991-7B0E19BAF5CA}"/>
+                </a:ext>
+              </a:extLst>
+            </p:cNvPr>
+            <p:cNvPicPr>
+              <a:picLocks noChangeAspect="1"/>
+            </p:cNvPicPr>
+            <p:nvPr/>
+          </p:nvPicPr>
+          <p:blipFill rotWithShape="1">
+            <a:blip r:embed="rId4" cstate="print">
+              <a:extLst>
+                <a:ext uri="{28A0092B-C50C-407E-A947-70E740481C1C}">
+                  <a14:useLocalDpi xmlns:a14="http://schemas.microsoft.com/office/drawing/2010/main" val="0"/>
+                </a:ext>
+              </a:extLst>
+            </a:blip>
+            <a:srcRect l="43604" t="18151" r="40296" b="26546"/>
+            <a:stretch/>
+          </p:blipFill>
+          <p:spPr>
+            <a:xfrm>
+              <a:off x="7660639" y="2844800"/>
+              <a:ext cx="817881" cy="1615440"/>
+            </a:xfrm>
+            <a:prstGeom prst="rect">
+              <a:avLst/>
+            </a:prstGeom>
+          </p:spPr>
+        </p:pic>
+      </p:grpSp>
+    </p:spTree>
+    <p:extLst>
+      <p:ext uri="{BB962C8B-B14F-4D97-AF65-F5344CB8AC3E}">
+        <p14:creationId xmlns:p14="http://schemas.microsoft.com/office/powerpoint/2010/main" val="3314766857"/>
+      </p:ext>
+    </p:extLst>
+  </p:cSld>
+  <p:clrMapOvr>
+    <a:masterClrMapping/>
+  </p:clrMapOvr>
+</p:sld>
+</file>
+
+<file path=ppt/slides/slide3.xml><?xml version="1.0" encoding="utf-8"?>
+<p:sld xmlns:a="http://schemas.openxmlformats.org/drawingml/2006/main" xmlns:r="http://schemas.openxmlformats.org/officeDocument/2006/relationships" xmlns:p="http://schemas.openxmlformats.org/presentationml/2006/main">
+  <p:cSld>
+    <p:spTree>
+      <p:nvGrpSpPr>
+        <p:cNvPr id="1" name=""/>
+        <p:cNvGrpSpPr/>
+        <p:nvPr/>
+      </p:nvGrpSpPr>
+      <p:grpSpPr>
+        <a:xfrm>
+          <a:off x="0" y="0"/>
+          <a:ext cx="0" cy="0"/>
+          <a:chOff x="0" y="0"/>
+          <a:chExt cx="0" cy="0"/>
+        </a:xfrm>
+      </p:grpSpPr>
+      <p:grpSp>
+        <p:nvGrpSpPr>
+          <p:cNvPr id="11" name="Group 10">
+            <a:extLst>
+              <a:ext uri="{FF2B5EF4-FFF2-40B4-BE49-F238E27FC236}">
+                <a16:creationId xmlns:a16="http://schemas.microsoft.com/office/drawing/2014/main" id="{3ABA490A-925C-4C11-B3B5-ABD90C618042}"/>
+              </a:ext>
+            </a:extLst>
+          </p:cNvPr>
+          <p:cNvGrpSpPr/>
+          <p:nvPr/>
+        </p:nvGrpSpPr>
+        <p:grpSpPr>
+          <a:xfrm>
+            <a:off x="1282700" y="177204"/>
+            <a:ext cx="7195820" cy="7061796"/>
+            <a:chOff x="1282700" y="177204"/>
+            <a:chExt cx="7195820" cy="7061796"/>
+          </a:xfrm>
+        </p:grpSpPr>
+        <p:grpSp>
+          <p:nvGrpSpPr>
+            <p:cNvPr id="10" name="Group 9"/>
+            <p:cNvGrpSpPr/>
+            <p:nvPr/>
+          </p:nvGrpSpPr>
+          <p:grpSpPr>
+            <a:xfrm>
+              <a:off x="1282700" y="177204"/>
+              <a:ext cx="7195820" cy="7061796"/>
+              <a:chOff x="1282700" y="177204"/>
+              <a:chExt cx="7195820" cy="7061796"/>
+            </a:xfrm>
+          </p:grpSpPr>
+          <p:sp>
+            <p:nvSpPr>
+              <p:cNvPr id="8" name="Rectangle 7"/>
+              <p:cNvSpPr/>
+              <p:nvPr/>
+            </p:nvSpPr>
+            <p:spPr>
+              <a:xfrm>
+                <a:off x="1282700" y="223520"/>
+                <a:ext cx="7195820" cy="7015480"/>
+              </a:xfrm>
+              <a:prstGeom prst="rect">
+                <a:avLst/>
+              </a:prstGeom>
+              <a:solidFill>
+                <a:schemeClr val="bg1"/>
+              </a:solidFill>
+              <a:ln>
+                <a:solidFill>
+                  <a:schemeClr val="bg1"/>
+                </a:solidFill>
+              </a:ln>
+            </p:spPr>
+            <p:style>
+              <a:lnRef idx="2">
+                <a:schemeClr val="accent1">
+                  <a:shade val="50000"/>
+                </a:schemeClr>
+              </a:lnRef>
+              <a:fillRef idx="1">
+                <a:schemeClr val="accent1"/>
+              </a:fillRef>
+              <a:effectRef idx="0">
+                <a:schemeClr val="accent1"/>
+              </a:effectRef>
+              <a:fontRef idx="minor">
+                <a:schemeClr val="lt1"/>
+              </a:fontRef>
+            </p:style>
+            <p:txBody>
+              <a:bodyPr rtlCol="0" anchor="ctr"/>
+              <a:lstStyle/>
+              <a:p>
+                <a:pPr algn="ctr"/>
+                <a:endParaRPr lang="en-US"/>
+              </a:p>
+            </p:txBody>
+          </p:sp>
+          <p:pic>
+            <p:nvPicPr>
+              <p:cNvPr id="2" name="Picture 1"/>
+              <p:cNvPicPr>
+                <a:picLocks noChangeAspect="1"/>
+              </p:cNvPicPr>
+              <p:nvPr/>
+            </p:nvPicPr>
+            <p:blipFill>
+              <a:blip r:embed="rId2" cstate="print">
+                <a:extLst>
+                  <a:ext uri="{28A0092B-C50C-407E-A947-70E740481C1C}">
+                    <a14:useLocalDpi xmlns:a14="http://schemas.microsoft.com/office/drawing/2010/main" val="0"/>
+                  </a:ext>
+                </a:extLst>
+              </a:blip>
+              <a:srcRect/>
+              <a:stretch/>
+            </p:blipFill>
+            <p:spPr>
+              <a:xfrm>
+                <a:off x="1515617" y="265430"/>
+                <a:ext cx="6139051" cy="6821168"/>
+              </a:xfrm>
+              <a:prstGeom prst="rect">
+                <a:avLst/>
+              </a:prstGeom>
+            </p:spPr>
+          </p:pic>
+          <p:sp>
+            <p:nvSpPr>
+              <p:cNvPr id="3" name="TextBox 2"/>
+              <p:cNvSpPr txBox="1"/>
+              <p:nvPr/>
+            </p:nvSpPr>
+            <p:spPr>
+              <a:xfrm>
+                <a:off x="4386580" y="177204"/>
+                <a:ext cx="928370" cy="369332"/>
+              </a:xfrm>
+              <a:prstGeom prst="rect">
+                <a:avLst/>
+              </a:prstGeom>
+              <a:noFill/>
+            </p:spPr>
+            <p:txBody>
+              <a:bodyPr wrap="square" rtlCol="0">
+                <a:spAutoFit/>
+              </a:bodyPr>
+              <a:lstStyle/>
+              <a:p>
+                <a:r>
+                  <a:rPr lang="en-US" b="1" dirty="0"/>
+                  <a:t>Shady</a:t>
+                </a:r>
+                <a:endParaRPr lang="en-US" sz="1400" b="1" dirty="0"/>
+              </a:p>
+            </p:txBody>
+          </p:sp>
+          <p:pic>
+            <p:nvPicPr>
+              <p:cNvPr id="6" name="Picture 5"/>
+              <p:cNvPicPr>
+                <a:picLocks noChangeAspect="1"/>
+              </p:cNvPicPr>
+              <p:nvPr/>
+            </p:nvPicPr>
+            <p:blipFill rotWithShape="1">
+              <a:blip r:embed="rId3" cstate="print">
+                <a:extLst>
+                  <a:ext uri="{28A0092B-C50C-407E-A947-70E740481C1C}">
+                    <a14:useLocalDpi xmlns:a14="http://schemas.microsoft.com/office/drawing/2010/main" val="0"/>
+                  </a:ext>
+                </a:extLst>
+              </a:blip>
+              <a:srcRect l="44495" t="18910" r="40611" b="29930"/>
+              <a:stretch/>
+            </p:blipFill>
+            <p:spPr>
+              <a:xfrm>
+                <a:off x="7660640" y="2844800"/>
+                <a:ext cx="817880" cy="1615440"/>
+              </a:xfrm>
+              <a:prstGeom prst="rect">
+                <a:avLst/>
+              </a:prstGeom>
+            </p:spPr>
+          </p:pic>
+          <p:sp>
+            <p:nvSpPr>
+              <p:cNvPr id="7" name="TextBox 6"/>
+              <p:cNvSpPr txBox="1"/>
+              <p:nvPr/>
+            </p:nvSpPr>
+            <p:spPr>
+              <a:xfrm>
+                <a:off x="6344920" y="177204"/>
+                <a:ext cx="928370" cy="369332"/>
+              </a:xfrm>
+              <a:prstGeom prst="rect">
+                <a:avLst/>
+              </a:prstGeom>
+              <a:noFill/>
+            </p:spPr>
+            <p:txBody>
+              <a:bodyPr wrap="square" rtlCol="0">
+                <a:spAutoFit/>
+              </a:bodyPr>
+              <a:lstStyle/>
+              <a:p>
+                <a:r>
+                  <a:rPr lang="en-US" b="1" dirty="0"/>
+                  <a:t>Sunny</a:t>
+                </a:r>
+                <a:endParaRPr lang="en-US" sz="1400" b="1" dirty="0"/>
+              </a:p>
+            </p:txBody>
+          </p:sp>
+          <p:sp>
+            <p:nvSpPr>
+              <p:cNvPr id="9" name="TextBox 8"/>
+              <p:cNvSpPr txBox="1"/>
+              <p:nvPr/>
+            </p:nvSpPr>
+            <p:spPr>
+              <a:xfrm>
+                <a:off x="2247900" y="177204"/>
+                <a:ext cx="1581150" cy="369332"/>
+              </a:xfrm>
+              <a:prstGeom prst="rect">
+                <a:avLst/>
+              </a:prstGeom>
+              <a:noFill/>
+            </p:spPr>
+            <p:txBody>
+              <a:bodyPr wrap="square" rtlCol="0">
+                <a:spAutoFit/>
+              </a:bodyPr>
+              <a:lstStyle/>
+              <a:p>
+                <a:r>
+                  <a:rPr lang="en-US" b="1" dirty="0"/>
+                  <a:t>River Only</a:t>
+                </a:r>
+                <a:endParaRPr lang="en-US" sz="1400" b="1" dirty="0"/>
+              </a:p>
+            </p:txBody>
+          </p:sp>
+        </p:grpSp>
+        <p:pic>
+          <p:nvPicPr>
+            <p:cNvPr id="5" name="Picture 4" descr="Chart&#10;&#10;Description automatically generated">
+              <a:extLst>
+                <a:ext uri="{FF2B5EF4-FFF2-40B4-BE49-F238E27FC236}">
+                  <a16:creationId xmlns:a16="http://schemas.microsoft.com/office/drawing/2014/main" id="{805A9F84-76CF-4C9F-9991-7B0E19BAF5CA}"/>
+                </a:ext>
+              </a:extLst>
+            </p:cNvPr>
+            <p:cNvPicPr>
+              <a:picLocks noChangeAspect="1"/>
+            </p:cNvPicPr>
+            <p:nvPr/>
+          </p:nvPicPr>
+          <p:blipFill rotWithShape="1">
+            <a:blip r:embed="rId4" cstate="print">
+              <a:extLst>
+                <a:ext uri="{28A0092B-C50C-407E-A947-70E740481C1C}">
+                  <a14:useLocalDpi xmlns:a14="http://schemas.microsoft.com/office/drawing/2010/main" val="0"/>
+                </a:ext>
+              </a:extLst>
+            </a:blip>
+            <a:srcRect l="43604" t="18151" r="40296" b="26546"/>
+            <a:stretch/>
+          </p:blipFill>
+          <p:spPr>
+            <a:xfrm>
+              <a:off x="7660639" y="2844800"/>
+              <a:ext cx="817881" cy="1615440"/>
+            </a:xfrm>
+            <a:prstGeom prst="rect">
+              <a:avLst/>
+            </a:prstGeom>
+          </p:spPr>
+        </p:pic>
+      </p:grpSp>
+      <p:pic>
+        <p:nvPicPr>
+          <p:cNvPr id="12" name="Picture 11" descr="Chart&#10;&#10;Description automatically generated">
+            <a:extLst>
+              <a:ext uri="{FF2B5EF4-FFF2-40B4-BE49-F238E27FC236}">
+                <a16:creationId xmlns:a16="http://schemas.microsoft.com/office/drawing/2014/main" id="{BB5DA9F1-C079-46EF-AF8C-0253E68C16CD}"/>
+              </a:ext>
+            </a:extLst>
+          </p:cNvPr>
+          <p:cNvPicPr>
+            <a:picLocks noChangeAspect="1"/>
+          </p:cNvPicPr>
+          <p:nvPr/>
+        </p:nvPicPr>
+        <p:blipFill rotWithShape="1">
+          <a:blip r:embed="rId5" cstate="print">
+            <a:extLst>
+              <a:ext uri="{28A0092B-C50C-407E-A947-70E740481C1C}">
+                <a14:useLocalDpi xmlns:a14="http://schemas.microsoft.com/office/drawing/2010/main" val="0"/>
+              </a:ext>
+            </a:extLst>
+          </a:blip>
+          <a:srcRect l="44150" t="17196" r="39750" b="27501"/>
+          <a:stretch/>
+        </p:blipFill>
+        <p:spPr>
+          <a:xfrm>
+            <a:off x="7660640" y="2844800"/>
+            <a:ext cx="817880" cy="1615440"/>
+          </a:xfrm>
+          <a:prstGeom prst="rect">
+            <a:avLst/>
+          </a:prstGeom>
+        </p:spPr>
+      </p:pic>
+    </p:spTree>
+    <p:extLst>
+      <p:ext uri="{BB962C8B-B14F-4D97-AF65-F5344CB8AC3E}">
+        <p14:creationId xmlns:p14="http://schemas.microsoft.com/office/powerpoint/2010/main" val="2119660036"/>
+      </p:ext>
+    </p:extLst>
+  </p:cSld>
+  <p:clrMapOvr>
+    <a:masterClrMapping/>
+  </p:clrMapOvr>
+</p:sld>
+</file>
+
+<file path=ppt/slides/slide4.xml><?xml version="1.0" encoding="utf-8"?>
 <p:sld xmlns:a="http://schemas.openxmlformats.org/drawingml/2006/main" xmlns:r="http://schemas.openxmlformats.org/officeDocument/2006/relationships" xmlns:p="http://schemas.openxmlformats.org/presentationml/2006/main">
   <p:cSld>
     <p:spTree>
@@ -3453,7 +6270,636 @@
 </p:sld>
 </file>
 
-<file path=ppt/slides/slide3.xml><?xml version="1.0" encoding="utf-8"?>
+<file path=ppt/slides/slide5.xml><?xml version="1.0" encoding="utf-8"?>
+<p:sld xmlns:a="http://schemas.openxmlformats.org/drawingml/2006/main" xmlns:r="http://schemas.openxmlformats.org/officeDocument/2006/relationships" xmlns:p="http://schemas.openxmlformats.org/presentationml/2006/main">
+  <p:cSld>
+    <p:spTree>
+      <p:nvGrpSpPr>
+        <p:cNvPr id="1" name=""/>
+        <p:cNvGrpSpPr/>
+        <p:nvPr/>
+      </p:nvGrpSpPr>
+      <p:grpSpPr>
+        <a:xfrm>
+          <a:off x="0" y="0"/>
+          <a:ext cx="0" cy="0"/>
+          <a:chOff x="0" y="0"/>
+          <a:chExt cx="0" cy="0"/>
+        </a:xfrm>
+      </p:grpSpPr>
+      <p:grpSp>
+        <p:nvGrpSpPr>
+          <p:cNvPr id="4" name="Group 3">
+            <a:extLst>
+              <a:ext uri="{FF2B5EF4-FFF2-40B4-BE49-F238E27FC236}">
+                <a16:creationId xmlns:a16="http://schemas.microsoft.com/office/drawing/2014/main" id="{E482032E-03AE-43C4-868D-98A584BC88B7}"/>
+              </a:ext>
+            </a:extLst>
+          </p:cNvPr>
+          <p:cNvGrpSpPr/>
+          <p:nvPr/>
+        </p:nvGrpSpPr>
+        <p:grpSpPr>
+          <a:xfrm>
+            <a:off x="1282700" y="177204"/>
+            <a:ext cx="7195820" cy="7061796"/>
+            <a:chOff x="1282700" y="177204"/>
+            <a:chExt cx="7195820" cy="7061796"/>
+          </a:xfrm>
+        </p:grpSpPr>
+        <p:grpSp>
+          <p:nvGrpSpPr>
+            <p:cNvPr id="10" name="Group 9"/>
+            <p:cNvGrpSpPr/>
+            <p:nvPr/>
+          </p:nvGrpSpPr>
+          <p:grpSpPr>
+            <a:xfrm>
+              <a:off x="1282700" y="177204"/>
+              <a:ext cx="7195820" cy="7061796"/>
+              <a:chOff x="1282700" y="177204"/>
+              <a:chExt cx="7195820" cy="7061796"/>
+            </a:xfrm>
+          </p:grpSpPr>
+          <p:sp>
+            <p:nvSpPr>
+              <p:cNvPr id="8" name="Rectangle 7"/>
+              <p:cNvSpPr/>
+              <p:nvPr/>
+            </p:nvSpPr>
+            <p:spPr>
+              <a:xfrm>
+                <a:off x="1282700" y="223520"/>
+                <a:ext cx="7195820" cy="7015480"/>
+              </a:xfrm>
+              <a:prstGeom prst="rect">
+                <a:avLst/>
+              </a:prstGeom>
+              <a:solidFill>
+                <a:schemeClr val="bg1"/>
+              </a:solidFill>
+              <a:ln>
+                <a:solidFill>
+                  <a:schemeClr val="bg1"/>
+                </a:solidFill>
+              </a:ln>
+            </p:spPr>
+            <p:style>
+              <a:lnRef idx="2">
+                <a:schemeClr val="accent1">
+                  <a:shade val="50000"/>
+                </a:schemeClr>
+              </a:lnRef>
+              <a:fillRef idx="1">
+                <a:schemeClr val="accent1"/>
+              </a:fillRef>
+              <a:effectRef idx="0">
+                <a:schemeClr val="accent1"/>
+              </a:effectRef>
+              <a:fontRef idx="minor">
+                <a:schemeClr val="lt1"/>
+              </a:fontRef>
+            </p:style>
+            <p:txBody>
+              <a:bodyPr rtlCol="0" anchor="ctr"/>
+              <a:lstStyle/>
+              <a:p>
+                <a:pPr algn="ctr"/>
+                <a:endParaRPr lang="en-US"/>
+              </a:p>
+            </p:txBody>
+          </p:sp>
+          <p:pic>
+            <p:nvPicPr>
+              <p:cNvPr id="2" name="Picture 1"/>
+              <p:cNvPicPr>
+                <a:picLocks noChangeAspect="1"/>
+              </p:cNvPicPr>
+              <p:nvPr/>
+            </p:nvPicPr>
+            <p:blipFill>
+              <a:blip r:embed="rId2" cstate="print">
+                <a:extLst>
+                  <a:ext uri="{28A0092B-C50C-407E-A947-70E740481C1C}">
+                    <a14:useLocalDpi xmlns:a14="http://schemas.microsoft.com/office/drawing/2010/main" val="0"/>
+                  </a:ext>
+                </a:extLst>
+              </a:blip>
+              <a:srcRect/>
+              <a:stretch/>
+            </p:blipFill>
+            <p:spPr>
+              <a:xfrm>
+                <a:off x="1515617" y="265430"/>
+                <a:ext cx="6139051" cy="6821168"/>
+              </a:xfrm>
+              <a:prstGeom prst="rect">
+                <a:avLst/>
+              </a:prstGeom>
+            </p:spPr>
+          </p:pic>
+          <p:sp>
+            <p:nvSpPr>
+              <p:cNvPr id="3" name="TextBox 2"/>
+              <p:cNvSpPr txBox="1"/>
+              <p:nvPr/>
+            </p:nvSpPr>
+            <p:spPr>
+              <a:xfrm>
+                <a:off x="4386580" y="177204"/>
+                <a:ext cx="812800" cy="369332"/>
+              </a:xfrm>
+              <a:prstGeom prst="rect">
+                <a:avLst/>
+              </a:prstGeom>
+              <a:noFill/>
+            </p:spPr>
+            <p:txBody>
+              <a:bodyPr wrap="square" rtlCol="0">
+                <a:spAutoFit/>
+              </a:bodyPr>
+              <a:lstStyle/>
+              <a:p>
+                <a:r>
+                  <a:rPr lang="en-US" b="1" dirty="0"/>
+                  <a:t>Shady</a:t>
+                </a:r>
+                <a:endParaRPr lang="en-US" sz="1400" b="1" dirty="0"/>
+              </a:p>
+            </p:txBody>
+          </p:sp>
+          <p:pic>
+            <p:nvPicPr>
+              <p:cNvPr id="6" name="Picture 5"/>
+              <p:cNvPicPr>
+                <a:picLocks noChangeAspect="1"/>
+              </p:cNvPicPr>
+              <p:nvPr/>
+            </p:nvPicPr>
+            <p:blipFill rotWithShape="1">
+              <a:blip r:embed="rId3" cstate="print">
+                <a:extLst>
+                  <a:ext uri="{28A0092B-C50C-407E-A947-70E740481C1C}">
+                    <a14:useLocalDpi xmlns:a14="http://schemas.microsoft.com/office/drawing/2010/main" val="0"/>
+                  </a:ext>
+                </a:extLst>
+              </a:blip>
+              <a:srcRect l="44495" t="18910" r="40611" b="29930"/>
+              <a:stretch/>
+            </p:blipFill>
+            <p:spPr>
+              <a:xfrm>
+                <a:off x="7660640" y="2844800"/>
+                <a:ext cx="817880" cy="1615440"/>
+              </a:xfrm>
+              <a:prstGeom prst="rect">
+                <a:avLst/>
+              </a:prstGeom>
+            </p:spPr>
+          </p:pic>
+          <p:sp>
+            <p:nvSpPr>
+              <p:cNvPr id="7" name="TextBox 6"/>
+              <p:cNvSpPr txBox="1"/>
+              <p:nvPr/>
+            </p:nvSpPr>
+            <p:spPr>
+              <a:xfrm>
+                <a:off x="6344920" y="177204"/>
+                <a:ext cx="812800" cy="369332"/>
+              </a:xfrm>
+              <a:prstGeom prst="rect">
+                <a:avLst/>
+              </a:prstGeom>
+              <a:noFill/>
+            </p:spPr>
+            <p:txBody>
+              <a:bodyPr wrap="square" rtlCol="0">
+                <a:spAutoFit/>
+              </a:bodyPr>
+              <a:lstStyle/>
+              <a:p>
+                <a:r>
+                  <a:rPr lang="en-US" b="1" dirty="0"/>
+                  <a:t>Sunny</a:t>
+                </a:r>
+                <a:endParaRPr lang="en-US" sz="1400" b="1" dirty="0"/>
+              </a:p>
+            </p:txBody>
+          </p:sp>
+          <p:sp>
+            <p:nvSpPr>
+              <p:cNvPr id="9" name="TextBox 8"/>
+              <p:cNvSpPr txBox="1"/>
+              <p:nvPr/>
+            </p:nvSpPr>
+            <p:spPr>
+              <a:xfrm>
+                <a:off x="2247900" y="177204"/>
+                <a:ext cx="1308100" cy="369332"/>
+              </a:xfrm>
+              <a:prstGeom prst="rect">
+                <a:avLst/>
+              </a:prstGeom>
+              <a:noFill/>
+            </p:spPr>
+            <p:txBody>
+              <a:bodyPr wrap="square" rtlCol="0">
+                <a:spAutoFit/>
+              </a:bodyPr>
+              <a:lstStyle/>
+              <a:p>
+                <a:r>
+                  <a:rPr lang="en-US" b="1" dirty="0"/>
+                  <a:t>River Only</a:t>
+                </a:r>
+                <a:endParaRPr lang="en-US" sz="1400" b="1" dirty="0"/>
+              </a:p>
+            </p:txBody>
+          </p:sp>
+        </p:grpSp>
+        <p:pic>
+          <p:nvPicPr>
+            <p:cNvPr id="5" name="Picture 4" descr="Chart&#10;&#10;Description automatically generated">
+              <a:extLst>
+                <a:ext uri="{FF2B5EF4-FFF2-40B4-BE49-F238E27FC236}">
+                  <a16:creationId xmlns:a16="http://schemas.microsoft.com/office/drawing/2014/main" id="{805A9F84-76CF-4C9F-9991-7B0E19BAF5CA}"/>
+                </a:ext>
+              </a:extLst>
+            </p:cNvPr>
+            <p:cNvPicPr>
+              <a:picLocks noChangeAspect="1"/>
+            </p:cNvPicPr>
+            <p:nvPr/>
+          </p:nvPicPr>
+          <p:blipFill rotWithShape="1">
+            <a:blip r:embed="rId4" cstate="print">
+              <a:extLst>
+                <a:ext uri="{28A0092B-C50C-407E-A947-70E740481C1C}">
+                  <a14:useLocalDpi xmlns:a14="http://schemas.microsoft.com/office/drawing/2010/main" val="0"/>
+                </a:ext>
+              </a:extLst>
+            </a:blip>
+            <a:srcRect l="43604" t="18151" r="40296" b="26546"/>
+            <a:stretch/>
+          </p:blipFill>
+          <p:spPr>
+            <a:xfrm>
+              <a:off x="7660639" y="2844800"/>
+              <a:ext cx="817881" cy="1615440"/>
+            </a:xfrm>
+            <a:prstGeom prst="rect">
+              <a:avLst/>
+            </a:prstGeom>
+          </p:spPr>
+        </p:pic>
+      </p:grpSp>
+    </p:spTree>
+    <p:extLst>
+      <p:ext uri="{BB962C8B-B14F-4D97-AF65-F5344CB8AC3E}">
+        <p14:creationId xmlns:p14="http://schemas.microsoft.com/office/powerpoint/2010/main" val="3349323715"/>
+      </p:ext>
+    </p:extLst>
+  </p:cSld>
+  <p:clrMapOvr>
+    <a:masterClrMapping/>
+  </p:clrMapOvr>
+</p:sld>
+</file>
+
+<file path=ppt/slides/slide6.xml><?xml version="1.0" encoding="utf-8"?>
+<p:sld xmlns:a="http://schemas.openxmlformats.org/drawingml/2006/main" xmlns:r="http://schemas.openxmlformats.org/officeDocument/2006/relationships" xmlns:p="http://schemas.openxmlformats.org/presentationml/2006/main">
+  <p:cSld>
+    <p:spTree>
+      <p:nvGrpSpPr>
+        <p:cNvPr id="1" name=""/>
+        <p:cNvGrpSpPr/>
+        <p:nvPr/>
+      </p:nvGrpSpPr>
+      <p:grpSpPr>
+        <a:xfrm>
+          <a:off x="0" y="0"/>
+          <a:ext cx="0" cy="0"/>
+          <a:chOff x="0" y="0"/>
+          <a:chExt cx="0" cy="0"/>
+        </a:xfrm>
+      </p:grpSpPr>
+      <p:grpSp>
+        <p:nvGrpSpPr>
+          <p:cNvPr id="4" name="Group 3">
+            <a:extLst>
+              <a:ext uri="{FF2B5EF4-FFF2-40B4-BE49-F238E27FC236}">
+                <a16:creationId xmlns:a16="http://schemas.microsoft.com/office/drawing/2014/main" id="{E482032E-03AE-43C4-868D-98A584BC88B7}"/>
+              </a:ext>
+            </a:extLst>
+          </p:cNvPr>
+          <p:cNvGrpSpPr/>
+          <p:nvPr/>
+        </p:nvGrpSpPr>
+        <p:grpSpPr>
+          <a:xfrm>
+            <a:off x="1282700" y="177204"/>
+            <a:ext cx="7195820" cy="7061796"/>
+            <a:chOff x="1282700" y="177204"/>
+            <a:chExt cx="7195820" cy="7061796"/>
+          </a:xfrm>
+        </p:grpSpPr>
+        <p:grpSp>
+          <p:nvGrpSpPr>
+            <p:cNvPr id="10" name="Group 9"/>
+            <p:cNvGrpSpPr/>
+            <p:nvPr/>
+          </p:nvGrpSpPr>
+          <p:grpSpPr>
+            <a:xfrm>
+              <a:off x="1282700" y="177204"/>
+              <a:ext cx="7195820" cy="7061796"/>
+              <a:chOff x="1282700" y="177204"/>
+              <a:chExt cx="7195820" cy="7061796"/>
+            </a:xfrm>
+          </p:grpSpPr>
+          <p:sp>
+            <p:nvSpPr>
+              <p:cNvPr id="8" name="Rectangle 7"/>
+              <p:cNvSpPr/>
+              <p:nvPr/>
+            </p:nvSpPr>
+            <p:spPr>
+              <a:xfrm>
+                <a:off x="1282700" y="223520"/>
+                <a:ext cx="7195820" cy="7015480"/>
+              </a:xfrm>
+              <a:prstGeom prst="rect">
+                <a:avLst/>
+              </a:prstGeom>
+              <a:solidFill>
+                <a:schemeClr val="bg1"/>
+              </a:solidFill>
+              <a:ln>
+                <a:solidFill>
+                  <a:schemeClr val="bg1"/>
+                </a:solidFill>
+              </a:ln>
+            </p:spPr>
+            <p:style>
+              <a:lnRef idx="2">
+                <a:schemeClr val="accent1">
+                  <a:shade val="50000"/>
+                </a:schemeClr>
+              </a:lnRef>
+              <a:fillRef idx="1">
+                <a:schemeClr val="accent1"/>
+              </a:fillRef>
+              <a:effectRef idx="0">
+                <a:schemeClr val="accent1"/>
+              </a:effectRef>
+              <a:fontRef idx="minor">
+                <a:schemeClr val="lt1"/>
+              </a:fontRef>
+            </p:style>
+            <p:txBody>
+              <a:bodyPr rtlCol="0" anchor="ctr"/>
+              <a:lstStyle/>
+              <a:p>
+                <a:pPr algn="ctr"/>
+                <a:endParaRPr lang="en-US"/>
+              </a:p>
+            </p:txBody>
+          </p:sp>
+          <p:pic>
+            <p:nvPicPr>
+              <p:cNvPr id="2" name="Picture 1"/>
+              <p:cNvPicPr>
+                <a:picLocks noChangeAspect="1"/>
+              </p:cNvPicPr>
+              <p:nvPr/>
+            </p:nvPicPr>
+            <p:blipFill>
+              <a:blip r:embed="rId2" cstate="print">
+                <a:extLst>
+                  <a:ext uri="{28A0092B-C50C-407E-A947-70E740481C1C}">
+                    <a14:useLocalDpi xmlns:a14="http://schemas.microsoft.com/office/drawing/2010/main" val="0"/>
+                  </a:ext>
+                </a:extLst>
+              </a:blip>
+              <a:srcRect/>
+              <a:stretch/>
+            </p:blipFill>
+            <p:spPr>
+              <a:xfrm>
+                <a:off x="1515617" y="265430"/>
+                <a:ext cx="6139050" cy="6821168"/>
+              </a:xfrm>
+              <a:prstGeom prst="rect">
+                <a:avLst/>
+              </a:prstGeom>
+            </p:spPr>
+          </p:pic>
+          <p:sp>
+            <p:nvSpPr>
+              <p:cNvPr id="3" name="TextBox 2"/>
+              <p:cNvSpPr txBox="1"/>
+              <p:nvPr/>
+            </p:nvSpPr>
+            <p:spPr>
+              <a:xfrm>
+                <a:off x="4386580" y="177204"/>
+                <a:ext cx="812800" cy="369332"/>
+              </a:xfrm>
+              <a:prstGeom prst="rect">
+                <a:avLst/>
+              </a:prstGeom>
+              <a:noFill/>
+            </p:spPr>
+            <p:txBody>
+              <a:bodyPr wrap="square" rtlCol="0">
+                <a:spAutoFit/>
+              </a:bodyPr>
+              <a:lstStyle/>
+              <a:p>
+                <a:r>
+                  <a:rPr lang="en-US" b="1" dirty="0"/>
+                  <a:t>Shady</a:t>
+                </a:r>
+                <a:endParaRPr lang="en-US" sz="1400" b="1" dirty="0"/>
+              </a:p>
+            </p:txBody>
+          </p:sp>
+          <p:pic>
+            <p:nvPicPr>
+              <p:cNvPr id="6" name="Picture 5"/>
+              <p:cNvPicPr>
+                <a:picLocks noChangeAspect="1"/>
+              </p:cNvPicPr>
+              <p:nvPr/>
+            </p:nvPicPr>
+            <p:blipFill rotWithShape="1">
+              <a:blip r:embed="rId3" cstate="print">
+                <a:extLst>
+                  <a:ext uri="{28A0092B-C50C-407E-A947-70E740481C1C}">
+                    <a14:useLocalDpi xmlns:a14="http://schemas.microsoft.com/office/drawing/2010/main" val="0"/>
+                  </a:ext>
+                </a:extLst>
+              </a:blip>
+              <a:srcRect l="44495" t="18910" r="40611" b="29930"/>
+              <a:stretch/>
+            </p:blipFill>
+            <p:spPr>
+              <a:xfrm>
+                <a:off x="7660640" y="2844800"/>
+                <a:ext cx="817880" cy="1615440"/>
+              </a:xfrm>
+              <a:prstGeom prst="rect">
+                <a:avLst/>
+              </a:prstGeom>
+            </p:spPr>
+          </p:pic>
+          <p:sp>
+            <p:nvSpPr>
+              <p:cNvPr id="7" name="TextBox 6"/>
+              <p:cNvSpPr txBox="1"/>
+              <p:nvPr/>
+            </p:nvSpPr>
+            <p:spPr>
+              <a:xfrm>
+                <a:off x="6344920" y="177204"/>
+                <a:ext cx="812800" cy="369332"/>
+              </a:xfrm>
+              <a:prstGeom prst="rect">
+                <a:avLst/>
+              </a:prstGeom>
+              <a:noFill/>
+            </p:spPr>
+            <p:txBody>
+              <a:bodyPr wrap="square" rtlCol="0">
+                <a:spAutoFit/>
+              </a:bodyPr>
+              <a:lstStyle/>
+              <a:p>
+                <a:r>
+                  <a:rPr lang="en-US" b="1" dirty="0"/>
+                  <a:t>Sunny</a:t>
+                </a:r>
+                <a:endParaRPr lang="en-US" sz="1400" b="1" dirty="0"/>
+              </a:p>
+            </p:txBody>
+          </p:sp>
+          <p:sp>
+            <p:nvSpPr>
+              <p:cNvPr id="9" name="TextBox 8"/>
+              <p:cNvSpPr txBox="1"/>
+              <p:nvPr/>
+            </p:nvSpPr>
+            <p:spPr>
+              <a:xfrm>
+                <a:off x="2247900" y="177204"/>
+                <a:ext cx="1308100" cy="369332"/>
+              </a:xfrm>
+              <a:prstGeom prst="rect">
+                <a:avLst/>
+              </a:prstGeom>
+              <a:noFill/>
+            </p:spPr>
+            <p:txBody>
+              <a:bodyPr wrap="square" rtlCol="0">
+                <a:spAutoFit/>
+              </a:bodyPr>
+              <a:lstStyle/>
+              <a:p>
+                <a:r>
+                  <a:rPr lang="en-US" b="1" dirty="0"/>
+                  <a:t>River Only</a:t>
+                </a:r>
+                <a:endParaRPr lang="en-US" sz="1400" b="1" dirty="0"/>
+              </a:p>
+            </p:txBody>
+          </p:sp>
+        </p:grpSp>
+        <p:pic>
+          <p:nvPicPr>
+            <p:cNvPr id="5" name="Picture 4" descr="Chart&#10;&#10;Description automatically generated">
+              <a:extLst>
+                <a:ext uri="{FF2B5EF4-FFF2-40B4-BE49-F238E27FC236}">
+                  <a16:creationId xmlns:a16="http://schemas.microsoft.com/office/drawing/2014/main" id="{805A9F84-76CF-4C9F-9991-7B0E19BAF5CA}"/>
+                </a:ext>
+              </a:extLst>
+            </p:cNvPr>
+            <p:cNvPicPr>
+              <a:picLocks noChangeAspect="1"/>
+            </p:cNvPicPr>
+            <p:nvPr/>
+          </p:nvPicPr>
+          <p:blipFill rotWithShape="1">
+            <a:blip r:embed="rId4" cstate="print">
+              <a:extLst>
+                <a:ext uri="{28A0092B-C50C-407E-A947-70E740481C1C}">
+                  <a14:useLocalDpi xmlns:a14="http://schemas.microsoft.com/office/drawing/2010/main" val="0"/>
+                </a:ext>
+              </a:extLst>
+            </a:blip>
+            <a:srcRect l="43604" t="18151" r="40296" b="26546"/>
+            <a:stretch/>
+          </p:blipFill>
+          <p:spPr>
+            <a:xfrm>
+              <a:off x="7660639" y="2844800"/>
+              <a:ext cx="817881" cy="1615440"/>
+            </a:xfrm>
+            <a:prstGeom prst="rect">
+              <a:avLst/>
+            </a:prstGeom>
+          </p:spPr>
+        </p:pic>
+      </p:grpSp>
+      <p:pic>
+        <p:nvPicPr>
+          <p:cNvPr id="11" name="Picture 10" descr="Chart&#10;&#10;Description automatically generated">
+            <a:extLst>
+              <a:ext uri="{FF2B5EF4-FFF2-40B4-BE49-F238E27FC236}">
+                <a16:creationId xmlns:a16="http://schemas.microsoft.com/office/drawing/2014/main" id="{035554BE-E130-478E-BCEE-5838D10E7EE5}"/>
+              </a:ext>
+            </a:extLst>
+          </p:cNvPr>
+          <p:cNvPicPr>
+            <a:picLocks noChangeAspect="1"/>
+          </p:cNvPicPr>
+          <p:nvPr/>
+        </p:nvPicPr>
+        <p:blipFill rotWithShape="1">
+          <a:blip r:embed="rId5" cstate="print">
+            <a:extLst>
+              <a:ext uri="{28A0092B-C50C-407E-A947-70E740481C1C}">
+                <a14:useLocalDpi xmlns:a14="http://schemas.microsoft.com/office/drawing/2010/main" val="0"/>
+              </a:ext>
+            </a:extLst>
+          </a:blip>
+          <a:srcRect l="44150" t="17196" r="39750" b="27501"/>
+          <a:stretch/>
+        </p:blipFill>
+        <p:spPr>
+          <a:xfrm>
+            <a:off x="7660640" y="2844800"/>
+            <a:ext cx="817880" cy="1615440"/>
+          </a:xfrm>
+          <a:prstGeom prst="rect">
+            <a:avLst/>
+          </a:prstGeom>
+        </p:spPr>
+      </p:pic>
+    </p:spTree>
+    <p:extLst>
+      <p:ext uri="{BB962C8B-B14F-4D97-AF65-F5344CB8AC3E}">
+        <p14:creationId xmlns:p14="http://schemas.microsoft.com/office/powerpoint/2010/main" val="18674962"/>
+      </p:ext>
+    </p:extLst>
+  </p:cSld>
+  <p:clrMapOvr>
+    <a:masterClrMapping/>
+  </p:clrMapOvr>
+</p:sld>
+</file>
+
+<file path=ppt/slides/slide7.xml><?xml version="1.0" encoding="utf-8"?>
 <p:sld xmlns:a="http://schemas.openxmlformats.org/drawingml/2006/main" xmlns:r="http://schemas.openxmlformats.org/officeDocument/2006/relationships" xmlns:p="http://schemas.openxmlformats.org/presentationml/2006/main">
   <p:cSld>
     <p:spTree>
@@ -4148,7 +7594,7 @@
 </p:sld>
 </file>
 
-<file path=ppt/slides/slide4.xml><?xml version="1.0" encoding="utf-8"?>
+<file path=ppt/slides/slide8.xml><?xml version="1.0" encoding="utf-8"?>
 <p:sld xmlns:a="http://schemas.openxmlformats.org/drawingml/2006/main" xmlns:r="http://schemas.openxmlformats.org/officeDocument/2006/relationships" xmlns:p="http://schemas.openxmlformats.org/presentationml/2006/main">
   <p:cSld>
     <p:spTree>
@@ -4167,10 +7613,796 @@
       </p:grpSpPr>
       <p:grpSp>
         <p:nvGrpSpPr>
-          <p:cNvPr id="7" name="Group 6">
+          <p:cNvPr id="24" name="Group 23">
             <a:extLst>
               <a:ext uri="{FF2B5EF4-FFF2-40B4-BE49-F238E27FC236}">
-                <a16:creationId xmlns:a16="http://schemas.microsoft.com/office/drawing/2014/main" id="{36F0CDBE-92C4-4F07-9C05-7E2DFE18CD27}"/>
+                <a16:creationId xmlns:a16="http://schemas.microsoft.com/office/drawing/2014/main" id="{4F943386-B14C-4934-A8BF-616C20DFD0C3}"/>
+              </a:ext>
+            </a:extLst>
+          </p:cNvPr>
+          <p:cNvGrpSpPr/>
+          <p:nvPr/>
+        </p:nvGrpSpPr>
+        <p:grpSpPr>
+          <a:xfrm>
+            <a:off x="491954" y="750350"/>
+            <a:ext cx="11208092" cy="5621875"/>
+            <a:chOff x="491954" y="750350"/>
+            <a:chExt cx="11208092" cy="5621875"/>
+          </a:xfrm>
+        </p:grpSpPr>
+        <p:grpSp>
+          <p:nvGrpSpPr>
+            <p:cNvPr id="20" name="Group 19">
+              <a:extLst>
+                <a:ext uri="{FF2B5EF4-FFF2-40B4-BE49-F238E27FC236}">
+                  <a16:creationId xmlns:a16="http://schemas.microsoft.com/office/drawing/2014/main" id="{7E1050CB-4570-4EA5-A420-C12E4ABA15DC}"/>
+                </a:ext>
+              </a:extLst>
+            </p:cNvPr>
+            <p:cNvGrpSpPr/>
+            <p:nvPr/>
+          </p:nvGrpSpPr>
+          <p:grpSpPr>
+            <a:xfrm>
+              <a:off x="491954" y="750350"/>
+              <a:ext cx="11208092" cy="5621875"/>
+              <a:chOff x="491954" y="750350"/>
+              <a:chExt cx="11208092" cy="5621875"/>
+            </a:xfrm>
+          </p:grpSpPr>
+          <p:sp>
+            <p:nvSpPr>
+              <p:cNvPr id="8" name="Rectangle 7">
+                <a:extLst>
+                  <a:ext uri="{FF2B5EF4-FFF2-40B4-BE49-F238E27FC236}">
+                    <a16:creationId xmlns:a16="http://schemas.microsoft.com/office/drawing/2014/main" id="{B7EC953E-DAA2-4878-BAC1-EFE4D4C6D261}"/>
+                  </a:ext>
+                </a:extLst>
+              </p:cNvPr>
+              <p:cNvSpPr/>
+              <p:nvPr/>
+            </p:nvSpPr>
+            <p:spPr>
+              <a:xfrm>
+                <a:off x="491954" y="818046"/>
+                <a:ext cx="11208092" cy="5554179"/>
+              </a:xfrm>
+              <a:prstGeom prst="rect">
+                <a:avLst/>
+              </a:prstGeom>
+              <a:solidFill>
+                <a:schemeClr val="bg1"/>
+              </a:solidFill>
+              <a:ln>
+                <a:solidFill>
+                  <a:schemeClr val="bg1"/>
+                </a:solidFill>
+              </a:ln>
+            </p:spPr>
+            <p:style>
+              <a:lnRef idx="2">
+                <a:schemeClr val="accent1">
+                  <a:shade val="50000"/>
+                </a:schemeClr>
+              </a:lnRef>
+              <a:fillRef idx="1">
+                <a:schemeClr val="accent1"/>
+              </a:fillRef>
+              <a:effectRef idx="0">
+                <a:schemeClr val="accent1"/>
+              </a:effectRef>
+              <a:fontRef idx="minor">
+                <a:schemeClr val="lt1"/>
+              </a:fontRef>
+            </p:style>
+            <p:txBody>
+              <a:bodyPr rtlCol="0" anchor="ctr"/>
+              <a:lstStyle/>
+              <a:p>
+                <a:pPr algn="ctr"/>
+                <a:endParaRPr lang="en-US"/>
+              </a:p>
+            </p:txBody>
+          </p:sp>
+          <p:pic>
+            <p:nvPicPr>
+              <p:cNvPr id="3" name="Picture 2" descr="Diagram, schematic&#10;&#10;Description automatically generated">
+                <a:extLst>
+                  <a:ext uri="{FF2B5EF4-FFF2-40B4-BE49-F238E27FC236}">
+                    <a16:creationId xmlns:a16="http://schemas.microsoft.com/office/drawing/2014/main" id="{3447BE15-D569-4411-A8D6-BDC537BD475E}"/>
+                  </a:ext>
+                </a:extLst>
+              </p:cNvPr>
+              <p:cNvPicPr>
+                <a:picLocks noChangeAspect="1"/>
+              </p:cNvPicPr>
+              <p:nvPr/>
+            </p:nvPicPr>
+            <p:blipFill rotWithShape="1">
+              <a:blip r:embed="rId2" cstate="print">
+                <a:extLst>
+                  <a:ext uri="{28A0092B-C50C-407E-A947-70E740481C1C}">
+                    <a14:useLocalDpi xmlns:a14="http://schemas.microsoft.com/office/drawing/2010/main" val="0"/>
+                  </a:ext>
+                </a:extLst>
+              </a:blip>
+              <a:srcRect t="3884" b="49599"/>
+              <a:stretch/>
+            </p:blipFill>
+            <p:spPr>
+              <a:xfrm>
+                <a:off x="830509" y="1400962"/>
+                <a:ext cx="10002473" cy="1861184"/>
+              </a:xfrm>
+              <a:prstGeom prst="rect">
+                <a:avLst/>
+              </a:prstGeom>
+            </p:spPr>
+          </p:pic>
+          <p:sp>
+            <p:nvSpPr>
+              <p:cNvPr id="6" name="TextBox 5">
+                <a:extLst>
+                  <a:ext uri="{FF2B5EF4-FFF2-40B4-BE49-F238E27FC236}">
+                    <a16:creationId xmlns:a16="http://schemas.microsoft.com/office/drawing/2014/main" id="{39634AD1-811B-481C-B7D8-860391E90FAB}"/>
+                  </a:ext>
+                </a:extLst>
+              </p:cNvPr>
+              <p:cNvSpPr txBox="1"/>
+              <p:nvPr/>
+            </p:nvSpPr>
+            <p:spPr>
+              <a:xfrm>
+                <a:off x="5085826" y="5851100"/>
+                <a:ext cx="2020348" cy="338554"/>
+              </a:xfrm>
+              <a:prstGeom prst="rect">
+                <a:avLst/>
+              </a:prstGeom>
+              <a:noFill/>
+            </p:spPr>
+            <p:txBody>
+              <a:bodyPr wrap="square" rtlCol="0">
+                <a:spAutoFit/>
+              </a:bodyPr>
+              <a:lstStyle/>
+              <a:p>
+                <a:r>
+                  <a:rPr lang="en-US" sz="1600" dirty="0"/>
+                  <a:t>Flow Path Length (m)</a:t>
+                </a:r>
+              </a:p>
+            </p:txBody>
+          </p:sp>
+          <p:sp>
+            <p:nvSpPr>
+              <p:cNvPr id="7" name="TextBox 6">
+                <a:extLst>
+                  <a:ext uri="{FF2B5EF4-FFF2-40B4-BE49-F238E27FC236}">
+                    <a16:creationId xmlns:a16="http://schemas.microsoft.com/office/drawing/2014/main" id="{3844D2F0-0C22-449E-8B8B-407629A46733}"/>
+                  </a:ext>
+                </a:extLst>
+              </p:cNvPr>
+              <p:cNvSpPr txBox="1"/>
+              <p:nvPr/>
+            </p:nvSpPr>
+            <p:spPr>
+              <a:xfrm rot="16200000">
+                <a:off x="-582545" y="1941731"/>
+                <a:ext cx="2555146" cy="307777"/>
+              </a:xfrm>
+              <a:prstGeom prst="rect">
+                <a:avLst/>
+              </a:prstGeom>
+              <a:noFill/>
+            </p:spPr>
+            <p:txBody>
+              <a:bodyPr wrap="square" rtlCol="0">
+                <a:spAutoFit/>
+              </a:bodyPr>
+              <a:lstStyle/>
+              <a:p>
+                <a:r>
+                  <a:rPr lang="en-US" sz="1400" dirty="0"/>
+                  <a:t>Temperature Difference (°C)</a:t>
+                </a:r>
+              </a:p>
+            </p:txBody>
+          </p:sp>
+          <p:pic>
+            <p:nvPicPr>
+              <p:cNvPr id="10" name="Picture 9" descr="Diagram, schematic&#10;&#10;Description automatically generated">
+                <a:extLst>
+                  <a:ext uri="{FF2B5EF4-FFF2-40B4-BE49-F238E27FC236}">
+                    <a16:creationId xmlns:a16="http://schemas.microsoft.com/office/drawing/2014/main" id="{C4B0DAE2-08B9-483F-9DF7-2B5D55EE8D61}"/>
+                  </a:ext>
+                </a:extLst>
+              </p:cNvPr>
+              <p:cNvPicPr>
+                <a:picLocks noChangeAspect="1"/>
+              </p:cNvPicPr>
+              <p:nvPr/>
+            </p:nvPicPr>
+            <p:blipFill rotWithShape="1">
+              <a:blip r:embed="rId2" cstate="print">
+                <a:extLst>
+                  <a:ext uri="{28A0092B-C50C-407E-A947-70E740481C1C}">
+                    <a14:useLocalDpi xmlns:a14="http://schemas.microsoft.com/office/drawing/2010/main" val="0"/>
+                  </a:ext>
+                </a:extLst>
+              </a:blip>
+              <a:srcRect t="53843"/>
+              <a:stretch/>
+            </p:blipFill>
+            <p:spPr>
+              <a:xfrm>
+                <a:off x="830508" y="3952356"/>
+                <a:ext cx="10002473" cy="1846708"/>
+              </a:xfrm>
+              <a:prstGeom prst="rect">
+                <a:avLst/>
+              </a:prstGeom>
+            </p:spPr>
+          </p:pic>
+          <p:sp>
+            <p:nvSpPr>
+              <p:cNvPr id="2" name="TextBox 1">
+                <a:extLst>
+                  <a:ext uri="{FF2B5EF4-FFF2-40B4-BE49-F238E27FC236}">
+                    <a16:creationId xmlns:a16="http://schemas.microsoft.com/office/drawing/2014/main" id="{F446CB03-4A13-4706-A4C2-9BEB6FE4F032}"/>
+                  </a:ext>
+                </a:extLst>
+              </p:cNvPr>
+              <p:cNvSpPr txBox="1"/>
+              <p:nvPr/>
+            </p:nvSpPr>
+            <p:spPr>
+              <a:xfrm>
+                <a:off x="898102" y="750350"/>
+                <a:ext cx="447675" cy="769441"/>
+              </a:xfrm>
+              <a:prstGeom prst="rect">
+                <a:avLst/>
+              </a:prstGeom>
+              <a:noFill/>
+            </p:spPr>
+            <p:txBody>
+              <a:bodyPr wrap="square" rtlCol="0">
+                <a:spAutoFit/>
+              </a:bodyPr>
+              <a:lstStyle/>
+              <a:p>
+                <a:r>
+                  <a:rPr lang="en-US" sz="4400" dirty="0">
+                    <a:latin typeface="Arial" panose="020B0604020202020204" pitchFamily="34" charset="0"/>
+                    <a:cs typeface="Arial" panose="020B0604020202020204" pitchFamily="34" charset="0"/>
+                  </a:rPr>
+                  <a:t>A</a:t>
+                </a:r>
+              </a:p>
+            </p:txBody>
+          </p:sp>
+          <p:sp>
+            <p:nvSpPr>
+              <p:cNvPr id="11" name="TextBox 10">
+                <a:extLst>
+                  <a:ext uri="{FF2B5EF4-FFF2-40B4-BE49-F238E27FC236}">
+                    <a16:creationId xmlns:a16="http://schemas.microsoft.com/office/drawing/2014/main" id="{19474209-A00A-4D71-A9EC-600F67EF478C}"/>
+                  </a:ext>
+                </a:extLst>
+              </p:cNvPr>
+              <p:cNvSpPr txBox="1"/>
+              <p:nvPr/>
+            </p:nvSpPr>
+            <p:spPr>
+              <a:xfrm>
+                <a:off x="848917" y="3333578"/>
+                <a:ext cx="447675" cy="769441"/>
+              </a:xfrm>
+              <a:prstGeom prst="rect">
+                <a:avLst/>
+              </a:prstGeom>
+              <a:noFill/>
+            </p:spPr>
+            <p:txBody>
+              <a:bodyPr wrap="square" rtlCol="0">
+                <a:spAutoFit/>
+              </a:bodyPr>
+              <a:lstStyle/>
+              <a:p>
+                <a:r>
+                  <a:rPr lang="en-US" sz="4400" dirty="0">
+                    <a:latin typeface="Arial" panose="020B0604020202020204" pitchFamily="34" charset="0"/>
+                    <a:cs typeface="Arial" panose="020B0604020202020204" pitchFamily="34" charset="0"/>
+                  </a:rPr>
+                  <a:t>B</a:t>
+                </a:r>
+              </a:p>
+            </p:txBody>
+          </p:sp>
+          <p:sp>
+            <p:nvSpPr>
+              <p:cNvPr id="12" name="TextBox 11">
+                <a:extLst>
+                  <a:ext uri="{FF2B5EF4-FFF2-40B4-BE49-F238E27FC236}">
+                    <a16:creationId xmlns:a16="http://schemas.microsoft.com/office/drawing/2014/main" id="{AFCAC26C-364E-43A3-8C9A-3A0CBF4E2165}"/>
+                  </a:ext>
+                </a:extLst>
+              </p:cNvPr>
+              <p:cNvSpPr txBox="1"/>
+              <p:nvPr/>
+            </p:nvSpPr>
+            <p:spPr>
+              <a:xfrm rot="16200000">
+                <a:off x="-582546" y="4485891"/>
+                <a:ext cx="2555146" cy="307777"/>
+              </a:xfrm>
+              <a:prstGeom prst="rect">
+                <a:avLst/>
+              </a:prstGeom>
+              <a:noFill/>
+            </p:spPr>
+            <p:txBody>
+              <a:bodyPr wrap="square" rtlCol="0">
+                <a:spAutoFit/>
+              </a:bodyPr>
+              <a:lstStyle/>
+              <a:p>
+                <a:r>
+                  <a:rPr lang="en-US" sz="1400" dirty="0"/>
+                  <a:t>Temperature Difference (°C)</a:t>
+                </a:r>
+              </a:p>
+            </p:txBody>
+          </p:sp>
+          <p:sp>
+            <p:nvSpPr>
+              <p:cNvPr id="5" name="TextBox 4">
+                <a:extLst>
+                  <a:ext uri="{FF2B5EF4-FFF2-40B4-BE49-F238E27FC236}">
+                    <a16:creationId xmlns:a16="http://schemas.microsoft.com/office/drawing/2014/main" id="{6A8431C2-0E08-41EA-9CA1-B296F574A86A}"/>
+                  </a:ext>
+                </a:extLst>
+              </p:cNvPr>
+              <p:cNvSpPr txBox="1"/>
+              <p:nvPr/>
+            </p:nvSpPr>
+            <p:spPr>
+              <a:xfrm>
+                <a:off x="1562099" y="1098007"/>
+                <a:ext cx="1266825" cy="369332"/>
+              </a:xfrm>
+              <a:prstGeom prst="rect">
+                <a:avLst/>
+              </a:prstGeom>
+              <a:noFill/>
+            </p:spPr>
+            <p:txBody>
+              <a:bodyPr wrap="square" rtlCol="0">
+                <a:spAutoFit/>
+              </a:bodyPr>
+              <a:lstStyle/>
+              <a:p>
+                <a:r>
+                  <a:rPr lang="en-US" dirty="0">
+                    <a:latin typeface="Arial" panose="020B0604020202020204" pitchFamily="34" charset="0"/>
+                    <a:cs typeface="Arial" panose="020B0604020202020204" pitchFamily="34" charset="0"/>
+                  </a:rPr>
+                  <a:t>Soil 0.5m</a:t>
+                </a:r>
+              </a:p>
+            </p:txBody>
+          </p:sp>
+          <p:sp>
+            <p:nvSpPr>
+              <p:cNvPr id="13" name="TextBox 12">
+                <a:extLst>
+                  <a:ext uri="{FF2B5EF4-FFF2-40B4-BE49-F238E27FC236}">
+                    <a16:creationId xmlns:a16="http://schemas.microsoft.com/office/drawing/2014/main" id="{0EA3679E-8833-48C6-B4BC-5CD8D2DA74D9}"/>
+                  </a:ext>
+                </a:extLst>
+              </p:cNvPr>
+              <p:cNvSpPr txBox="1"/>
+              <p:nvPr/>
+            </p:nvSpPr>
+            <p:spPr>
+              <a:xfrm>
+                <a:off x="1528956" y="3649401"/>
+                <a:ext cx="1266825" cy="369332"/>
+              </a:xfrm>
+              <a:prstGeom prst="rect">
+                <a:avLst/>
+              </a:prstGeom>
+              <a:noFill/>
+            </p:spPr>
+            <p:txBody>
+              <a:bodyPr wrap="square" rtlCol="0">
+                <a:spAutoFit/>
+              </a:bodyPr>
+              <a:lstStyle/>
+              <a:p>
+                <a:r>
+                  <a:rPr lang="en-US" dirty="0">
+                    <a:latin typeface="Arial" panose="020B0604020202020204" pitchFamily="34" charset="0"/>
+                    <a:cs typeface="Arial" panose="020B0604020202020204" pitchFamily="34" charset="0"/>
+                  </a:rPr>
+                  <a:t>Soil 0.5m</a:t>
+                </a:r>
+              </a:p>
+            </p:txBody>
+          </p:sp>
+          <p:sp>
+            <p:nvSpPr>
+              <p:cNvPr id="14" name="TextBox 13">
+                <a:extLst>
+                  <a:ext uri="{FF2B5EF4-FFF2-40B4-BE49-F238E27FC236}">
+                    <a16:creationId xmlns:a16="http://schemas.microsoft.com/office/drawing/2014/main" id="{0649E1E6-2163-4481-8216-12419D04C0C5}"/>
+                  </a:ext>
+                </a:extLst>
+              </p:cNvPr>
+              <p:cNvSpPr txBox="1"/>
+              <p:nvPr/>
+            </p:nvSpPr>
+            <p:spPr>
+              <a:xfrm>
+                <a:off x="4017652" y="1105249"/>
+                <a:ext cx="1266825" cy="369332"/>
+              </a:xfrm>
+              <a:prstGeom prst="rect">
+                <a:avLst/>
+              </a:prstGeom>
+              <a:noFill/>
+            </p:spPr>
+            <p:txBody>
+              <a:bodyPr wrap="square" rtlCol="0">
+                <a:spAutoFit/>
+              </a:bodyPr>
+              <a:lstStyle/>
+              <a:p>
+                <a:r>
+                  <a:rPr lang="en-US" dirty="0">
+                    <a:latin typeface="Arial" panose="020B0604020202020204" pitchFamily="34" charset="0"/>
+                    <a:cs typeface="Arial" panose="020B0604020202020204" pitchFamily="34" charset="0"/>
+                  </a:rPr>
+                  <a:t>Soil 1.0m</a:t>
+                </a:r>
+              </a:p>
+            </p:txBody>
+          </p:sp>
+          <p:sp>
+            <p:nvSpPr>
+              <p:cNvPr id="15" name="TextBox 14">
+                <a:extLst>
+                  <a:ext uri="{FF2B5EF4-FFF2-40B4-BE49-F238E27FC236}">
+                    <a16:creationId xmlns:a16="http://schemas.microsoft.com/office/drawing/2014/main" id="{AD971E63-4810-4426-AAC6-CEAE6A2DAC86}"/>
+                  </a:ext>
+                </a:extLst>
+              </p:cNvPr>
+              <p:cNvSpPr txBox="1"/>
+              <p:nvPr/>
+            </p:nvSpPr>
+            <p:spPr>
+              <a:xfrm>
+                <a:off x="4005488" y="3649401"/>
+                <a:ext cx="1266825" cy="369332"/>
+              </a:xfrm>
+              <a:prstGeom prst="rect">
+                <a:avLst/>
+              </a:prstGeom>
+              <a:noFill/>
+            </p:spPr>
+            <p:txBody>
+              <a:bodyPr wrap="square" rtlCol="0">
+                <a:spAutoFit/>
+              </a:bodyPr>
+              <a:lstStyle/>
+              <a:p>
+                <a:r>
+                  <a:rPr lang="en-US" dirty="0">
+                    <a:latin typeface="Arial" panose="020B0604020202020204" pitchFamily="34" charset="0"/>
+                    <a:cs typeface="Arial" panose="020B0604020202020204" pitchFamily="34" charset="0"/>
+                  </a:rPr>
+                  <a:t>Soil 1.0m</a:t>
+                </a:r>
+              </a:p>
+            </p:txBody>
+          </p:sp>
+          <p:sp>
+            <p:nvSpPr>
+              <p:cNvPr id="16" name="TextBox 15">
+                <a:extLst>
+                  <a:ext uri="{FF2B5EF4-FFF2-40B4-BE49-F238E27FC236}">
+                    <a16:creationId xmlns:a16="http://schemas.microsoft.com/office/drawing/2014/main" id="{DB2054B9-CDAF-42B0-A56F-62F533C1997D}"/>
+                  </a:ext>
+                </a:extLst>
+              </p:cNvPr>
+              <p:cNvSpPr txBox="1"/>
+              <p:nvPr/>
+            </p:nvSpPr>
+            <p:spPr>
+              <a:xfrm>
+                <a:off x="6561551" y="1105249"/>
+                <a:ext cx="1266825" cy="369332"/>
+              </a:xfrm>
+              <a:prstGeom prst="rect">
+                <a:avLst/>
+              </a:prstGeom>
+              <a:noFill/>
+            </p:spPr>
+            <p:txBody>
+              <a:bodyPr wrap="square" rtlCol="0">
+                <a:spAutoFit/>
+              </a:bodyPr>
+              <a:lstStyle/>
+              <a:p>
+                <a:r>
+                  <a:rPr lang="en-US" dirty="0">
+                    <a:latin typeface="Arial" panose="020B0604020202020204" pitchFamily="34" charset="0"/>
+                    <a:cs typeface="Arial" panose="020B0604020202020204" pitchFamily="34" charset="0"/>
+                  </a:rPr>
+                  <a:t>Soil 2.0m</a:t>
+                </a:r>
+              </a:p>
+            </p:txBody>
+          </p:sp>
+          <p:sp>
+            <p:nvSpPr>
+              <p:cNvPr id="17" name="TextBox 16">
+                <a:extLst>
+                  <a:ext uri="{FF2B5EF4-FFF2-40B4-BE49-F238E27FC236}">
+                    <a16:creationId xmlns:a16="http://schemas.microsoft.com/office/drawing/2014/main" id="{36B0CFEA-C364-465F-A7FD-30255FC9B528}"/>
+                  </a:ext>
+                </a:extLst>
+              </p:cNvPr>
+              <p:cNvSpPr txBox="1"/>
+              <p:nvPr/>
+            </p:nvSpPr>
+            <p:spPr>
+              <a:xfrm>
+                <a:off x="6568437" y="3649401"/>
+                <a:ext cx="1266825" cy="369332"/>
+              </a:xfrm>
+              <a:prstGeom prst="rect">
+                <a:avLst/>
+              </a:prstGeom>
+              <a:noFill/>
+            </p:spPr>
+            <p:txBody>
+              <a:bodyPr wrap="square" rtlCol="0">
+                <a:spAutoFit/>
+              </a:bodyPr>
+              <a:lstStyle/>
+              <a:p>
+                <a:r>
+                  <a:rPr lang="en-US" dirty="0">
+                    <a:latin typeface="Arial" panose="020B0604020202020204" pitchFamily="34" charset="0"/>
+                    <a:cs typeface="Arial" panose="020B0604020202020204" pitchFamily="34" charset="0"/>
+                  </a:rPr>
+                  <a:t>Soil 2.0m</a:t>
+                </a:r>
+              </a:p>
+            </p:txBody>
+          </p:sp>
+          <p:sp>
+            <p:nvSpPr>
+              <p:cNvPr id="18" name="TextBox 17">
+                <a:extLst>
+                  <a:ext uri="{FF2B5EF4-FFF2-40B4-BE49-F238E27FC236}">
+                    <a16:creationId xmlns:a16="http://schemas.microsoft.com/office/drawing/2014/main" id="{537F80A3-B562-4C26-A00A-D946FB7B439F}"/>
+                  </a:ext>
+                </a:extLst>
+              </p:cNvPr>
+              <p:cNvSpPr txBox="1"/>
+              <p:nvPr/>
+            </p:nvSpPr>
+            <p:spPr>
+              <a:xfrm>
+                <a:off x="9074977" y="1094727"/>
+                <a:ext cx="1266825" cy="369332"/>
+              </a:xfrm>
+              <a:prstGeom prst="rect">
+                <a:avLst/>
+              </a:prstGeom>
+              <a:noFill/>
+            </p:spPr>
+            <p:txBody>
+              <a:bodyPr wrap="square" rtlCol="0">
+                <a:spAutoFit/>
+              </a:bodyPr>
+              <a:lstStyle/>
+              <a:p>
+                <a:r>
+                  <a:rPr lang="en-US" dirty="0">
+                    <a:latin typeface="Arial" panose="020B0604020202020204" pitchFamily="34" charset="0"/>
+                    <a:cs typeface="Arial" panose="020B0604020202020204" pitchFamily="34" charset="0"/>
+                  </a:rPr>
+                  <a:t>Soil 3.0m</a:t>
+                </a:r>
+              </a:p>
+            </p:txBody>
+          </p:sp>
+          <p:sp>
+            <p:nvSpPr>
+              <p:cNvPr id="19" name="TextBox 18">
+                <a:extLst>
+                  <a:ext uri="{FF2B5EF4-FFF2-40B4-BE49-F238E27FC236}">
+                    <a16:creationId xmlns:a16="http://schemas.microsoft.com/office/drawing/2014/main" id="{3C9DD813-2A95-4597-AC2C-218899871E25}"/>
+                  </a:ext>
+                </a:extLst>
+              </p:cNvPr>
+              <p:cNvSpPr txBox="1"/>
+              <p:nvPr/>
+            </p:nvSpPr>
+            <p:spPr>
+              <a:xfrm>
+                <a:off x="9080267" y="3649401"/>
+                <a:ext cx="1266825" cy="369332"/>
+              </a:xfrm>
+              <a:prstGeom prst="rect">
+                <a:avLst/>
+              </a:prstGeom>
+              <a:noFill/>
+            </p:spPr>
+            <p:txBody>
+              <a:bodyPr wrap="square" rtlCol="0">
+                <a:spAutoFit/>
+              </a:bodyPr>
+              <a:lstStyle/>
+              <a:p>
+                <a:r>
+                  <a:rPr lang="en-US" dirty="0">
+                    <a:latin typeface="Arial" panose="020B0604020202020204" pitchFamily="34" charset="0"/>
+                    <a:cs typeface="Arial" panose="020B0604020202020204" pitchFamily="34" charset="0"/>
+                  </a:rPr>
+                  <a:t>Soil 3.0m</a:t>
+                </a:r>
+              </a:p>
+            </p:txBody>
+          </p:sp>
+        </p:grpSp>
+        <p:pic>
+          <p:nvPicPr>
+            <p:cNvPr id="21" name="Picture 20" descr="Graphical user interface, chart&#10;&#10;Description automatically generated">
+              <a:extLst>
+                <a:ext uri="{FF2B5EF4-FFF2-40B4-BE49-F238E27FC236}">
+                  <a16:creationId xmlns:a16="http://schemas.microsoft.com/office/drawing/2014/main" id="{39130BC8-4573-41CE-B515-DA1256C97272}"/>
+                </a:ext>
+              </a:extLst>
+            </p:cNvPr>
+            <p:cNvPicPr>
+              <a:picLocks noChangeAspect="1"/>
+            </p:cNvPicPr>
+            <p:nvPr/>
+          </p:nvPicPr>
+          <p:blipFill rotWithShape="1">
+            <a:blip r:embed="rId3" cstate="print">
+              <a:extLst>
+                <a:ext uri="{28A0092B-C50C-407E-A947-70E740481C1C}">
+                  <a14:useLocalDpi xmlns:a14="http://schemas.microsoft.com/office/drawing/2010/main" val="0"/>
+                </a:ext>
+              </a:extLst>
+            </a:blip>
+            <a:srcRect t="3855" b="50000"/>
+            <a:stretch/>
+          </p:blipFill>
+          <p:spPr>
+            <a:xfrm>
+              <a:off x="790028" y="1400962"/>
+              <a:ext cx="10083432" cy="1861184"/>
+            </a:xfrm>
+            <a:prstGeom prst="rect">
+              <a:avLst/>
+            </a:prstGeom>
+          </p:spPr>
+        </p:pic>
+        <p:pic>
+          <p:nvPicPr>
+            <p:cNvPr id="22" name="Picture 21" descr="Graphical user interface, chart&#10;&#10;Description automatically generated">
+              <a:extLst>
+                <a:ext uri="{FF2B5EF4-FFF2-40B4-BE49-F238E27FC236}">
+                  <a16:creationId xmlns:a16="http://schemas.microsoft.com/office/drawing/2014/main" id="{E7104257-2F33-4BB2-B6FA-21AD6F39C56F}"/>
+                </a:ext>
+              </a:extLst>
+            </p:cNvPr>
+            <p:cNvPicPr>
+              <a:picLocks noChangeAspect="1"/>
+            </p:cNvPicPr>
+            <p:nvPr/>
+          </p:nvPicPr>
+          <p:blipFill rotWithShape="1">
+            <a:blip r:embed="rId3" cstate="print">
+              <a:extLst>
+                <a:ext uri="{28A0092B-C50C-407E-A947-70E740481C1C}">
+                  <a14:useLocalDpi xmlns:a14="http://schemas.microsoft.com/office/drawing/2010/main" val="0"/>
+                </a:ext>
+              </a:extLst>
+            </a:blip>
+            <a:srcRect t="53592" b="51"/>
+            <a:stretch/>
+          </p:blipFill>
+          <p:spPr>
+            <a:xfrm>
+              <a:off x="799233" y="3929378"/>
+              <a:ext cx="10083432" cy="1869686"/>
+            </a:xfrm>
+            <a:prstGeom prst="rect">
+              <a:avLst/>
+            </a:prstGeom>
+          </p:spPr>
+        </p:pic>
+        <p:pic>
+          <p:nvPicPr>
+            <p:cNvPr id="23" name="Picture 22" descr="Chart&#10;&#10;Description automatically generated">
+              <a:extLst>
+                <a:ext uri="{FF2B5EF4-FFF2-40B4-BE49-F238E27FC236}">
+                  <a16:creationId xmlns:a16="http://schemas.microsoft.com/office/drawing/2014/main" id="{C91A05FC-E7EC-4105-BFE1-347723EAAF3D}"/>
+                </a:ext>
+              </a:extLst>
+            </p:cNvPr>
+            <p:cNvPicPr>
+              <a:picLocks noChangeAspect="1"/>
+            </p:cNvPicPr>
+            <p:nvPr/>
+          </p:nvPicPr>
+          <p:blipFill rotWithShape="1">
+            <a:blip r:embed="rId4" cstate="print">
+              <a:extLst>
+                <a:ext uri="{28A0092B-C50C-407E-A947-70E740481C1C}">
+                  <a14:useLocalDpi xmlns:a14="http://schemas.microsoft.com/office/drawing/2010/main" val="0"/>
+                </a:ext>
+              </a:extLst>
+            </a:blip>
+            <a:srcRect l="43604" t="18151" r="40296" b="26546"/>
+            <a:stretch/>
+          </p:blipFill>
+          <p:spPr>
+            <a:xfrm>
+              <a:off x="10864256" y="2648054"/>
+              <a:ext cx="817881" cy="1615440"/>
+            </a:xfrm>
+            <a:prstGeom prst="rect">
+              <a:avLst/>
+            </a:prstGeom>
+          </p:spPr>
+        </p:pic>
+      </p:grpSp>
+    </p:spTree>
+    <p:extLst>
+      <p:ext uri="{BB962C8B-B14F-4D97-AF65-F5344CB8AC3E}">
+        <p14:creationId xmlns:p14="http://schemas.microsoft.com/office/powerpoint/2010/main" val="293573397"/>
+      </p:ext>
+    </p:extLst>
+  </p:cSld>
+  <p:clrMapOvr>
+    <a:masterClrMapping/>
+  </p:clrMapOvr>
+</p:sld>
+</file>
+
+<file path=ppt/slides/slide9.xml><?xml version="1.0" encoding="utf-8"?>
+<p:sld xmlns:a="http://schemas.openxmlformats.org/drawingml/2006/main" xmlns:r="http://schemas.openxmlformats.org/officeDocument/2006/relationships" xmlns:p="http://schemas.openxmlformats.org/presentationml/2006/main">
+  <p:cSld>
+    <p:spTree>
+      <p:nvGrpSpPr>
+        <p:cNvPr id="1" name=""/>
+        <p:cNvGrpSpPr/>
+        <p:nvPr/>
+      </p:nvGrpSpPr>
+      <p:grpSpPr>
+        <a:xfrm>
+          <a:off x="0" y="0"/>
+          <a:ext cx="0" cy="0"/>
+          <a:chOff x="0" y="0"/>
+          <a:chExt cx="0" cy="0"/>
+        </a:xfrm>
+      </p:grpSpPr>
+      <p:grpSp>
+        <p:nvGrpSpPr>
+          <p:cNvPr id="2" name="Group 1">
+            <a:extLst>
+              <a:ext uri="{FF2B5EF4-FFF2-40B4-BE49-F238E27FC236}">
+                <a16:creationId xmlns:a16="http://schemas.microsoft.com/office/drawing/2014/main" id="{28ECE2B8-B56F-4978-8582-5EE135C8907B}"/>
               </a:ext>
             </a:extLst>
           </p:cNvPr>
@@ -4180,14 +8412,14 @@
         <p:grpSpPr>
           <a:xfrm>
             <a:off x="3810000" y="0"/>
-            <a:ext cx="4572000" cy="6858000"/>
+            <a:ext cx="4572000" cy="6857999"/>
             <a:chOff x="3810000" y="0"/>
-            <a:chExt cx="4572000" cy="6858000"/>
+            <a:chExt cx="4572000" cy="6857999"/>
           </a:xfrm>
         </p:grpSpPr>
         <p:pic>
           <p:nvPicPr>
-            <p:cNvPr id="3" name="Picture 2" descr="Graphical user interface, diagram&#10;&#10;Description automatically generated with medium confidence">
+            <p:cNvPr id="3" name="Picture 2">
               <a:extLst>
                 <a:ext uri="{FF2B5EF4-FFF2-40B4-BE49-F238E27FC236}">
                   <a16:creationId xmlns:a16="http://schemas.microsoft.com/office/drawing/2014/main" id="{F47AFCC6-D94A-4447-A35D-0F1C87D1E538}"/>
@@ -4207,14 +8439,13 @@
                 </a:ext>
               </a:extLst>
             </a:blip>
-            <a:stretch>
-              <a:fillRect/>
-            </a:stretch>
+            <a:srcRect/>
+            <a:stretch/>
           </p:blipFill>
           <p:spPr>
             <a:xfrm>
               <a:off x="3810000" y="0"/>
-              <a:ext cx="4572000" cy="6858000"/>
+              <a:ext cx="4572000" cy="6857999"/>
             </a:xfrm>
             <a:prstGeom prst="rect">
               <a:avLst/>
@@ -4340,236 +8571,6 @@
     <p:extLst>
       <p:ext uri="{BB962C8B-B14F-4D97-AF65-F5344CB8AC3E}">
         <p14:creationId xmlns:p14="http://schemas.microsoft.com/office/powerpoint/2010/main" val="1198051612"/>
-      </p:ext>
-    </p:extLst>
-  </p:cSld>
-  <p:clrMapOvr>
-    <a:masterClrMapping/>
-  </p:clrMapOvr>
-</p:sld>
-</file>
-
-<file path=ppt/slides/slide5.xml><?xml version="1.0" encoding="utf-8"?>
-<p:sld xmlns:a="http://schemas.openxmlformats.org/drawingml/2006/main" xmlns:r="http://schemas.openxmlformats.org/officeDocument/2006/relationships" xmlns:p="http://schemas.openxmlformats.org/presentationml/2006/main">
-  <p:cSld>
-    <p:spTree>
-      <p:nvGrpSpPr>
-        <p:cNvPr id="1" name=""/>
-        <p:cNvGrpSpPr/>
-        <p:nvPr/>
-      </p:nvGrpSpPr>
-      <p:grpSpPr>
-        <a:xfrm>
-          <a:off x="0" y="0"/>
-          <a:ext cx="0" cy="0"/>
-          <a:chOff x="0" y="0"/>
-          <a:chExt cx="0" cy="0"/>
-        </a:xfrm>
-      </p:grpSpPr>
-      <p:grpSp>
-        <p:nvGrpSpPr>
-          <p:cNvPr id="7" name="Group 6">
-            <a:extLst>
-              <a:ext uri="{FF2B5EF4-FFF2-40B4-BE49-F238E27FC236}">
-                <a16:creationId xmlns:a16="http://schemas.microsoft.com/office/drawing/2014/main" id="{36F0CDBE-92C4-4F07-9C05-7E2DFE18CD27}"/>
-              </a:ext>
-            </a:extLst>
-          </p:cNvPr>
-          <p:cNvGrpSpPr/>
-          <p:nvPr/>
-        </p:nvGrpSpPr>
-        <p:grpSpPr>
-          <a:xfrm>
-            <a:off x="3810000" y="0"/>
-            <a:ext cx="4572000" cy="6857999"/>
-            <a:chOff x="3810000" y="0"/>
-            <a:chExt cx="4572000" cy="6857999"/>
-          </a:xfrm>
-        </p:grpSpPr>
-        <p:pic>
-          <p:nvPicPr>
-            <p:cNvPr id="3" name="Picture 2">
-              <a:extLst>
-                <a:ext uri="{FF2B5EF4-FFF2-40B4-BE49-F238E27FC236}">
-                  <a16:creationId xmlns:a16="http://schemas.microsoft.com/office/drawing/2014/main" id="{F47AFCC6-D94A-4447-A35D-0F1C87D1E538}"/>
-                </a:ext>
-              </a:extLst>
-            </p:cNvPr>
-            <p:cNvPicPr>
-              <a:picLocks noChangeAspect="1"/>
-            </p:cNvPicPr>
-            <p:nvPr/>
-          </p:nvPicPr>
-          <p:blipFill>
-            <a:blip r:embed="rId2" cstate="print">
-              <a:extLst>
-                <a:ext uri="{28A0092B-C50C-407E-A947-70E740481C1C}">
-                  <a14:useLocalDpi xmlns:a14="http://schemas.microsoft.com/office/drawing/2010/main" val="0"/>
-                </a:ext>
-              </a:extLst>
-            </a:blip>
-            <a:srcRect/>
-            <a:stretch/>
-          </p:blipFill>
-          <p:spPr>
-            <a:xfrm>
-              <a:off x="3810000" y="0"/>
-              <a:ext cx="4572000" cy="6857999"/>
-            </a:xfrm>
-            <a:prstGeom prst="rect">
-              <a:avLst/>
-            </a:prstGeom>
-          </p:spPr>
-        </p:pic>
-        <p:sp>
-          <p:nvSpPr>
-            <p:cNvPr id="4" name="TextBox 3">
-              <a:extLst>
-                <a:ext uri="{FF2B5EF4-FFF2-40B4-BE49-F238E27FC236}">
-                  <a16:creationId xmlns:a16="http://schemas.microsoft.com/office/drawing/2014/main" id="{EC38CDEB-62BD-4408-B010-3D0FED8A57E9}"/>
-                </a:ext>
-              </a:extLst>
-            </p:cNvPr>
-            <p:cNvSpPr txBox="1"/>
-            <p:nvPr/>
-          </p:nvSpPr>
-          <p:spPr>
-            <a:xfrm>
-              <a:off x="4195894" y="33556"/>
-              <a:ext cx="687898" cy="461665"/>
-            </a:xfrm>
-            <a:prstGeom prst="rect">
-              <a:avLst/>
-            </a:prstGeom>
-            <a:noFill/>
-          </p:spPr>
-          <p:txBody>
-            <a:bodyPr wrap="square" rtlCol="0">
-              <a:spAutoFit/>
-            </a:bodyPr>
-            <a:lstStyle/>
-            <a:p>
-              <a:r>
-                <a:rPr lang="en-US" sz="2400" dirty="0">
-                  <a:latin typeface="Arial" panose="020B0604020202020204" pitchFamily="34" charset="0"/>
-                  <a:cs typeface="Arial" panose="020B0604020202020204" pitchFamily="34" charset="0"/>
-                </a:rPr>
-                <a:t>A</a:t>
-              </a:r>
-            </a:p>
-          </p:txBody>
-        </p:sp>
-        <p:sp>
-          <p:nvSpPr>
-            <p:cNvPr id="5" name="TextBox 4">
-              <a:extLst>
-                <a:ext uri="{FF2B5EF4-FFF2-40B4-BE49-F238E27FC236}">
-                  <a16:creationId xmlns:a16="http://schemas.microsoft.com/office/drawing/2014/main" id="{8E1851B5-4D3B-474D-85A1-22CDE7C837F6}"/>
-                </a:ext>
-              </a:extLst>
-            </p:cNvPr>
-            <p:cNvSpPr txBox="1"/>
-            <p:nvPr/>
-          </p:nvSpPr>
-          <p:spPr>
-            <a:xfrm>
-              <a:off x="4195894" y="2241259"/>
-              <a:ext cx="687898" cy="461665"/>
-            </a:xfrm>
-            <a:prstGeom prst="rect">
-              <a:avLst/>
-            </a:prstGeom>
-            <a:noFill/>
-          </p:spPr>
-          <p:txBody>
-            <a:bodyPr wrap="square" rtlCol="0">
-              <a:spAutoFit/>
-            </a:bodyPr>
-            <a:lstStyle/>
-            <a:p>
-              <a:r>
-                <a:rPr lang="en-US" sz="2400" dirty="0">
-                  <a:latin typeface="Arial" panose="020B0604020202020204" pitchFamily="34" charset="0"/>
-                  <a:cs typeface="Arial" panose="020B0604020202020204" pitchFamily="34" charset="0"/>
-                </a:rPr>
-                <a:t>B</a:t>
-              </a:r>
-            </a:p>
-          </p:txBody>
-        </p:sp>
-        <p:sp>
-          <p:nvSpPr>
-            <p:cNvPr id="6" name="TextBox 5">
-              <a:extLst>
-                <a:ext uri="{FF2B5EF4-FFF2-40B4-BE49-F238E27FC236}">
-                  <a16:creationId xmlns:a16="http://schemas.microsoft.com/office/drawing/2014/main" id="{29DA323C-53B5-4E41-9047-869B5D52BE60}"/>
-                </a:ext>
-              </a:extLst>
-            </p:cNvPr>
-            <p:cNvSpPr txBox="1"/>
-            <p:nvPr/>
-          </p:nvSpPr>
-          <p:spPr>
-            <a:xfrm>
-              <a:off x="4195894" y="6033083"/>
-              <a:ext cx="687898" cy="461665"/>
-            </a:xfrm>
-            <a:prstGeom prst="rect">
-              <a:avLst/>
-            </a:prstGeom>
-            <a:noFill/>
-          </p:spPr>
-          <p:txBody>
-            <a:bodyPr wrap="square" rtlCol="0">
-              <a:spAutoFit/>
-            </a:bodyPr>
-            <a:lstStyle/>
-            <a:p>
-              <a:r>
-                <a:rPr lang="en-US" sz="2400" dirty="0">
-                  <a:latin typeface="Arial" panose="020B0604020202020204" pitchFamily="34" charset="0"/>
-                  <a:cs typeface="Arial" panose="020B0604020202020204" pitchFamily="34" charset="0"/>
-                </a:rPr>
-                <a:t>C</a:t>
-              </a:r>
-            </a:p>
-          </p:txBody>
-        </p:sp>
-      </p:grpSp>
-    </p:spTree>
-    <p:extLst>
-      <p:ext uri="{BB962C8B-B14F-4D97-AF65-F5344CB8AC3E}">
-        <p14:creationId xmlns:p14="http://schemas.microsoft.com/office/powerpoint/2010/main" val="2608008904"/>
-      </p:ext>
-    </p:extLst>
-  </p:cSld>
-  <p:clrMapOvr>
-    <a:masterClrMapping/>
-  </p:clrMapOvr>
-</p:sld>
-</file>
-
-<file path=ppt/slides/slide6.xml><?xml version="1.0" encoding="utf-8"?>
-<p:sld xmlns:a="http://schemas.openxmlformats.org/drawingml/2006/main" xmlns:r="http://schemas.openxmlformats.org/officeDocument/2006/relationships" xmlns:p="http://schemas.openxmlformats.org/presentationml/2006/main">
-  <p:cSld>
-    <p:spTree>
-      <p:nvGrpSpPr>
-        <p:cNvPr id="1" name=""/>
-        <p:cNvGrpSpPr/>
-        <p:nvPr/>
-      </p:nvGrpSpPr>
-      <p:grpSpPr>
-        <a:xfrm>
-          <a:off x="0" y="0"/>
-          <a:ext cx="0" cy="0"/>
-          <a:chOff x="0" y="0"/>
-          <a:chExt cx="0" cy="0"/>
-        </a:xfrm>
-      </p:grpSpPr>
-    </p:spTree>
-    <p:extLst>
-      <p:ext uri="{BB962C8B-B14F-4D97-AF65-F5344CB8AC3E}">
-        <p14:creationId xmlns:p14="http://schemas.microsoft.com/office/powerpoint/2010/main" val="1253127586"/>
       </p:ext>
     </p:extLst>
   </p:cSld>

</xml_diff>

<commit_message>
Update fist couple of figures for manuscript: Temp acorss flowpath plots, added the annual signal from flow path 1950, and updated diel temperature across flowpth
</commit_message>
<xml_diff>
--- a/plots/Floodplain_Shade_Figure_Alterations_Updated_Meacham.pptx
+++ b/plots/Floodplain_Shade_Figure_Alterations_Updated_Meacham.pptx
@@ -19,6 +19,7 @@
     <p:sldId id="272" r:id="rId13"/>
     <p:sldId id="273" r:id="rId14"/>
     <p:sldId id="274" r:id="rId15"/>
+    <p:sldId id="275" r:id="rId16"/>
   </p:sldIdLst>
   <p:sldSz cx="12192000" cy="6858000"/>
   <p:notesSz cx="6858000" cy="9144000"/>
@@ -254,7 +255,7 @@
           <a:p>
             <a:fld id="{BED1CDFE-13BD-45C0-9142-AC2FC464EE39}" type="datetimeFigureOut">
               <a:rPr lang="en-US" smtClean="0"/>
-              <a:t>9/20/2022</a:t>
+              <a:t>10/25/2022</a:t>
             </a:fld>
             <a:endParaRPr lang="en-US"/>
           </a:p>
@@ -422,7 +423,7 @@
           <a:p>
             <a:fld id="{BED1CDFE-13BD-45C0-9142-AC2FC464EE39}" type="datetimeFigureOut">
               <a:rPr lang="en-US" smtClean="0"/>
-              <a:t>9/20/2022</a:t>
+              <a:t>10/25/2022</a:t>
             </a:fld>
             <a:endParaRPr lang="en-US"/>
           </a:p>
@@ -600,7 +601,7 @@
           <a:p>
             <a:fld id="{BED1CDFE-13BD-45C0-9142-AC2FC464EE39}" type="datetimeFigureOut">
               <a:rPr lang="en-US" smtClean="0"/>
-              <a:t>9/20/2022</a:t>
+              <a:t>10/25/2022</a:t>
             </a:fld>
             <a:endParaRPr lang="en-US"/>
           </a:p>
@@ -768,7 +769,7 @@
           <a:p>
             <a:fld id="{BED1CDFE-13BD-45C0-9142-AC2FC464EE39}" type="datetimeFigureOut">
               <a:rPr lang="en-US" smtClean="0"/>
-              <a:t>9/20/2022</a:t>
+              <a:t>10/25/2022</a:t>
             </a:fld>
             <a:endParaRPr lang="en-US"/>
           </a:p>
@@ -1013,7 +1014,7 @@
           <a:p>
             <a:fld id="{BED1CDFE-13BD-45C0-9142-AC2FC464EE39}" type="datetimeFigureOut">
               <a:rPr lang="en-US" smtClean="0"/>
-              <a:t>9/20/2022</a:t>
+              <a:t>10/25/2022</a:t>
             </a:fld>
             <a:endParaRPr lang="en-US"/>
           </a:p>
@@ -1242,7 +1243,7 @@
           <a:p>
             <a:fld id="{BED1CDFE-13BD-45C0-9142-AC2FC464EE39}" type="datetimeFigureOut">
               <a:rPr lang="en-US" smtClean="0"/>
-              <a:t>9/20/2022</a:t>
+              <a:t>10/25/2022</a:t>
             </a:fld>
             <a:endParaRPr lang="en-US"/>
           </a:p>
@@ -1606,7 +1607,7 @@
           <a:p>
             <a:fld id="{BED1CDFE-13BD-45C0-9142-AC2FC464EE39}" type="datetimeFigureOut">
               <a:rPr lang="en-US" smtClean="0"/>
-              <a:t>9/20/2022</a:t>
+              <a:t>10/25/2022</a:t>
             </a:fld>
             <a:endParaRPr lang="en-US"/>
           </a:p>
@@ -1723,7 +1724,7 @@
           <a:p>
             <a:fld id="{BED1CDFE-13BD-45C0-9142-AC2FC464EE39}" type="datetimeFigureOut">
               <a:rPr lang="en-US" smtClean="0"/>
-              <a:t>9/20/2022</a:t>
+              <a:t>10/25/2022</a:t>
             </a:fld>
             <a:endParaRPr lang="en-US"/>
           </a:p>
@@ -1818,7 +1819,7 @@
           <a:p>
             <a:fld id="{BED1CDFE-13BD-45C0-9142-AC2FC464EE39}" type="datetimeFigureOut">
               <a:rPr lang="en-US" smtClean="0"/>
-              <a:t>9/20/2022</a:t>
+              <a:t>10/25/2022</a:t>
             </a:fld>
             <a:endParaRPr lang="en-US"/>
           </a:p>
@@ -2093,7 +2094,7 @@
           <a:p>
             <a:fld id="{BED1CDFE-13BD-45C0-9142-AC2FC464EE39}" type="datetimeFigureOut">
               <a:rPr lang="en-US" smtClean="0"/>
-              <a:t>9/20/2022</a:t>
+              <a:t>10/25/2022</a:t>
             </a:fld>
             <a:endParaRPr lang="en-US"/>
           </a:p>
@@ -2345,7 +2346,7 @@
           <a:p>
             <a:fld id="{BED1CDFE-13BD-45C0-9142-AC2FC464EE39}" type="datetimeFigureOut">
               <a:rPr lang="en-US" smtClean="0"/>
-              <a:t>9/20/2022</a:t>
+              <a:t>10/25/2022</a:t>
             </a:fld>
             <a:endParaRPr lang="en-US"/>
           </a:p>
@@ -2556,7 +2557,7 @@
           <a:p>
             <a:fld id="{BED1CDFE-13BD-45C0-9142-AC2FC464EE39}" type="datetimeFigureOut">
               <a:rPr lang="en-US" smtClean="0"/>
-              <a:t>9/20/2022</a:t>
+              <a:t>10/25/2022</a:t>
             </a:fld>
             <a:endParaRPr lang="en-US"/>
           </a:p>
@@ -5356,6 +5357,304 @@
     <p:extLst>
       <p:ext uri="{BB962C8B-B14F-4D97-AF65-F5344CB8AC3E}">
         <p14:creationId xmlns:p14="http://schemas.microsoft.com/office/powerpoint/2010/main" val="3666096084"/>
+      </p:ext>
+    </p:extLst>
+  </p:cSld>
+  <p:clrMapOvr>
+    <a:masterClrMapping/>
+  </p:clrMapOvr>
+</p:sld>
+</file>
+
+<file path=ppt/slides/slide15.xml><?xml version="1.0" encoding="utf-8"?>
+<p:sld xmlns:a="http://schemas.openxmlformats.org/drawingml/2006/main" xmlns:r="http://schemas.openxmlformats.org/officeDocument/2006/relationships" xmlns:p="http://schemas.openxmlformats.org/presentationml/2006/main">
+  <p:cSld>
+    <p:spTree>
+      <p:nvGrpSpPr>
+        <p:cNvPr id="1" name=""/>
+        <p:cNvGrpSpPr/>
+        <p:nvPr/>
+      </p:nvGrpSpPr>
+      <p:grpSpPr>
+        <a:xfrm>
+          <a:off x="0" y="0"/>
+          <a:ext cx="0" cy="0"/>
+          <a:chOff x="0" y="0"/>
+          <a:chExt cx="0" cy="0"/>
+        </a:xfrm>
+      </p:grpSpPr>
+      <p:sp>
+        <p:nvSpPr>
+          <p:cNvPr id="4" name="Rectangle 3">
+            <a:extLst>
+              <a:ext uri="{FF2B5EF4-FFF2-40B4-BE49-F238E27FC236}">
+                <a16:creationId xmlns:a16="http://schemas.microsoft.com/office/drawing/2014/main" id="{59E04B4D-F964-4CE9-AB5D-3D72A628F6A5}"/>
+              </a:ext>
+            </a:extLst>
+          </p:cNvPr>
+          <p:cNvSpPr/>
+          <p:nvPr/>
+        </p:nvSpPr>
+        <p:spPr>
+          <a:xfrm>
+            <a:off x="2886075" y="-390525"/>
+            <a:ext cx="6048375" cy="7629525"/>
+          </a:xfrm>
+          <a:prstGeom prst="rect">
+            <a:avLst/>
+          </a:prstGeom>
+          <a:solidFill>
+            <a:schemeClr val="bg1"/>
+          </a:solidFill>
+          <a:ln>
+            <a:solidFill>
+              <a:schemeClr val="bg1"/>
+            </a:solidFill>
+          </a:ln>
+        </p:spPr>
+        <p:style>
+          <a:lnRef idx="2">
+            <a:schemeClr val="accent1">
+              <a:shade val="50000"/>
+            </a:schemeClr>
+          </a:lnRef>
+          <a:fillRef idx="1">
+            <a:schemeClr val="accent1"/>
+          </a:fillRef>
+          <a:effectRef idx="0">
+            <a:schemeClr val="accent1"/>
+          </a:effectRef>
+          <a:fontRef idx="minor">
+            <a:schemeClr val="lt1"/>
+          </a:fontRef>
+        </p:style>
+        <p:txBody>
+          <a:bodyPr rtlCol="0" anchor="ctr"/>
+          <a:lstStyle/>
+          <a:p>
+            <a:pPr algn="ctr"/>
+            <a:endParaRPr lang="en-US"/>
+          </a:p>
+        </p:txBody>
+      </p:sp>
+      <p:pic>
+        <p:nvPicPr>
+          <p:cNvPr id="3" name="Picture 2" descr="Chart, histogram&#10;&#10;Description automatically generated">
+            <a:extLst>
+              <a:ext uri="{FF2B5EF4-FFF2-40B4-BE49-F238E27FC236}">
+                <a16:creationId xmlns:a16="http://schemas.microsoft.com/office/drawing/2014/main" id="{12FFB8EA-2581-432D-A2C8-ABBB6DA63FEE}"/>
+              </a:ext>
+            </a:extLst>
+          </p:cNvPr>
+          <p:cNvPicPr>
+            <a:picLocks noChangeAspect="1"/>
+          </p:cNvPicPr>
+          <p:nvPr/>
+        </p:nvPicPr>
+        <p:blipFill>
+          <a:blip r:embed="rId2" cstate="print">
+            <a:extLst>
+              <a:ext uri="{28A0092B-C50C-407E-A947-70E740481C1C}">
+                <a14:useLocalDpi xmlns:a14="http://schemas.microsoft.com/office/drawing/2010/main" val="0"/>
+              </a:ext>
+            </a:extLst>
+          </a:blip>
+          <a:stretch>
+            <a:fillRect/>
+          </a:stretch>
+        </p:blipFill>
+        <p:spPr>
+          <a:xfrm>
+            <a:off x="3352800" y="0"/>
+            <a:ext cx="5486400" cy="6858000"/>
+          </a:xfrm>
+          <a:prstGeom prst="rect">
+            <a:avLst/>
+          </a:prstGeom>
+        </p:spPr>
+      </p:pic>
+      <p:sp>
+        <p:nvSpPr>
+          <p:cNvPr id="5" name="TextBox 4">
+            <a:extLst>
+              <a:ext uri="{FF2B5EF4-FFF2-40B4-BE49-F238E27FC236}">
+                <a16:creationId xmlns:a16="http://schemas.microsoft.com/office/drawing/2014/main" id="{41CD736D-826C-4173-AD8A-FDFBB4D0A9DF}"/>
+              </a:ext>
+            </a:extLst>
+          </p:cNvPr>
+          <p:cNvSpPr txBox="1"/>
+          <p:nvPr/>
+        </p:nvSpPr>
+        <p:spPr>
+          <a:xfrm>
+            <a:off x="5453062" y="6858000"/>
+            <a:ext cx="1285875" cy="369332"/>
+          </a:xfrm>
+          <a:prstGeom prst="rect">
+            <a:avLst/>
+          </a:prstGeom>
+          <a:noFill/>
+        </p:spPr>
+        <p:txBody>
+          <a:bodyPr wrap="square" rtlCol="0">
+            <a:spAutoFit/>
+          </a:bodyPr>
+          <a:lstStyle/>
+          <a:p>
+            <a:pPr algn="ctr"/>
+            <a:r>
+              <a:rPr lang="en-US" dirty="0">
+                <a:latin typeface="Arial" panose="020B0604020202020204" pitchFamily="34" charset="0"/>
+                <a:cs typeface="Arial" panose="020B0604020202020204" pitchFamily="34" charset="0"/>
+              </a:rPr>
+              <a:t>Month</a:t>
+            </a:r>
+          </a:p>
+        </p:txBody>
+      </p:sp>
+      <p:sp>
+        <p:nvSpPr>
+          <p:cNvPr id="6" name="TextBox 5">
+            <a:extLst>
+              <a:ext uri="{FF2B5EF4-FFF2-40B4-BE49-F238E27FC236}">
+                <a16:creationId xmlns:a16="http://schemas.microsoft.com/office/drawing/2014/main" id="{DC8BF1ED-D789-4516-8881-D8FEF5EA04E0}"/>
+              </a:ext>
+            </a:extLst>
+          </p:cNvPr>
+          <p:cNvSpPr txBox="1"/>
+          <p:nvPr/>
+        </p:nvSpPr>
+        <p:spPr>
+          <a:xfrm rot="16200000">
+            <a:off x="1950244" y="3239571"/>
+            <a:ext cx="2338387" cy="369332"/>
+          </a:xfrm>
+          <a:prstGeom prst="rect">
+            <a:avLst/>
+          </a:prstGeom>
+          <a:noFill/>
+        </p:spPr>
+        <p:txBody>
+          <a:bodyPr wrap="square" rtlCol="0">
+            <a:spAutoFit/>
+          </a:bodyPr>
+          <a:lstStyle/>
+          <a:p>
+            <a:pPr algn="ctr"/>
+            <a:r>
+              <a:rPr lang="en-US" dirty="0">
+                <a:latin typeface="Arial" panose="020B0604020202020204" pitchFamily="34" charset="0"/>
+                <a:cs typeface="Arial" panose="020B0604020202020204" pitchFamily="34" charset="0"/>
+              </a:rPr>
+              <a:t>Temperature (°C)</a:t>
+            </a:r>
+          </a:p>
+        </p:txBody>
+      </p:sp>
+      <p:sp>
+        <p:nvSpPr>
+          <p:cNvPr id="7" name="TextBox 6">
+            <a:extLst>
+              <a:ext uri="{FF2B5EF4-FFF2-40B4-BE49-F238E27FC236}">
+                <a16:creationId xmlns:a16="http://schemas.microsoft.com/office/drawing/2014/main" id="{B3ACBE7A-81EC-4FC5-8A71-B7EEC62501EB}"/>
+              </a:ext>
+            </a:extLst>
+          </p:cNvPr>
+          <p:cNvSpPr txBox="1"/>
+          <p:nvPr/>
+        </p:nvSpPr>
+        <p:spPr>
+          <a:xfrm>
+            <a:off x="3664744" y="-228600"/>
+            <a:ext cx="2338387" cy="369332"/>
+          </a:xfrm>
+          <a:prstGeom prst="rect">
+            <a:avLst/>
+          </a:prstGeom>
+          <a:noFill/>
+        </p:spPr>
+        <p:txBody>
+          <a:bodyPr wrap="square" rtlCol="0">
+            <a:spAutoFit/>
+          </a:bodyPr>
+          <a:lstStyle/>
+          <a:p>
+            <a:pPr algn="ctr"/>
+            <a:r>
+              <a:rPr lang="en-US" dirty="0">
+                <a:latin typeface="Arial" panose="020B0604020202020204" pitchFamily="34" charset="0"/>
+                <a:cs typeface="Arial" panose="020B0604020202020204" pitchFamily="34" charset="0"/>
+              </a:rPr>
+              <a:t>K = 100 m day</a:t>
+            </a:r>
+            <a:r>
+              <a:rPr lang="en-US" baseline="30000" dirty="0">
+                <a:latin typeface="Arial" panose="020B0604020202020204" pitchFamily="34" charset="0"/>
+                <a:cs typeface="Arial" panose="020B0604020202020204" pitchFamily="34" charset="0"/>
+              </a:rPr>
+              <a:t>-1</a:t>
+            </a:r>
+            <a:endParaRPr lang="en-US" dirty="0">
+              <a:latin typeface="Arial" panose="020B0604020202020204" pitchFamily="34" charset="0"/>
+              <a:cs typeface="Arial" panose="020B0604020202020204" pitchFamily="34" charset="0"/>
+            </a:endParaRPr>
+          </a:p>
+        </p:txBody>
+      </p:sp>
+      <p:sp>
+        <p:nvSpPr>
+          <p:cNvPr id="8" name="TextBox 7">
+            <a:extLst>
+              <a:ext uri="{FF2B5EF4-FFF2-40B4-BE49-F238E27FC236}">
+                <a16:creationId xmlns:a16="http://schemas.microsoft.com/office/drawing/2014/main" id="{7BA60CF3-DD92-4F39-8C10-832B6C75DF9C}"/>
+              </a:ext>
+            </a:extLst>
+          </p:cNvPr>
+          <p:cNvSpPr txBox="1"/>
+          <p:nvPr/>
+        </p:nvSpPr>
+        <p:spPr>
+          <a:xfrm>
+            <a:off x="6315075" y="-216932"/>
+            <a:ext cx="2338387" cy="369332"/>
+          </a:xfrm>
+          <a:prstGeom prst="rect">
+            <a:avLst/>
+          </a:prstGeom>
+          <a:noFill/>
+        </p:spPr>
+        <p:txBody>
+          <a:bodyPr wrap="square" rtlCol="0">
+            <a:spAutoFit/>
+          </a:bodyPr>
+          <a:lstStyle/>
+          <a:p>
+            <a:pPr algn="ctr"/>
+            <a:r>
+              <a:rPr lang="en-US" dirty="0">
+                <a:latin typeface="Arial" panose="020B0604020202020204" pitchFamily="34" charset="0"/>
+                <a:cs typeface="Arial" panose="020B0604020202020204" pitchFamily="34" charset="0"/>
+              </a:rPr>
+              <a:t>K = 400 m day</a:t>
+            </a:r>
+            <a:r>
+              <a:rPr lang="en-US" baseline="30000" dirty="0">
+                <a:latin typeface="Arial" panose="020B0604020202020204" pitchFamily="34" charset="0"/>
+                <a:cs typeface="Arial" panose="020B0604020202020204" pitchFamily="34" charset="0"/>
+              </a:rPr>
+              <a:t>-1</a:t>
+            </a:r>
+            <a:endParaRPr lang="en-US" dirty="0">
+              <a:latin typeface="Arial" panose="020B0604020202020204" pitchFamily="34" charset="0"/>
+              <a:cs typeface="Arial" panose="020B0604020202020204" pitchFamily="34" charset="0"/>
+            </a:endParaRPr>
+          </a:p>
+        </p:txBody>
+      </p:sp>
+    </p:spTree>
+    <p:extLst>
+      <p:ext uri="{BB962C8B-B14F-4D97-AF65-F5344CB8AC3E}">
+        <p14:creationId xmlns:p14="http://schemas.microsoft.com/office/powerpoint/2010/main" val="29820230"/>
       </p:ext>
     </p:extLst>
   </p:cSld>

</xml_diff>